<commit_message>
Update May Presentation Powerpoint
</commit_message>
<xml_diff>
--- a/Documents/May Presentation.pptx
+++ b/Documents/May Presentation.pptx
@@ -127,7 +127,7 @@
 <file path=ppt/revisionInfo.xml><?xml version="1.0" encoding="utf-8"?>
 <p1510:revInfo xmlns:a="http://schemas.openxmlformats.org/drawingml/2006/main" xmlns:r="http://schemas.openxmlformats.org/officeDocument/2006/relationships" xmlns:p1510="http://schemas.microsoft.com/office/powerpoint/2015/10/main">
   <p1510:revLst>
-    <p1510:client id="{08E1F6C1-C973-4F1F-92EE-AF2BB4FE6616}" v="13" dt="2025-04-29T17:54:30.393"/>
+    <p1510:client id="{08E1F6C1-C973-4F1F-92EE-AF2BB4FE6616}" v="21" dt="2025-04-30T00:47:23.125"/>
   </p1510:revLst>
 </p1510:revInfo>
 </file>
@@ -137,7 +137,7 @@
   <pc:docChgLst>
     <pc:chgData name="Steve Swartz" userId="fa5fbd6ce30e021b" providerId="LiveId" clId="{08E1F6C1-C973-4F1F-92EE-AF2BB4FE6616}"/>
     <pc:docChg chg="undo custSel addSld delSld modSld">
-      <pc:chgData name="Steve Swartz" userId="fa5fbd6ce30e021b" providerId="LiveId" clId="{08E1F6C1-C973-4F1F-92EE-AF2BB4FE6616}" dt="2025-04-29T17:58:13.049" v="249" actId="729"/>
+      <pc:chgData name="Steve Swartz" userId="fa5fbd6ce30e021b" providerId="LiveId" clId="{08E1F6C1-C973-4F1F-92EE-AF2BB4FE6616}" dt="2025-04-30T00:47:23.124" v="267"/>
       <pc:docMkLst>
         <pc:docMk/>
       </pc:docMkLst>
@@ -325,8 +325,8 @@
           </ac:picMkLst>
         </pc:picChg>
       </pc:sldChg>
-      <pc:sldChg chg="modSp new mod">
-        <pc:chgData name="Steve Swartz" userId="fa5fbd6ce30e021b" providerId="LiveId" clId="{08E1F6C1-C973-4F1F-92EE-AF2BB4FE6616}" dt="2025-04-29T17:53:57.097" v="156" actId="20577"/>
+      <pc:sldChg chg="addSp modSp new mod">
+        <pc:chgData name="Steve Swartz" userId="fa5fbd6ce30e021b" providerId="LiveId" clId="{08E1F6C1-C973-4F1F-92EE-AF2BB4FE6616}" dt="2025-04-30T00:46:44.060" v="256" actId="1076"/>
         <pc:sldMkLst>
           <pc:docMk/>
           <pc:sldMk cId="3248046169" sldId="261"/>
@@ -339,9 +339,17 @@
             <ac:spMk id="2" creationId="{E8035842-AC2E-692D-2CB0-5C524643964C}"/>
           </ac:spMkLst>
         </pc:spChg>
+        <pc:spChg chg="add mod">
+          <ac:chgData name="Steve Swartz" userId="fa5fbd6ce30e021b" providerId="LiveId" clId="{08E1F6C1-C973-4F1F-92EE-AF2BB4FE6616}" dt="2025-04-30T00:46:44.060" v="256" actId="1076"/>
+          <ac:spMkLst>
+            <pc:docMk/>
+            <pc:sldMk cId="3248046169" sldId="261"/>
+            <ac:spMk id="4" creationId="{9A78DF86-24C6-619B-451E-7BD2D5BAC47A}"/>
+          </ac:spMkLst>
+        </pc:spChg>
       </pc:sldChg>
-      <pc:sldChg chg="modSp new mod">
-        <pc:chgData name="Steve Swartz" userId="fa5fbd6ce30e021b" providerId="LiveId" clId="{08E1F6C1-C973-4F1F-92EE-AF2BB4FE6616}" dt="2025-04-29T17:54:14.192" v="166" actId="20577"/>
+      <pc:sldChg chg="addSp modSp new mod">
+        <pc:chgData name="Steve Swartz" userId="fa5fbd6ce30e021b" providerId="LiveId" clId="{08E1F6C1-C973-4F1F-92EE-AF2BB4FE6616}" dt="2025-04-30T00:46:53.233" v="257"/>
         <pc:sldMkLst>
           <pc:docMk/>
           <pc:sldMk cId="3374893084" sldId="262"/>
@@ -354,9 +362,17 @@
             <ac:spMk id="2" creationId="{A6314836-6CCB-0800-87F2-F2FB62A2F5DD}"/>
           </ac:spMkLst>
         </pc:spChg>
+        <pc:spChg chg="add mod">
+          <ac:chgData name="Steve Swartz" userId="fa5fbd6ce30e021b" providerId="LiveId" clId="{08E1F6C1-C973-4F1F-92EE-AF2BB4FE6616}" dt="2025-04-30T00:46:53.233" v="257"/>
+          <ac:spMkLst>
+            <pc:docMk/>
+            <pc:sldMk cId="3374893084" sldId="262"/>
+            <ac:spMk id="4" creationId="{F6D81339-640B-2120-501D-186170A1D569}"/>
+          </ac:spMkLst>
+        </pc:spChg>
       </pc:sldChg>
-      <pc:sldChg chg="modSp new mod">
-        <pc:chgData name="Steve Swartz" userId="fa5fbd6ce30e021b" providerId="LiveId" clId="{08E1F6C1-C973-4F1F-92EE-AF2BB4FE6616}" dt="2025-04-29T17:54:59.193" v="177" actId="20577"/>
+      <pc:sldChg chg="addSp modSp new mod">
+        <pc:chgData name="Steve Swartz" userId="fa5fbd6ce30e021b" providerId="LiveId" clId="{08E1F6C1-C973-4F1F-92EE-AF2BB4FE6616}" dt="2025-04-30T00:46:54.680" v="258"/>
         <pc:sldMkLst>
           <pc:docMk/>
           <pc:sldMk cId="3467556616" sldId="263"/>
@@ -369,9 +385,17 @@
             <ac:spMk id="2" creationId="{99BFB23F-D52A-C467-FE4E-6B1D91CAF88F}"/>
           </ac:spMkLst>
         </pc:spChg>
+        <pc:spChg chg="add mod">
+          <ac:chgData name="Steve Swartz" userId="fa5fbd6ce30e021b" providerId="LiveId" clId="{08E1F6C1-C973-4F1F-92EE-AF2BB4FE6616}" dt="2025-04-30T00:46:54.680" v="258"/>
+          <ac:spMkLst>
+            <pc:docMk/>
+            <pc:sldMk cId="3467556616" sldId="263"/>
+            <ac:spMk id="4" creationId="{9FD3C948-D4CD-8899-5F6F-639D757D95DC}"/>
+          </ac:spMkLst>
+        </pc:spChg>
       </pc:sldChg>
-      <pc:sldChg chg="modSp new mod">
-        <pc:chgData name="Steve Swartz" userId="fa5fbd6ce30e021b" providerId="LiveId" clId="{08E1F6C1-C973-4F1F-92EE-AF2BB4FE6616}" dt="2025-04-29T17:55:54.401" v="190" actId="20577"/>
+      <pc:sldChg chg="addSp modSp new mod">
+        <pc:chgData name="Steve Swartz" userId="fa5fbd6ce30e021b" providerId="LiveId" clId="{08E1F6C1-C973-4F1F-92EE-AF2BB4FE6616}" dt="2025-04-30T00:46:56.797" v="259"/>
         <pc:sldMkLst>
           <pc:docMk/>
           <pc:sldMk cId="293938748" sldId="264"/>
@@ -384,6 +408,14 @@
             <ac:spMk id="2" creationId="{E5A5D905-17A3-E78D-3E8D-F67EFA424FE9}"/>
           </ac:spMkLst>
         </pc:spChg>
+        <pc:spChg chg="add mod">
+          <ac:chgData name="Steve Swartz" userId="fa5fbd6ce30e021b" providerId="LiveId" clId="{08E1F6C1-C973-4F1F-92EE-AF2BB4FE6616}" dt="2025-04-30T00:46:56.797" v="259"/>
+          <ac:spMkLst>
+            <pc:docMk/>
+            <pc:sldMk cId="293938748" sldId="264"/>
+            <ac:spMk id="4" creationId="{590D0D0C-C94B-7DA1-7885-5C46E546D7AC}"/>
+          </ac:spMkLst>
+        </pc:spChg>
       </pc:sldChg>
       <pc:sldChg chg="add del">
         <pc:chgData name="Steve Swartz" userId="fa5fbd6ce30e021b" providerId="LiveId" clId="{08E1F6C1-C973-4F1F-92EE-AF2BB4FE6616}" dt="2025-04-29T17:54:45.162" v="168" actId="47"/>
@@ -392,8 +424,8 @@
           <pc:sldMk cId="3071704235" sldId="265"/>
         </pc:sldMkLst>
       </pc:sldChg>
-      <pc:sldChg chg="modSp new mod">
-        <pc:chgData name="Steve Swartz" userId="fa5fbd6ce30e021b" providerId="LiveId" clId="{08E1F6C1-C973-4F1F-92EE-AF2BB4FE6616}" dt="2025-04-29T17:56:19.431" v="198" actId="20577"/>
+      <pc:sldChg chg="addSp modSp new mod">
+        <pc:chgData name="Steve Swartz" userId="fa5fbd6ce30e021b" providerId="LiveId" clId="{08E1F6C1-C973-4F1F-92EE-AF2BB4FE6616}" dt="2025-04-30T00:47:04.604" v="263" actId="20577"/>
         <pc:sldMkLst>
           <pc:docMk/>
           <pc:sldMk cId="4014904213" sldId="265"/>
@@ -406,9 +438,17 @@
             <ac:spMk id="2" creationId="{76BD9005-92E2-C396-F066-E905FCB00724}"/>
           </ac:spMkLst>
         </pc:spChg>
+        <pc:spChg chg="add mod">
+          <ac:chgData name="Steve Swartz" userId="fa5fbd6ce30e021b" providerId="LiveId" clId="{08E1F6C1-C973-4F1F-92EE-AF2BB4FE6616}" dt="2025-04-30T00:47:04.604" v="263" actId="20577"/>
+          <ac:spMkLst>
+            <pc:docMk/>
+            <pc:sldMk cId="4014904213" sldId="265"/>
+            <ac:spMk id="4" creationId="{A910FAF8-BE86-090B-145E-977C585E43B9}"/>
+          </ac:spMkLst>
+        </pc:spChg>
       </pc:sldChg>
-      <pc:sldChg chg="modSp new mod">
-        <pc:chgData name="Steve Swartz" userId="fa5fbd6ce30e021b" providerId="LiveId" clId="{08E1F6C1-C973-4F1F-92EE-AF2BB4FE6616}" dt="2025-04-29T17:56:25.367" v="202" actId="20577"/>
+      <pc:sldChg chg="addSp modSp new mod">
+        <pc:chgData name="Steve Swartz" userId="fa5fbd6ce30e021b" providerId="LiveId" clId="{08E1F6C1-C973-4F1F-92EE-AF2BB4FE6616}" dt="2025-04-30T00:47:13.181" v="264"/>
         <pc:sldMkLst>
           <pc:docMk/>
           <pc:sldMk cId="3672255520" sldId="266"/>
@@ -421,9 +461,17 @@
             <ac:spMk id="2" creationId="{4C5F64E5-7B05-06C5-2BAD-15906F71492C}"/>
           </ac:spMkLst>
         </pc:spChg>
+        <pc:spChg chg="add mod">
+          <ac:chgData name="Steve Swartz" userId="fa5fbd6ce30e021b" providerId="LiveId" clId="{08E1F6C1-C973-4F1F-92EE-AF2BB4FE6616}" dt="2025-04-30T00:47:13.181" v="264"/>
+          <ac:spMkLst>
+            <pc:docMk/>
+            <pc:sldMk cId="3672255520" sldId="266"/>
+            <ac:spMk id="4" creationId="{138C0814-FDB5-BC5C-A332-BDC31B86FA3E}"/>
+          </ac:spMkLst>
+        </pc:spChg>
       </pc:sldChg>
-      <pc:sldChg chg="modSp new mod">
-        <pc:chgData name="Steve Swartz" userId="fa5fbd6ce30e021b" providerId="LiveId" clId="{08E1F6C1-C973-4F1F-92EE-AF2BB4FE6616}" dt="2025-04-29T17:57:20.092" v="232" actId="20577"/>
+      <pc:sldChg chg="addSp modSp new mod">
+        <pc:chgData name="Steve Swartz" userId="fa5fbd6ce30e021b" providerId="LiveId" clId="{08E1F6C1-C973-4F1F-92EE-AF2BB4FE6616}" dt="2025-04-30T00:47:15.957" v="265"/>
         <pc:sldMkLst>
           <pc:docMk/>
           <pc:sldMk cId="367996804" sldId="267"/>
@@ -436,9 +484,17 @@
             <ac:spMk id="2" creationId="{7B95B9F2-7F85-2BE4-0E69-750F311A523A}"/>
           </ac:spMkLst>
         </pc:spChg>
+        <pc:spChg chg="add mod">
+          <ac:chgData name="Steve Swartz" userId="fa5fbd6ce30e021b" providerId="LiveId" clId="{08E1F6C1-C973-4F1F-92EE-AF2BB4FE6616}" dt="2025-04-30T00:47:15.957" v="265"/>
+          <ac:spMkLst>
+            <pc:docMk/>
+            <pc:sldMk cId="367996804" sldId="267"/>
+            <ac:spMk id="4" creationId="{86D7EAAB-E117-0E96-356C-E3C3424A5C17}"/>
+          </ac:spMkLst>
+        </pc:spChg>
       </pc:sldChg>
-      <pc:sldChg chg="modSp new mod">
-        <pc:chgData name="Steve Swartz" userId="fa5fbd6ce30e021b" providerId="LiveId" clId="{08E1F6C1-C973-4F1F-92EE-AF2BB4FE6616}" dt="2025-04-29T17:57:34.025" v="240" actId="20577"/>
+      <pc:sldChg chg="addSp modSp new mod">
+        <pc:chgData name="Steve Swartz" userId="fa5fbd6ce30e021b" providerId="LiveId" clId="{08E1F6C1-C973-4F1F-92EE-AF2BB4FE6616}" dt="2025-04-30T00:47:17.805" v="266"/>
         <pc:sldMkLst>
           <pc:docMk/>
           <pc:sldMk cId="701201403" sldId="268"/>
@@ -451,9 +507,17 @@
             <ac:spMk id="2" creationId="{CEAB25EE-6E11-B86E-B9EF-313E7FAB791D}"/>
           </ac:spMkLst>
         </pc:spChg>
+        <pc:spChg chg="add mod">
+          <ac:chgData name="Steve Swartz" userId="fa5fbd6ce30e021b" providerId="LiveId" clId="{08E1F6C1-C973-4F1F-92EE-AF2BB4FE6616}" dt="2025-04-30T00:47:17.805" v="266"/>
+          <ac:spMkLst>
+            <pc:docMk/>
+            <pc:sldMk cId="701201403" sldId="268"/>
+            <ac:spMk id="4" creationId="{1F007838-B626-8770-3DF2-53E4D0DEFEEE}"/>
+          </ac:spMkLst>
+        </pc:spChg>
       </pc:sldChg>
-      <pc:sldChg chg="modSp new mod">
-        <pc:chgData name="Steve Swartz" userId="fa5fbd6ce30e021b" providerId="LiveId" clId="{08E1F6C1-C973-4F1F-92EE-AF2BB4FE6616}" dt="2025-04-29T17:57:45.199" v="245" actId="20577"/>
+      <pc:sldChg chg="addSp modSp new mod">
+        <pc:chgData name="Steve Swartz" userId="fa5fbd6ce30e021b" providerId="LiveId" clId="{08E1F6C1-C973-4F1F-92EE-AF2BB4FE6616}" dt="2025-04-30T00:47:23.124" v="267"/>
         <pc:sldMkLst>
           <pc:docMk/>
           <pc:sldMk cId="4265348810" sldId="269"/>
@@ -464,6 +528,14 @@
             <pc:docMk/>
             <pc:sldMk cId="4265348810" sldId="269"/>
             <ac:spMk id="2" creationId="{9E6B45E6-120E-2C4D-861A-96D44A89CBC7}"/>
+          </ac:spMkLst>
+        </pc:spChg>
+        <pc:spChg chg="add mod">
+          <ac:chgData name="Steve Swartz" userId="fa5fbd6ce30e021b" providerId="LiveId" clId="{08E1F6C1-C973-4F1F-92EE-AF2BB4FE6616}" dt="2025-04-30T00:47:23.124" v="267"/>
+          <ac:spMkLst>
+            <pc:docMk/>
+            <pc:sldMk cId="4265348810" sldId="269"/>
+            <ac:spMk id="4" creationId="{93D7153A-DCC9-EBB7-366F-7A626241F935}"/>
           </ac:spMkLst>
         </pc:spChg>
       </pc:sldChg>
@@ -3860,6 +3932,54 @@
           </a:p>
         </p:txBody>
       </p:sp>
+      <p:sp>
+        <p:nvSpPr>
+          <p:cNvPr id="4" name="Oval 3">
+            <a:extLst>
+              <a:ext uri="{FF2B5EF4-FFF2-40B4-BE49-F238E27FC236}">
+                <a16:creationId xmlns:a16="http://schemas.microsoft.com/office/drawing/2014/main" id="{93D7153A-DCC9-EBB7-366F-7A626241F935}"/>
+              </a:ext>
+            </a:extLst>
+          </p:cNvPr>
+          <p:cNvSpPr/>
+          <p:nvPr/>
+        </p:nvSpPr>
+        <p:spPr>
+          <a:xfrm>
+            <a:off x="10439400" y="365125"/>
+            <a:ext cx="914400" cy="398649"/>
+          </a:xfrm>
+          <a:prstGeom prst="ellipse">
+            <a:avLst/>
+          </a:prstGeom>
+        </p:spPr>
+        <p:style>
+          <a:lnRef idx="2">
+            <a:schemeClr val="dk1"/>
+          </a:lnRef>
+          <a:fillRef idx="1">
+            <a:schemeClr val="lt1"/>
+          </a:fillRef>
+          <a:effectRef idx="0">
+            <a:schemeClr val="dk1"/>
+          </a:effectRef>
+          <a:fontRef idx="minor">
+            <a:schemeClr val="dk1"/>
+          </a:fontRef>
+        </p:style>
+        <p:txBody>
+          <a:bodyPr rtlCol="0" anchor="ctr"/>
+          <a:lstStyle/>
+          <a:p>
+            <a:pPr algn="ctr"/>
+            <a:r>
+              <a:rPr lang="en-US" dirty="0" err="1"/>
+              <a:t>StS</a:t>
+            </a:r>
+            <a:endParaRPr lang="en-US" dirty="0"/>
+          </a:p>
+        </p:txBody>
+      </p:sp>
     </p:spTree>
     <p:extLst>
       <p:ext uri="{BB962C8B-B14F-4D97-AF65-F5344CB8AC3E}">
@@ -4481,6 +4601,53 @@
           </a:p>
         </p:txBody>
       </p:sp>
+      <p:sp>
+        <p:nvSpPr>
+          <p:cNvPr id="4" name="Oval 3">
+            <a:extLst>
+              <a:ext uri="{FF2B5EF4-FFF2-40B4-BE49-F238E27FC236}">
+                <a16:creationId xmlns:a16="http://schemas.microsoft.com/office/drawing/2014/main" id="{9A78DF86-24C6-619B-451E-7BD2D5BAC47A}"/>
+              </a:ext>
+            </a:extLst>
+          </p:cNvPr>
+          <p:cNvSpPr/>
+          <p:nvPr/>
+        </p:nvSpPr>
+        <p:spPr>
+          <a:xfrm>
+            <a:off x="10439400" y="365125"/>
+            <a:ext cx="914400" cy="398649"/>
+          </a:xfrm>
+          <a:prstGeom prst="ellipse">
+            <a:avLst/>
+          </a:prstGeom>
+        </p:spPr>
+        <p:style>
+          <a:lnRef idx="2">
+            <a:schemeClr val="dk1"/>
+          </a:lnRef>
+          <a:fillRef idx="1">
+            <a:schemeClr val="lt1"/>
+          </a:fillRef>
+          <a:effectRef idx="0">
+            <a:schemeClr val="dk1"/>
+          </a:effectRef>
+          <a:fontRef idx="minor">
+            <a:schemeClr val="dk1"/>
+          </a:fontRef>
+        </p:style>
+        <p:txBody>
+          <a:bodyPr rtlCol="0" anchor="ctr"/>
+          <a:lstStyle/>
+          <a:p>
+            <a:pPr algn="ctr"/>
+            <a:r>
+              <a:rPr lang="en-US" dirty="0"/>
+              <a:t>Duc</a:t>
+            </a:r>
+          </a:p>
+        </p:txBody>
+      </p:sp>
     </p:spTree>
     <p:extLst>
       <p:ext uri="{BB962C8B-B14F-4D97-AF65-F5344CB8AC3E}">
@@ -4564,6 +4731,53 @@
           </a:p>
         </p:txBody>
       </p:sp>
+      <p:sp>
+        <p:nvSpPr>
+          <p:cNvPr id="4" name="Oval 3">
+            <a:extLst>
+              <a:ext uri="{FF2B5EF4-FFF2-40B4-BE49-F238E27FC236}">
+                <a16:creationId xmlns:a16="http://schemas.microsoft.com/office/drawing/2014/main" id="{F6D81339-640B-2120-501D-186170A1D569}"/>
+              </a:ext>
+            </a:extLst>
+          </p:cNvPr>
+          <p:cNvSpPr/>
+          <p:nvPr/>
+        </p:nvSpPr>
+        <p:spPr>
+          <a:xfrm>
+            <a:off x="10439400" y="365125"/>
+            <a:ext cx="914400" cy="398649"/>
+          </a:xfrm>
+          <a:prstGeom prst="ellipse">
+            <a:avLst/>
+          </a:prstGeom>
+        </p:spPr>
+        <p:style>
+          <a:lnRef idx="2">
+            <a:schemeClr val="dk1"/>
+          </a:lnRef>
+          <a:fillRef idx="1">
+            <a:schemeClr val="lt1"/>
+          </a:fillRef>
+          <a:effectRef idx="0">
+            <a:schemeClr val="dk1"/>
+          </a:effectRef>
+          <a:fontRef idx="minor">
+            <a:schemeClr val="dk1"/>
+          </a:fontRef>
+        </p:style>
+        <p:txBody>
+          <a:bodyPr rtlCol="0" anchor="ctr"/>
+          <a:lstStyle/>
+          <a:p>
+            <a:pPr algn="ctr"/>
+            <a:r>
+              <a:rPr lang="en-US" dirty="0"/>
+              <a:t>Duc</a:t>
+            </a:r>
+          </a:p>
+        </p:txBody>
+      </p:sp>
     </p:spTree>
     <p:extLst>
       <p:ext uri="{BB962C8B-B14F-4D97-AF65-F5344CB8AC3E}">
@@ -4647,6 +4861,53 @@
           </a:p>
         </p:txBody>
       </p:sp>
+      <p:sp>
+        <p:nvSpPr>
+          <p:cNvPr id="4" name="Oval 3">
+            <a:extLst>
+              <a:ext uri="{FF2B5EF4-FFF2-40B4-BE49-F238E27FC236}">
+                <a16:creationId xmlns:a16="http://schemas.microsoft.com/office/drawing/2014/main" id="{9FD3C948-D4CD-8899-5F6F-639D757D95DC}"/>
+              </a:ext>
+            </a:extLst>
+          </p:cNvPr>
+          <p:cNvSpPr/>
+          <p:nvPr/>
+        </p:nvSpPr>
+        <p:spPr>
+          <a:xfrm>
+            <a:off x="10439400" y="365125"/>
+            <a:ext cx="914400" cy="398649"/>
+          </a:xfrm>
+          <a:prstGeom prst="ellipse">
+            <a:avLst/>
+          </a:prstGeom>
+        </p:spPr>
+        <p:style>
+          <a:lnRef idx="2">
+            <a:schemeClr val="dk1"/>
+          </a:lnRef>
+          <a:fillRef idx="1">
+            <a:schemeClr val="lt1"/>
+          </a:fillRef>
+          <a:effectRef idx="0">
+            <a:schemeClr val="dk1"/>
+          </a:effectRef>
+          <a:fontRef idx="minor">
+            <a:schemeClr val="dk1"/>
+          </a:fontRef>
+        </p:style>
+        <p:txBody>
+          <a:bodyPr rtlCol="0" anchor="ctr"/>
+          <a:lstStyle/>
+          <a:p>
+            <a:pPr algn="ctr"/>
+            <a:r>
+              <a:rPr lang="en-US" dirty="0"/>
+              <a:t>Duc</a:t>
+            </a:r>
+          </a:p>
+        </p:txBody>
+      </p:sp>
     </p:spTree>
     <p:extLst>
       <p:ext uri="{BB962C8B-B14F-4D97-AF65-F5344CB8AC3E}">
@@ -4730,6 +4991,53 @@
           </a:p>
         </p:txBody>
       </p:sp>
+      <p:sp>
+        <p:nvSpPr>
+          <p:cNvPr id="4" name="Oval 3">
+            <a:extLst>
+              <a:ext uri="{FF2B5EF4-FFF2-40B4-BE49-F238E27FC236}">
+                <a16:creationId xmlns:a16="http://schemas.microsoft.com/office/drawing/2014/main" id="{590D0D0C-C94B-7DA1-7885-5C46E546D7AC}"/>
+              </a:ext>
+            </a:extLst>
+          </p:cNvPr>
+          <p:cNvSpPr/>
+          <p:nvPr/>
+        </p:nvSpPr>
+        <p:spPr>
+          <a:xfrm>
+            <a:off x="10439400" y="365125"/>
+            <a:ext cx="914400" cy="398649"/>
+          </a:xfrm>
+          <a:prstGeom prst="ellipse">
+            <a:avLst/>
+          </a:prstGeom>
+        </p:spPr>
+        <p:style>
+          <a:lnRef idx="2">
+            <a:schemeClr val="dk1"/>
+          </a:lnRef>
+          <a:fillRef idx="1">
+            <a:schemeClr val="lt1"/>
+          </a:fillRef>
+          <a:effectRef idx="0">
+            <a:schemeClr val="dk1"/>
+          </a:effectRef>
+          <a:fontRef idx="minor">
+            <a:schemeClr val="dk1"/>
+          </a:fontRef>
+        </p:style>
+        <p:txBody>
+          <a:bodyPr rtlCol="0" anchor="ctr"/>
+          <a:lstStyle/>
+          <a:p>
+            <a:pPr algn="ctr"/>
+            <a:r>
+              <a:rPr lang="en-US" dirty="0"/>
+              <a:t>Duc</a:t>
+            </a:r>
+          </a:p>
+        </p:txBody>
+      </p:sp>
     </p:spTree>
     <p:extLst>
       <p:ext uri="{BB962C8B-B14F-4D97-AF65-F5344CB8AC3E}">
@@ -4813,6 +5121,54 @@
           </a:p>
         </p:txBody>
       </p:sp>
+      <p:sp>
+        <p:nvSpPr>
+          <p:cNvPr id="4" name="Oval 3">
+            <a:extLst>
+              <a:ext uri="{FF2B5EF4-FFF2-40B4-BE49-F238E27FC236}">
+                <a16:creationId xmlns:a16="http://schemas.microsoft.com/office/drawing/2014/main" id="{A910FAF8-BE86-090B-145E-977C585E43B9}"/>
+              </a:ext>
+            </a:extLst>
+          </p:cNvPr>
+          <p:cNvSpPr/>
+          <p:nvPr/>
+        </p:nvSpPr>
+        <p:spPr>
+          <a:xfrm>
+            <a:off x="10439400" y="365125"/>
+            <a:ext cx="914400" cy="398649"/>
+          </a:xfrm>
+          <a:prstGeom prst="ellipse">
+            <a:avLst/>
+          </a:prstGeom>
+        </p:spPr>
+        <p:style>
+          <a:lnRef idx="2">
+            <a:schemeClr val="dk1"/>
+          </a:lnRef>
+          <a:fillRef idx="1">
+            <a:schemeClr val="lt1"/>
+          </a:fillRef>
+          <a:effectRef idx="0">
+            <a:schemeClr val="dk1"/>
+          </a:effectRef>
+          <a:fontRef idx="minor">
+            <a:schemeClr val="dk1"/>
+          </a:fontRef>
+        </p:style>
+        <p:txBody>
+          <a:bodyPr rtlCol="0" anchor="ctr"/>
+          <a:lstStyle/>
+          <a:p>
+            <a:pPr algn="ctr"/>
+            <a:r>
+              <a:rPr lang="en-US" dirty="0" err="1"/>
+              <a:t>StS</a:t>
+            </a:r>
+            <a:endParaRPr lang="en-US" dirty="0"/>
+          </a:p>
+        </p:txBody>
+      </p:sp>
     </p:spTree>
     <p:extLst>
       <p:ext uri="{BB962C8B-B14F-4D97-AF65-F5344CB8AC3E}">
@@ -4896,6 +5252,54 @@
           </a:p>
         </p:txBody>
       </p:sp>
+      <p:sp>
+        <p:nvSpPr>
+          <p:cNvPr id="4" name="Oval 3">
+            <a:extLst>
+              <a:ext uri="{FF2B5EF4-FFF2-40B4-BE49-F238E27FC236}">
+                <a16:creationId xmlns:a16="http://schemas.microsoft.com/office/drawing/2014/main" id="{138C0814-FDB5-BC5C-A332-BDC31B86FA3E}"/>
+              </a:ext>
+            </a:extLst>
+          </p:cNvPr>
+          <p:cNvSpPr/>
+          <p:nvPr/>
+        </p:nvSpPr>
+        <p:spPr>
+          <a:xfrm>
+            <a:off x="10439400" y="365125"/>
+            <a:ext cx="914400" cy="398649"/>
+          </a:xfrm>
+          <a:prstGeom prst="ellipse">
+            <a:avLst/>
+          </a:prstGeom>
+        </p:spPr>
+        <p:style>
+          <a:lnRef idx="2">
+            <a:schemeClr val="dk1"/>
+          </a:lnRef>
+          <a:fillRef idx="1">
+            <a:schemeClr val="lt1"/>
+          </a:fillRef>
+          <a:effectRef idx="0">
+            <a:schemeClr val="dk1"/>
+          </a:effectRef>
+          <a:fontRef idx="minor">
+            <a:schemeClr val="dk1"/>
+          </a:fontRef>
+        </p:style>
+        <p:txBody>
+          <a:bodyPr rtlCol="0" anchor="ctr"/>
+          <a:lstStyle/>
+          <a:p>
+            <a:pPr algn="ctr"/>
+            <a:r>
+              <a:rPr lang="en-US" dirty="0" err="1"/>
+              <a:t>StS</a:t>
+            </a:r>
+            <a:endParaRPr lang="en-US" dirty="0"/>
+          </a:p>
+        </p:txBody>
+      </p:sp>
     </p:spTree>
     <p:extLst>
       <p:ext uri="{BB962C8B-B14F-4D97-AF65-F5344CB8AC3E}">
@@ -4979,6 +5383,54 @@
           </a:p>
         </p:txBody>
       </p:sp>
+      <p:sp>
+        <p:nvSpPr>
+          <p:cNvPr id="4" name="Oval 3">
+            <a:extLst>
+              <a:ext uri="{FF2B5EF4-FFF2-40B4-BE49-F238E27FC236}">
+                <a16:creationId xmlns:a16="http://schemas.microsoft.com/office/drawing/2014/main" id="{86D7EAAB-E117-0E96-356C-E3C3424A5C17}"/>
+              </a:ext>
+            </a:extLst>
+          </p:cNvPr>
+          <p:cNvSpPr/>
+          <p:nvPr/>
+        </p:nvSpPr>
+        <p:spPr>
+          <a:xfrm>
+            <a:off x="10439400" y="365125"/>
+            <a:ext cx="914400" cy="398649"/>
+          </a:xfrm>
+          <a:prstGeom prst="ellipse">
+            <a:avLst/>
+          </a:prstGeom>
+        </p:spPr>
+        <p:style>
+          <a:lnRef idx="2">
+            <a:schemeClr val="dk1"/>
+          </a:lnRef>
+          <a:fillRef idx="1">
+            <a:schemeClr val="lt1"/>
+          </a:fillRef>
+          <a:effectRef idx="0">
+            <a:schemeClr val="dk1"/>
+          </a:effectRef>
+          <a:fontRef idx="minor">
+            <a:schemeClr val="dk1"/>
+          </a:fontRef>
+        </p:style>
+        <p:txBody>
+          <a:bodyPr rtlCol="0" anchor="ctr"/>
+          <a:lstStyle/>
+          <a:p>
+            <a:pPr algn="ctr"/>
+            <a:r>
+              <a:rPr lang="en-US" dirty="0" err="1"/>
+              <a:t>StS</a:t>
+            </a:r>
+            <a:endParaRPr lang="en-US" dirty="0"/>
+          </a:p>
+        </p:txBody>
+      </p:sp>
     </p:spTree>
     <p:extLst>
       <p:ext uri="{BB962C8B-B14F-4D97-AF65-F5344CB8AC3E}">
@@ -5059,6 +5511,54 @@
           <a:lstStyle/>
           <a:p>
             <a:endParaRPr lang="en-US"/>
+          </a:p>
+        </p:txBody>
+      </p:sp>
+      <p:sp>
+        <p:nvSpPr>
+          <p:cNvPr id="4" name="Oval 3">
+            <a:extLst>
+              <a:ext uri="{FF2B5EF4-FFF2-40B4-BE49-F238E27FC236}">
+                <a16:creationId xmlns:a16="http://schemas.microsoft.com/office/drawing/2014/main" id="{1F007838-B626-8770-3DF2-53E4D0DEFEEE}"/>
+              </a:ext>
+            </a:extLst>
+          </p:cNvPr>
+          <p:cNvSpPr/>
+          <p:nvPr/>
+        </p:nvSpPr>
+        <p:spPr>
+          <a:xfrm>
+            <a:off x="10439400" y="365125"/>
+            <a:ext cx="914400" cy="398649"/>
+          </a:xfrm>
+          <a:prstGeom prst="ellipse">
+            <a:avLst/>
+          </a:prstGeom>
+        </p:spPr>
+        <p:style>
+          <a:lnRef idx="2">
+            <a:schemeClr val="dk1"/>
+          </a:lnRef>
+          <a:fillRef idx="1">
+            <a:schemeClr val="lt1"/>
+          </a:fillRef>
+          <a:effectRef idx="0">
+            <a:schemeClr val="dk1"/>
+          </a:effectRef>
+          <a:fontRef idx="minor">
+            <a:schemeClr val="dk1"/>
+          </a:fontRef>
+        </p:style>
+        <p:txBody>
+          <a:bodyPr rtlCol="0" anchor="ctr"/>
+          <a:lstStyle/>
+          <a:p>
+            <a:pPr algn="ctr"/>
+            <a:r>
+              <a:rPr lang="en-US" dirty="0" err="1"/>
+              <a:t>StS</a:t>
+            </a:r>
+            <a:endParaRPr lang="en-US" dirty="0"/>
           </a:p>
         </p:txBody>
       </p:sp>

</xml_diff>

<commit_message>
Steve adds his slides to presentation
</commit_message>
<xml_diff>
--- a/Documents/May Presentation.pptx
+++ b/Documents/May Presentation.pptx
@@ -10,14 +10,15 @@
     <p:sldId id="262" r:id="rId4"/>
     <p:sldId id="263" r:id="rId5"/>
     <p:sldId id="264" r:id="rId6"/>
-    <p:sldId id="265" r:id="rId7"/>
-    <p:sldId id="266" r:id="rId8"/>
-    <p:sldId id="267" r:id="rId9"/>
-    <p:sldId id="268" r:id="rId10"/>
-    <p:sldId id="269" r:id="rId11"/>
-    <p:sldId id="260" r:id="rId12"/>
-    <p:sldId id="257" r:id="rId13"/>
-    <p:sldId id="258" r:id="rId14"/>
+    <p:sldId id="270" r:id="rId7"/>
+    <p:sldId id="271" r:id="rId8"/>
+    <p:sldId id="272" r:id="rId9"/>
+    <p:sldId id="273" r:id="rId10"/>
+    <p:sldId id="274" r:id="rId11"/>
+    <p:sldId id="275" r:id="rId12"/>
+    <p:sldId id="260" r:id="rId13"/>
+    <p:sldId id="257" r:id="rId14"/>
+    <p:sldId id="258" r:id="rId15"/>
   </p:sldIdLst>
   <p:sldSz cx="12192000" cy="6858000"/>
   <p:notesSz cx="6858000" cy="9144000"/>
@@ -128,12 +129,99 @@
 <p1510:revInfo xmlns:a="http://schemas.openxmlformats.org/drawingml/2006/main" xmlns:r="http://schemas.openxmlformats.org/officeDocument/2006/relationships" xmlns:p1510="http://schemas.microsoft.com/office/powerpoint/2015/10/main">
   <p1510:revLst>
     <p1510:client id="{08E1F6C1-C973-4F1F-92EE-AF2BB4FE6616}" v="21" dt="2025-04-30T00:47:23.125"/>
+    <p1510:client id="{611A5EE7-913C-4136-9425-FBE7D3E93282}" v="1" dt="2025-04-30T20:50:53.072"/>
   </p1510:revLst>
 </p1510:revInfo>
 </file>
 
 <file path=ppt/changesInfos/changesInfo1.xml><?xml version="1.0" encoding="utf-8"?>
 <pc:chgInfo xmlns:a="http://schemas.openxmlformats.org/drawingml/2006/main" xmlns:r="http://schemas.openxmlformats.org/officeDocument/2006/relationships" xmlns:ac="http://schemas.microsoft.com/office/drawing/2013/main/command" xmlns:pc="http://schemas.microsoft.com/office/powerpoint/2013/main/command">
+  <pc:docChgLst>
+    <pc:chgData name="Steve Swartz" userId="fa5fbd6ce30e021b" providerId="LiveId" clId="{611A5EE7-913C-4136-9425-FBE7D3E93282}"/>
+    <pc:docChg chg="addSld delSld modSld">
+      <pc:chgData name="Steve Swartz" userId="fa5fbd6ce30e021b" providerId="LiveId" clId="{611A5EE7-913C-4136-9425-FBE7D3E93282}" dt="2025-04-30T20:51:02.615" v="1" actId="47"/>
+      <pc:docMkLst>
+        <pc:docMk/>
+      </pc:docMkLst>
+      <pc:sldChg chg="del">
+        <pc:chgData name="Steve Swartz" userId="fa5fbd6ce30e021b" providerId="LiveId" clId="{611A5EE7-913C-4136-9425-FBE7D3E93282}" dt="2025-04-30T20:51:02.615" v="1" actId="47"/>
+        <pc:sldMkLst>
+          <pc:docMk/>
+          <pc:sldMk cId="4014904213" sldId="265"/>
+        </pc:sldMkLst>
+      </pc:sldChg>
+      <pc:sldChg chg="del">
+        <pc:chgData name="Steve Swartz" userId="fa5fbd6ce30e021b" providerId="LiveId" clId="{611A5EE7-913C-4136-9425-FBE7D3E93282}" dt="2025-04-30T20:51:02.615" v="1" actId="47"/>
+        <pc:sldMkLst>
+          <pc:docMk/>
+          <pc:sldMk cId="3672255520" sldId="266"/>
+        </pc:sldMkLst>
+      </pc:sldChg>
+      <pc:sldChg chg="del">
+        <pc:chgData name="Steve Swartz" userId="fa5fbd6ce30e021b" providerId="LiveId" clId="{611A5EE7-913C-4136-9425-FBE7D3E93282}" dt="2025-04-30T20:51:02.615" v="1" actId="47"/>
+        <pc:sldMkLst>
+          <pc:docMk/>
+          <pc:sldMk cId="367996804" sldId="267"/>
+        </pc:sldMkLst>
+      </pc:sldChg>
+      <pc:sldChg chg="del">
+        <pc:chgData name="Steve Swartz" userId="fa5fbd6ce30e021b" providerId="LiveId" clId="{611A5EE7-913C-4136-9425-FBE7D3E93282}" dt="2025-04-30T20:51:02.615" v="1" actId="47"/>
+        <pc:sldMkLst>
+          <pc:docMk/>
+          <pc:sldMk cId="701201403" sldId="268"/>
+        </pc:sldMkLst>
+      </pc:sldChg>
+      <pc:sldChg chg="del">
+        <pc:chgData name="Steve Swartz" userId="fa5fbd6ce30e021b" providerId="LiveId" clId="{611A5EE7-913C-4136-9425-FBE7D3E93282}" dt="2025-04-30T20:51:02.615" v="1" actId="47"/>
+        <pc:sldMkLst>
+          <pc:docMk/>
+          <pc:sldMk cId="4265348810" sldId="269"/>
+        </pc:sldMkLst>
+      </pc:sldChg>
+      <pc:sldChg chg="add">
+        <pc:chgData name="Steve Swartz" userId="fa5fbd6ce30e021b" providerId="LiveId" clId="{611A5EE7-913C-4136-9425-FBE7D3E93282}" dt="2025-04-30T20:50:53.059" v="0"/>
+        <pc:sldMkLst>
+          <pc:docMk/>
+          <pc:sldMk cId="614610062" sldId="270"/>
+        </pc:sldMkLst>
+      </pc:sldChg>
+      <pc:sldChg chg="add">
+        <pc:chgData name="Steve Swartz" userId="fa5fbd6ce30e021b" providerId="LiveId" clId="{611A5EE7-913C-4136-9425-FBE7D3E93282}" dt="2025-04-30T20:50:53.059" v="0"/>
+        <pc:sldMkLst>
+          <pc:docMk/>
+          <pc:sldMk cId="2392400975" sldId="271"/>
+        </pc:sldMkLst>
+      </pc:sldChg>
+      <pc:sldChg chg="add">
+        <pc:chgData name="Steve Swartz" userId="fa5fbd6ce30e021b" providerId="LiveId" clId="{611A5EE7-913C-4136-9425-FBE7D3E93282}" dt="2025-04-30T20:50:53.059" v="0"/>
+        <pc:sldMkLst>
+          <pc:docMk/>
+          <pc:sldMk cId="3235861235" sldId="272"/>
+        </pc:sldMkLst>
+      </pc:sldChg>
+      <pc:sldChg chg="add">
+        <pc:chgData name="Steve Swartz" userId="fa5fbd6ce30e021b" providerId="LiveId" clId="{611A5EE7-913C-4136-9425-FBE7D3E93282}" dt="2025-04-30T20:50:53.059" v="0"/>
+        <pc:sldMkLst>
+          <pc:docMk/>
+          <pc:sldMk cId="212396472" sldId="273"/>
+        </pc:sldMkLst>
+      </pc:sldChg>
+      <pc:sldChg chg="add">
+        <pc:chgData name="Steve Swartz" userId="fa5fbd6ce30e021b" providerId="LiveId" clId="{611A5EE7-913C-4136-9425-FBE7D3E93282}" dt="2025-04-30T20:50:53.059" v="0"/>
+        <pc:sldMkLst>
+          <pc:docMk/>
+          <pc:sldMk cId="578600240" sldId="274"/>
+        </pc:sldMkLst>
+      </pc:sldChg>
+      <pc:sldChg chg="add">
+        <pc:chgData name="Steve Swartz" userId="fa5fbd6ce30e021b" providerId="LiveId" clId="{611A5EE7-913C-4136-9425-FBE7D3E93282}" dt="2025-04-30T20:50:53.059" v="0"/>
+        <pc:sldMkLst>
+          <pc:docMk/>
+          <pc:sldMk cId="930106469" sldId="275"/>
+        </pc:sldMkLst>
+      </pc:sldChg>
+    </pc:docChg>
+  </pc:docChgLst>
   <pc:docChgLst>
     <pc:chgData name="Steve Swartz" userId="fa5fbd6ce30e021b" providerId="LiveId" clId="{08E1F6C1-C973-4F1F-92EE-AF2BB4FE6616}"/>
     <pc:docChg chg="undo custSel addSld delSld modSld">
@@ -698,7 +786,7 @@
           <a:p>
             <a:fld id="{F36F61C0-5178-44D8-8269-00E6008AF246}" type="datetimeFigureOut">
               <a:rPr lang="en-US" smtClean="0"/>
-              <a:t>4/29/2025</a:t>
+              <a:t>4/30/2025</a:t>
             </a:fld>
             <a:endParaRPr lang="en-US"/>
           </a:p>
@@ -896,7 +984,7 @@
           <a:p>
             <a:fld id="{F36F61C0-5178-44D8-8269-00E6008AF246}" type="datetimeFigureOut">
               <a:rPr lang="en-US" smtClean="0"/>
-              <a:t>4/29/2025</a:t>
+              <a:t>4/30/2025</a:t>
             </a:fld>
             <a:endParaRPr lang="en-US"/>
           </a:p>
@@ -1104,7 +1192,7 @@
           <a:p>
             <a:fld id="{F36F61C0-5178-44D8-8269-00E6008AF246}" type="datetimeFigureOut">
               <a:rPr lang="en-US" smtClean="0"/>
-              <a:t>4/29/2025</a:t>
+              <a:t>4/30/2025</a:t>
             </a:fld>
             <a:endParaRPr lang="en-US"/>
           </a:p>
@@ -1302,7 +1390,7 @@
           <a:p>
             <a:fld id="{F36F61C0-5178-44D8-8269-00E6008AF246}" type="datetimeFigureOut">
               <a:rPr lang="en-US" smtClean="0"/>
-              <a:t>4/29/2025</a:t>
+              <a:t>4/30/2025</a:t>
             </a:fld>
             <a:endParaRPr lang="en-US"/>
           </a:p>
@@ -1577,7 +1665,7 @@
           <a:p>
             <a:fld id="{F36F61C0-5178-44D8-8269-00E6008AF246}" type="datetimeFigureOut">
               <a:rPr lang="en-US" smtClean="0"/>
-              <a:t>4/29/2025</a:t>
+              <a:t>4/30/2025</a:t>
             </a:fld>
             <a:endParaRPr lang="en-US"/>
           </a:p>
@@ -1842,7 +1930,7 @@
           <a:p>
             <a:fld id="{F36F61C0-5178-44D8-8269-00E6008AF246}" type="datetimeFigureOut">
               <a:rPr lang="en-US" smtClean="0"/>
-              <a:t>4/29/2025</a:t>
+              <a:t>4/30/2025</a:t>
             </a:fld>
             <a:endParaRPr lang="en-US"/>
           </a:p>
@@ -2254,7 +2342,7 @@
           <a:p>
             <a:fld id="{F36F61C0-5178-44D8-8269-00E6008AF246}" type="datetimeFigureOut">
               <a:rPr lang="en-US" smtClean="0"/>
-              <a:t>4/29/2025</a:t>
+              <a:t>4/30/2025</a:t>
             </a:fld>
             <a:endParaRPr lang="en-US"/>
           </a:p>
@@ -2395,7 +2483,7 @@
           <a:p>
             <a:fld id="{F36F61C0-5178-44D8-8269-00E6008AF246}" type="datetimeFigureOut">
               <a:rPr lang="en-US" smtClean="0"/>
-              <a:t>4/29/2025</a:t>
+              <a:t>4/30/2025</a:t>
             </a:fld>
             <a:endParaRPr lang="en-US"/>
           </a:p>
@@ -2508,7 +2596,7 @@
           <a:p>
             <a:fld id="{F36F61C0-5178-44D8-8269-00E6008AF246}" type="datetimeFigureOut">
               <a:rPr lang="en-US" smtClean="0"/>
-              <a:t>4/29/2025</a:t>
+              <a:t>4/30/2025</a:t>
             </a:fld>
             <a:endParaRPr lang="en-US"/>
           </a:p>
@@ -2819,7 +2907,7 @@
           <a:p>
             <a:fld id="{F36F61C0-5178-44D8-8269-00E6008AF246}" type="datetimeFigureOut">
               <a:rPr lang="en-US" smtClean="0"/>
-              <a:t>4/29/2025</a:t>
+              <a:t>4/30/2025</a:t>
             </a:fld>
             <a:endParaRPr lang="en-US"/>
           </a:p>
@@ -3107,7 +3195,7 @@
           <a:p>
             <a:fld id="{F36F61C0-5178-44D8-8269-00E6008AF246}" type="datetimeFigureOut">
               <a:rPr lang="en-US" smtClean="0"/>
-              <a:t>4/29/2025</a:t>
+              <a:t>4/30/2025</a:t>
             </a:fld>
             <a:endParaRPr lang="en-US"/>
           </a:p>
@@ -3348,7 +3436,7 @@
           <a:p>
             <a:fld id="{F36F61C0-5178-44D8-8269-00E6008AF246}" type="datetimeFigureOut">
               <a:rPr lang="en-US" smtClean="0"/>
-              <a:t>4/29/2025</a:t>
+              <a:t>4/30/2025</a:t>
             </a:fld>
             <a:endParaRPr lang="en-US"/>
           </a:p>
@@ -3884,7 +3972,7 @@
           <p:cNvPr id="2" name="Title 1">
             <a:extLst>
               <a:ext uri="{FF2B5EF4-FFF2-40B4-BE49-F238E27FC236}">
-                <a16:creationId xmlns:a16="http://schemas.microsoft.com/office/drawing/2014/main" id="{9E6B45E6-120E-2C4D-861A-96D44A89CBC7}"/>
+                <a16:creationId xmlns:a16="http://schemas.microsoft.com/office/drawing/2014/main" id="{CEAB25EE-6E11-B86E-B9EF-313E7FAB791D}"/>
               </a:ext>
             </a:extLst>
           </p:cNvPr>
@@ -3902,7 +3990,7 @@
           <a:p>
             <a:r>
               <a:rPr lang="en-US" dirty="0"/>
-              <a:t>Kudos</a:t>
+              <a:t>Benefits</a:t>
             </a:r>
           </a:p>
         </p:txBody>
@@ -3912,7 +4000,7 @@
           <p:cNvPr id="3" name="Content Placeholder 2">
             <a:extLst>
               <a:ext uri="{FF2B5EF4-FFF2-40B4-BE49-F238E27FC236}">
-                <a16:creationId xmlns:a16="http://schemas.microsoft.com/office/drawing/2014/main" id="{35B0B24F-B204-F96F-1B17-0AB4907A94D4}"/>
+                <a16:creationId xmlns:a16="http://schemas.microsoft.com/office/drawing/2014/main" id="{35E608CF-F493-CC37-E424-9B2044833213}"/>
               </a:ext>
             </a:extLst>
           </p:cNvPr>
@@ -3928,62 +4016,43 @@
           <a:bodyPr/>
           <a:lstStyle/>
           <a:p>
-            <a:endParaRPr lang="en-US"/>
-          </a:p>
-        </p:txBody>
-      </p:sp>
-      <p:sp>
-        <p:nvSpPr>
-          <p:cNvPr id="4" name="Oval 3">
-            <a:extLst>
-              <a:ext uri="{FF2B5EF4-FFF2-40B4-BE49-F238E27FC236}">
-                <a16:creationId xmlns:a16="http://schemas.microsoft.com/office/drawing/2014/main" id="{93D7153A-DCC9-EBB7-366F-7A626241F935}"/>
-              </a:ext>
-            </a:extLst>
-          </p:cNvPr>
-          <p:cNvSpPr/>
-          <p:nvPr/>
-        </p:nvSpPr>
-        <p:spPr>
-          <a:xfrm>
-            <a:off x="10439400" y="365125"/>
-            <a:ext cx="914400" cy="398649"/>
-          </a:xfrm>
-          <a:prstGeom prst="ellipse">
-            <a:avLst/>
-          </a:prstGeom>
-        </p:spPr>
-        <p:style>
-          <a:lnRef idx="2">
-            <a:schemeClr val="dk1"/>
-          </a:lnRef>
-          <a:fillRef idx="1">
-            <a:schemeClr val="lt1"/>
-          </a:fillRef>
-          <a:effectRef idx="0">
-            <a:schemeClr val="dk1"/>
-          </a:effectRef>
-          <a:fontRef idx="minor">
-            <a:schemeClr val="dk1"/>
-          </a:fontRef>
-        </p:style>
-        <p:txBody>
-          <a:bodyPr rtlCol="0" anchor="ctr"/>
-          <a:lstStyle/>
-          <a:p>
-            <a:pPr algn="ctr"/>
-            <a:r>
-              <a:rPr lang="en-US" dirty="0" err="1"/>
-              <a:t>StS</a:t>
-            </a:r>
-            <a:endParaRPr lang="en-US" dirty="0"/>
+            <a:r>
+              <a:rPr lang="en-US" dirty="0"/>
+              <a:t>Simple discussable way to test assumptions, alternatives</a:t>
+            </a:r>
+          </a:p>
+          <a:p>
+            <a:pPr lvl="1"/>
+            <a:r>
+              <a:rPr lang="en-US" dirty="0"/>
+              <a:t>Analysis can be updated as assumptions are tested</a:t>
+            </a:r>
+          </a:p>
+          <a:p>
+            <a:pPr lvl="1"/>
+            <a:r>
+              <a:rPr lang="en-US" dirty="0"/>
+              <a:t>Often analysis will identify nearly cost-free changes</a:t>
+            </a:r>
+          </a:p>
+          <a:p>
+            <a:r>
+              <a:rPr lang="en-US" dirty="0"/>
+              <a:t>Includes players other than power companies</a:t>
+            </a:r>
+          </a:p>
+          <a:p>
+            <a:r>
+              <a:rPr lang="en-US" dirty="0"/>
+              <a:t>Safeguards coastal communities, economic interests, </a:t>
+            </a:r>
           </a:p>
         </p:txBody>
       </p:sp>
     </p:spTree>
     <p:extLst>
       <p:ext uri="{BB962C8B-B14F-4D97-AF65-F5344CB8AC3E}">
-        <p14:creationId xmlns:p14="http://schemas.microsoft.com/office/powerpoint/2010/main" val="4265348810"/>
+        <p14:creationId xmlns:p14="http://schemas.microsoft.com/office/powerpoint/2010/main" val="578600240"/>
       </p:ext>
     </p:extLst>
   </p:cSld>
@@ -3994,6 +4063,98 @@
 </file>
 
 <file path=ppt/slides/slide11.xml><?xml version="1.0" encoding="utf-8"?>
+<p:sld xmlns:a="http://schemas.openxmlformats.org/drawingml/2006/main" xmlns:r="http://schemas.openxmlformats.org/officeDocument/2006/relationships" xmlns:p="http://schemas.openxmlformats.org/presentationml/2006/main">
+  <p:cSld>
+    <p:spTree>
+      <p:nvGrpSpPr>
+        <p:cNvPr id="1" name=""/>
+        <p:cNvGrpSpPr/>
+        <p:nvPr/>
+      </p:nvGrpSpPr>
+      <p:grpSpPr>
+        <a:xfrm>
+          <a:off x="0" y="0"/>
+          <a:ext cx="0" cy="0"/>
+          <a:chOff x="0" y="0"/>
+          <a:chExt cx="0" cy="0"/>
+        </a:xfrm>
+      </p:grpSpPr>
+      <p:sp>
+        <p:nvSpPr>
+          <p:cNvPr id="2" name="Title 1">
+            <a:extLst>
+              <a:ext uri="{FF2B5EF4-FFF2-40B4-BE49-F238E27FC236}">
+                <a16:creationId xmlns:a16="http://schemas.microsoft.com/office/drawing/2014/main" id="{9E6B45E6-120E-2C4D-861A-96D44A89CBC7}"/>
+              </a:ext>
+            </a:extLst>
+          </p:cNvPr>
+          <p:cNvSpPr>
+            <a:spLocks noGrp="1"/>
+          </p:cNvSpPr>
+          <p:nvPr>
+            <p:ph type="title"/>
+          </p:nvPr>
+        </p:nvSpPr>
+        <p:spPr/>
+        <p:txBody>
+          <a:bodyPr/>
+          <a:lstStyle/>
+          <a:p>
+            <a:r>
+              <a:rPr lang="en-US" dirty="0"/>
+              <a:t>Kudos</a:t>
+            </a:r>
+          </a:p>
+        </p:txBody>
+      </p:sp>
+      <p:sp>
+        <p:nvSpPr>
+          <p:cNvPr id="3" name="Content Placeholder 2">
+            <a:extLst>
+              <a:ext uri="{FF2B5EF4-FFF2-40B4-BE49-F238E27FC236}">
+                <a16:creationId xmlns:a16="http://schemas.microsoft.com/office/drawing/2014/main" id="{35B0B24F-B204-F96F-1B17-0AB4907A94D4}"/>
+              </a:ext>
+            </a:extLst>
+          </p:cNvPr>
+          <p:cNvSpPr>
+            <a:spLocks noGrp="1"/>
+          </p:cNvSpPr>
+          <p:nvPr>
+            <p:ph idx="1"/>
+          </p:nvPr>
+        </p:nvSpPr>
+        <p:spPr/>
+        <p:txBody>
+          <a:bodyPr/>
+          <a:lstStyle/>
+          <a:p>
+            <a:r>
+              <a:rPr lang="en-US" dirty="0"/>
+              <a:t>James and Zech, for helping seed our bibliographic research</a:t>
+            </a:r>
+          </a:p>
+          <a:p>
+            <a:r>
+              <a:rPr lang="en-US" dirty="0"/>
+              <a:t>Classmates for useful feedback</a:t>
+            </a:r>
+          </a:p>
+        </p:txBody>
+      </p:sp>
+    </p:spTree>
+    <p:extLst>
+      <p:ext uri="{BB962C8B-B14F-4D97-AF65-F5344CB8AC3E}">
+        <p14:creationId xmlns:p14="http://schemas.microsoft.com/office/powerpoint/2010/main" val="930106469"/>
+      </p:ext>
+    </p:extLst>
+  </p:cSld>
+  <p:clrMapOvr>
+    <a:masterClrMapping/>
+  </p:clrMapOvr>
+</p:sld>
+</file>
+
+<file path=ppt/slides/slide12.xml><?xml version="1.0" encoding="utf-8"?>
 <p:sld xmlns:a="http://schemas.openxmlformats.org/drawingml/2006/main" xmlns:r="http://schemas.openxmlformats.org/officeDocument/2006/relationships" xmlns:p="http://schemas.openxmlformats.org/presentationml/2006/main">
   <p:cSld>
     <p:spTree>
@@ -4170,7 +4331,7 @@
 </p:sld>
 </file>
 
-<file path=ppt/slides/slide12.xml><?xml version="1.0" encoding="utf-8"?>
+<file path=ppt/slides/slide13.xml><?xml version="1.0" encoding="utf-8"?>
 <p:sld xmlns:a="http://schemas.openxmlformats.org/drawingml/2006/main" xmlns:r="http://schemas.openxmlformats.org/officeDocument/2006/relationships" xmlns:p="http://schemas.openxmlformats.org/presentationml/2006/main" show="0">
   <p:cSld>
     <p:spTree>
@@ -4353,7 +4514,7 @@
 </p:sld>
 </file>
 
-<file path=ppt/slides/slide13.xml><?xml version="1.0" encoding="utf-8"?>
+<file path=ppt/slides/slide14.xml><?xml version="1.0" encoding="utf-8"?>
 <p:sld xmlns:a="http://schemas.openxmlformats.org/drawingml/2006/main" xmlns:r="http://schemas.openxmlformats.org/officeDocument/2006/relationships" xmlns:p="http://schemas.openxmlformats.org/presentationml/2006/main" show="0">
   <p:cSld>
     <p:spTree>
@@ -5096,83 +5257,807 @@
           </a:p>
         </p:txBody>
       </p:sp>
-      <p:sp>
-        <p:nvSpPr>
-          <p:cNvPr id="3" name="Content Placeholder 2">
-            <a:extLst>
-              <a:ext uri="{FF2B5EF4-FFF2-40B4-BE49-F238E27FC236}">
-                <a16:creationId xmlns:a16="http://schemas.microsoft.com/office/drawing/2014/main" id="{CCC3225C-AC83-90D0-9BAA-C88DF16DF06C}"/>
-              </a:ext>
-            </a:extLst>
-          </p:cNvPr>
-          <p:cNvSpPr>
-            <a:spLocks noGrp="1"/>
-          </p:cNvSpPr>
-          <p:nvPr>
-            <p:ph idx="1"/>
-          </p:nvPr>
-        </p:nvSpPr>
-        <p:spPr/>
-        <p:txBody>
-          <a:bodyPr/>
-          <a:lstStyle/>
-          <a:p>
-            <a:endParaRPr lang="en-US"/>
-          </a:p>
-        </p:txBody>
-      </p:sp>
-      <p:sp>
-        <p:nvSpPr>
-          <p:cNvPr id="4" name="Oval 3">
-            <a:extLst>
-              <a:ext uri="{FF2B5EF4-FFF2-40B4-BE49-F238E27FC236}">
-                <a16:creationId xmlns:a16="http://schemas.microsoft.com/office/drawing/2014/main" id="{A910FAF8-BE86-090B-145E-977C585E43B9}"/>
-              </a:ext>
-            </a:extLst>
-          </p:cNvPr>
-          <p:cNvSpPr/>
+      <p:grpSp>
+        <p:nvGrpSpPr>
+          <p:cNvPr id="16" name="Group 15">
+            <a:extLst>
+              <a:ext uri="{FF2B5EF4-FFF2-40B4-BE49-F238E27FC236}">
+                <a16:creationId xmlns:a16="http://schemas.microsoft.com/office/drawing/2014/main" id="{24B534C9-CE07-0200-3092-78F787EC1601}"/>
+              </a:ext>
+            </a:extLst>
+          </p:cNvPr>
+          <p:cNvGrpSpPr/>
           <p:nvPr/>
-        </p:nvSpPr>
+        </p:nvGrpSpPr>
+        <p:grpSpPr>
+          <a:xfrm>
+            <a:off x="1934703" y="2169763"/>
+            <a:ext cx="8322593" cy="3117741"/>
+            <a:chOff x="728419" y="2216258"/>
+            <a:chExt cx="8322593" cy="3117741"/>
+          </a:xfrm>
+        </p:grpSpPr>
+        <p:grpSp>
+          <p:nvGrpSpPr>
+            <p:cNvPr id="9" name="Group 8">
+              <a:extLst>
+                <a:ext uri="{FF2B5EF4-FFF2-40B4-BE49-F238E27FC236}">
+                  <a16:creationId xmlns:a16="http://schemas.microsoft.com/office/drawing/2014/main" id="{FC911E8D-E273-4D4C-1B94-EFC0581413C9}"/>
+                </a:ext>
+              </a:extLst>
+            </p:cNvPr>
+            <p:cNvGrpSpPr/>
+            <p:nvPr/>
+          </p:nvGrpSpPr>
+          <p:grpSpPr>
+            <a:xfrm>
+              <a:off x="728419" y="2216258"/>
+              <a:ext cx="1565330" cy="3117741"/>
+              <a:chOff x="728419" y="2216258"/>
+              <a:chExt cx="1565330" cy="3117741"/>
+            </a:xfrm>
+          </p:grpSpPr>
+          <p:sp>
+            <p:nvSpPr>
+              <p:cNvPr id="5" name="Rectangle 4">
+                <a:extLst>
+                  <a:ext uri="{FF2B5EF4-FFF2-40B4-BE49-F238E27FC236}">
+                    <a16:creationId xmlns:a16="http://schemas.microsoft.com/office/drawing/2014/main" id="{E81D3DAF-A50B-4BD6-BB82-4FD657B23FF2}"/>
+                  </a:ext>
+                </a:extLst>
+              </p:cNvPr>
+              <p:cNvSpPr/>
+              <p:nvPr/>
+            </p:nvSpPr>
+            <p:spPr>
+              <a:xfrm>
+                <a:off x="728420" y="2216258"/>
+                <a:ext cx="1565329" cy="937647"/>
+              </a:xfrm>
+              <a:prstGeom prst="rect">
+                <a:avLst/>
+              </a:prstGeom>
+            </p:spPr>
+            <p:style>
+              <a:lnRef idx="2">
+                <a:schemeClr val="dk1"/>
+              </a:lnRef>
+              <a:fillRef idx="1">
+                <a:schemeClr val="lt1"/>
+              </a:fillRef>
+              <a:effectRef idx="0">
+                <a:schemeClr val="dk1"/>
+              </a:effectRef>
+              <a:fontRef idx="minor">
+                <a:schemeClr val="dk1"/>
+              </a:fontRef>
+            </p:style>
+            <p:txBody>
+              <a:bodyPr rtlCol="0" anchor="ctr"/>
+              <a:lstStyle/>
+              <a:p>
+                <a:pPr algn="ctr"/>
+                <a:r>
+                  <a:rPr lang="en-US" sz="1400" dirty="0"/>
+                  <a:t>Wind </a:t>
+                </a:r>
+                <a:r>
+                  <a:rPr lang="en-US" sz="1400" dirty="0" err="1"/>
+                  <a:t>Datasource</a:t>
+                </a:r>
+                <a:endParaRPr lang="en-US" sz="1400" dirty="0"/>
+              </a:p>
+            </p:txBody>
+          </p:sp>
+          <p:sp>
+            <p:nvSpPr>
+              <p:cNvPr id="6" name="Rectangle 5">
+                <a:extLst>
+                  <a:ext uri="{FF2B5EF4-FFF2-40B4-BE49-F238E27FC236}">
+                    <a16:creationId xmlns:a16="http://schemas.microsoft.com/office/drawing/2014/main" id="{7B7619F4-8179-8C03-5277-ADBE304FB873}"/>
+                  </a:ext>
+                </a:extLst>
+              </p:cNvPr>
+              <p:cNvSpPr/>
+              <p:nvPr/>
+            </p:nvSpPr>
+            <p:spPr>
+              <a:xfrm>
+                <a:off x="728419" y="3306305"/>
+                <a:ext cx="1565329" cy="937647"/>
+              </a:xfrm>
+              <a:prstGeom prst="rect">
+                <a:avLst/>
+              </a:prstGeom>
+            </p:spPr>
+            <p:style>
+              <a:lnRef idx="2">
+                <a:schemeClr val="dk1"/>
+              </a:lnRef>
+              <a:fillRef idx="1">
+                <a:schemeClr val="lt1"/>
+              </a:fillRef>
+              <a:effectRef idx="0">
+                <a:schemeClr val="dk1"/>
+              </a:effectRef>
+              <a:fontRef idx="minor">
+                <a:schemeClr val="dk1"/>
+              </a:fontRef>
+            </p:style>
+            <p:txBody>
+              <a:bodyPr rtlCol="0" anchor="ctr"/>
+              <a:lstStyle/>
+              <a:p>
+                <a:pPr algn="ctr"/>
+                <a:r>
+                  <a:rPr lang="en-US" sz="1400" dirty="0"/>
+                  <a:t>Fisheries </a:t>
+                </a:r>
+                <a:r>
+                  <a:rPr lang="en-US" sz="1400" dirty="0" err="1"/>
+                  <a:t>Datasource</a:t>
+                </a:r>
+                <a:endParaRPr lang="en-US" sz="1400" dirty="0"/>
+              </a:p>
+            </p:txBody>
+          </p:sp>
+          <p:sp>
+            <p:nvSpPr>
+              <p:cNvPr id="7" name="Rectangle 6">
+                <a:extLst>
+                  <a:ext uri="{FF2B5EF4-FFF2-40B4-BE49-F238E27FC236}">
+                    <a16:creationId xmlns:a16="http://schemas.microsoft.com/office/drawing/2014/main" id="{FF1501CA-A119-2C96-7E04-5CA2DBE279D0}"/>
+                  </a:ext>
+                </a:extLst>
+              </p:cNvPr>
+              <p:cNvSpPr/>
+              <p:nvPr/>
+            </p:nvSpPr>
+            <p:spPr>
+              <a:xfrm>
+                <a:off x="728419" y="4396352"/>
+                <a:ext cx="1565329" cy="937647"/>
+              </a:xfrm>
+              <a:prstGeom prst="rect">
+                <a:avLst/>
+              </a:prstGeom>
+            </p:spPr>
+            <p:style>
+              <a:lnRef idx="2">
+                <a:schemeClr val="dk1"/>
+              </a:lnRef>
+              <a:fillRef idx="1">
+                <a:schemeClr val="lt1"/>
+              </a:fillRef>
+              <a:effectRef idx="0">
+                <a:schemeClr val="dk1"/>
+              </a:effectRef>
+              <a:fontRef idx="minor">
+                <a:schemeClr val="dk1"/>
+              </a:fontRef>
+            </p:style>
+            <p:txBody>
+              <a:bodyPr rtlCol="0" anchor="ctr"/>
+              <a:lstStyle/>
+              <a:p>
+                <a:pPr algn="ctr"/>
+                <a:r>
+                  <a:rPr lang="en-US" sz="1400" dirty="0"/>
+                  <a:t>Other Sectors</a:t>
+                </a:r>
+              </a:p>
+            </p:txBody>
+          </p:sp>
+        </p:grpSp>
+        <p:grpSp>
+          <p:nvGrpSpPr>
+            <p:cNvPr id="12" name="Group 11">
+              <a:extLst>
+                <a:ext uri="{FF2B5EF4-FFF2-40B4-BE49-F238E27FC236}">
+                  <a16:creationId xmlns:a16="http://schemas.microsoft.com/office/drawing/2014/main" id="{B6762288-5C5D-0F69-FB35-A52BEF359673}"/>
+                </a:ext>
+              </a:extLst>
+            </p:cNvPr>
+            <p:cNvGrpSpPr/>
+            <p:nvPr/>
+          </p:nvGrpSpPr>
+          <p:grpSpPr>
+            <a:xfrm>
+              <a:off x="2944678" y="2216258"/>
+              <a:ext cx="1038386" cy="3117740"/>
+              <a:chOff x="2944678" y="2216258"/>
+              <a:chExt cx="1038386" cy="3117740"/>
+            </a:xfrm>
+          </p:grpSpPr>
+          <p:sp>
+            <p:nvSpPr>
+              <p:cNvPr id="8" name="Rectangle 7">
+                <a:extLst>
+                  <a:ext uri="{FF2B5EF4-FFF2-40B4-BE49-F238E27FC236}">
+                    <a16:creationId xmlns:a16="http://schemas.microsoft.com/office/drawing/2014/main" id="{838E140E-2946-C272-8EB8-181667F1C66E}"/>
+                  </a:ext>
+                </a:extLst>
+              </p:cNvPr>
+              <p:cNvSpPr/>
+              <p:nvPr/>
+            </p:nvSpPr>
+            <p:spPr>
+              <a:xfrm>
+                <a:off x="2944678" y="2216258"/>
+                <a:ext cx="1038386" cy="937647"/>
+              </a:xfrm>
+              <a:prstGeom prst="rect">
+                <a:avLst/>
+              </a:prstGeom>
+            </p:spPr>
+            <p:style>
+              <a:lnRef idx="2">
+                <a:schemeClr val="dk1"/>
+              </a:lnRef>
+              <a:fillRef idx="1">
+                <a:schemeClr val="lt1"/>
+              </a:fillRef>
+              <a:effectRef idx="0">
+                <a:schemeClr val="dk1"/>
+              </a:effectRef>
+              <a:fontRef idx="minor">
+                <a:schemeClr val="dk1"/>
+              </a:fontRef>
+            </p:style>
+            <p:txBody>
+              <a:bodyPr rtlCol="0" anchor="ctr"/>
+              <a:lstStyle/>
+              <a:p>
+                <a:pPr algn="ctr"/>
+                <a:r>
+                  <a:rPr lang="en-US" sz="1400" dirty="0"/>
+                  <a:t>Wrangling</a:t>
+                </a:r>
+              </a:p>
+            </p:txBody>
+          </p:sp>
+          <p:sp>
+            <p:nvSpPr>
+              <p:cNvPr id="10" name="Rectangle 9">
+                <a:extLst>
+                  <a:ext uri="{FF2B5EF4-FFF2-40B4-BE49-F238E27FC236}">
+                    <a16:creationId xmlns:a16="http://schemas.microsoft.com/office/drawing/2014/main" id="{84EBB55F-0645-A8DA-C4FD-7CB2B672A75D}"/>
+                  </a:ext>
+                </a:extLst>
+              </p:cNvPr>
+              <p:cNvSpPr/>
+              <p:nvPr/>
+            </p:nvSpPr>
+            <p:spPr>
+              <a:xfrm>
+                <a:off x="2944678" y="3306304"/>
+                <a:ext cx="1038386" cy="937647"/>
+              </a:xfrm>
+              <a:prstGeom prst="rect">
+                <a:avLst/>
+              </a:prstGeom>
+            </p:spPr>
+            <p:style>
+              <a:lnRef idx="2">
+                <a:schemeClr val="dk1"/>
+              </a:lnRef>
+              <a:fillRef idx="1">
+                <a:schemeClr val="lt1"/>
+              </a:fillRef>
+              <a:effectRef idx="0">
+                <a:schemeClr val="dk1"/>
+              </a:effectRef>
+              <a:fontRef idx="minor">
+                <a:schemeClr val="dk1"/>
+              </a:fontRef>
+            </p:style>
+            <p:txBody>
+              <a:bodyPr rtlCol="0" anchor="ctr"/>
+              <a:lstStyle/>
+              <a:p>
+                <a:pPr algn="ctr"/>
+                <a:r>
+                  <a:rPr lang="en-US" sz="1400" dirty="0"/>
+                  <a:t>Wrangling</a:t>
+                </a:r>
+              </a:p>
+            </p:txBody>
+          </p:sp>
+          <p:sp>
+            <p:nvSpPr>
+              <p:cNvPr id="11" name="Rectangle 10">
+                <a:extLst>
+                  <a:ext uri="{FF2B5EF4-FFF2-40B4-BE49-F238E27FC236}">
+                    <a16:creationId xmlns:a16="http://schemas.microsoft.com/office/drawing/2014/main" id="{1CF5B82B-A4FD-A830-3720-E0C9AF26D2BA}"/>
+                  </a:ext>
+                </a:extLst>
+              </p:cNvPr>
+              <p:cNvSpPr/>
+              <p:nvPr/>
+            </p:nvSpPr>
+            <p:spPr>
+              <a:xfrm>
+                <a:off x="2944678" y="4396351"/>
+                <a:ext cx="1038386" cy="937647"/>
+              </a:xfrm>
+              <a:prstGeom prst="rect">
+                <a:avLst/>
+              </a:prstGeom>
+            </p:spPr>
+            <p:style>
+              <a:lnRef idx="2">
+                <a:schemeClr val="dk1"/>
+              </a:lnRef>
+              <a:fillRef idx="1">
+                <a:schemeClr val="lt1"/>
+              </a:fillRef>
+              <a:effectRef idx="0">
+                <a:schemeClr val="dk1"/>
+              </a:effectRef>
+              <a:fontRef idx="minor">
+                <a:schemeClr val="dk1"/>
+              </a:fontRef>
+            </p:style>
+            <p:txBody>
+              <a:bodyPr rtlCol="0" anchor="ctr"/>
+              <a:lstStyle/>
+              <a:p>
+                <a:pPr algn="ctr"/>
+                <a:r>
+                  <a:rPr lang="en-US" sz="1400" dirty="0"/>
+                  <a:t>Wrangling</a:t>
+                </a:r>
+              </a:p>
+            </p:txBody>
+          </p:sp>
+        </p:grpSp>
+        <p:sp>
+          <p:nvSpPr>
+            <p:cNvPr id="13" name="Rectangle 12">
+              <a:extLst>
+                <a:ext uri="{FF2B5EF4-FFF2-40B4-BE49-F238E27FC236}">
+                  <a16:creationId xmlns:a16="http://schemas.microsoft.com/office/drawing/2014/main" id="{DC3F018D-8C9C-9B03-1B6D-81EB6BFDECD3}"/>
+                </a:ext>
+              </a:extLst>
+            </p:cNvPr>
+            <p:cNvSpPr/>
+            <p:nvPr/>
+          </p:nvSpPr>
+          <p:spPr>
+            <a:xfrm>
+              <a:off x="4633994" y="3306304"/>
+              <a:ext cx="1038386" cy="937647"/>
+            </a:xfrm>
+            <a:prstGeom prst="rect">
+              <a:avLst/>
+            </a:prstGeom>
+          </p:spPr>
+          <p:style>
+            <a:lnRef idx="2">
+              <a:schemeClr val="dk1"/>
+            </a:lnRef>
+            <a:fillRef idx="1">
+              <a:schemeClr val="lt1"/>
+            </a:fillRef>
+            <a:effectRef idx="0">
+              <a:schemeClr val="dk1"/>
+            </a:effectRef>
+            <a:fontRef idx="minor">
+              <a:schemeClr val="dk1"/>
+            </a:fontRef>
+          </p:style>
+          <p:txBody>
+            <a:bodyPr rtlCol="0" anchor="ctr"/>
+            <a:lstStyle/>
+            <a:p>
+              <a:pPr algn="ctr"/>
+              <a:r>
+                <a:rPr lang="en-US" sz="1400" dirty="0"/>
+                <a:t>Notebook</a:t>
+              </a:r>
+            </a:p>
+          </p:txBody>
+        </p:sp>
+        <p:sp>
+          <p:nvSpPr>
+            <p:cNvPr id="14" name="Rectangle 13">
+              <a:extLst>
+                <a:ext uri="{FF2B5EF4-FFF2-40B4-BE49-F238E27FC236}">
+                  <a16:creationId xmlns:a16="http://schemas.microsoft.com/office/drawing/2014/main" id="{6B9574B4-4591-E189-A6BA-E0A7B349CAD5}"/>
+                </a:ext>
+              </a:extLst>
+            </p:cNvPr>
+            <p:cNvSpPr/>
+            <p:nvPr/>
+          </p:nvSpPr>
+          <p:spPr>
+            <a:xfrm>
+              <a:off x="6323310" y="3306303"/>
+              <a:ext cx="1038386" cy="937647"/>
+            </a:xfrm>
+            <a:prstGeom prst="rect">
+              <a:avLst/>
+            </a:prstGeom>
+          </p:spPr>
+          <p:style>
+            <a:lnRef idx="2">
+              <a:schemeClr val="dk1"/>
+            </a:lnRef>
+            <a:fillRef idx="1">
+              <a:schemeClr val="lt1"/>
+            </a:fillRef>
+            <a:effectRef idx="0">
+              <a:schemeClr val="dk1"/>
+            </a:effectRef>
+            <a:fontRef idx="minor">
+              <a:schemeClr val="dk1"/>
+            </a:fontRef>
+          </p:style>
+          <p:txBody>
+            <a:bodyPr rtlCol="0" anchor="ctr"/>
+            <a:lstStyle/>
+            <a:p>
+              <a:pPr algn="ctr"/>
+              <a:r>
+                <a:rPr lang="en-US" sz="1400" dirty="0"/>
+                <a:t>Assess</a:t>
+              </a:r>
+            </a:p>
+          </p:txBody>
+        </p:sp>
+        <p:sp>
+          <p:nvSpPr>
+            <p:cNvPr id="15" name="Rectangle 14">
+              <a:extLst>
+                <a:ext uri="{FF2B5EF4-FFF2-40B4-BE49-F238E27FC236}">
+                  <a16:creationId xmlns:a16="http://schemas.microsoft.com/office/drawing/2014/main" id="{B6BDDE75-F975-9E72-F0C0-7A66C1350872}"/>
+                </a:ext>
+              </a:extLst>
+            </p:cNvPr>
+            <p:cNvSpPr/>
+            <p:nvPr/>
+          </p:nvSpPr>
+          <p:spPr>
+            <a:xfrm>
+              <a:off x="8012626" y="3303717"/>
+              <a:ext cx="1038386" cy="937647"/>
+            </a:xfrm>
+            <a:prstGeom prst="rect">
+              <a:avLst/>
+            </a:prstGeom>
+          </p:spPr>
+          <p:style>
+            <a:lnRef idx="2">
+              <a:schemeClr val="dk1"/>
+            </a:lnRef>
+            <a:fillRef idx="1">
+              <a:schemeClr val="lt1"/>
+            </a:fillRef>
+            <a:effectRef idx="0">
+              <a:schemeClr val="dk1"/>
+            </a:effectRef>
+            <a:fontRef idx="minor">
+              <a:schemeClr val="dk1"/>
+            </a:fontRef>
+          </p:style>
+          <p:txBody>
+            <a:bodyPr rtlCol="0" anchor="ctr"/>
+            <a:lstStyle/>
+            <a:p>
+              <a:pPr algn="ctr"/>
+              <a:r>
+                <a:rPr lang="en-US" sz="1400" dirty="0"/>
+                <a:t>Results</a:t>
+              </a:r>
+            </a:p>
+          </p:txBody>
+        </p:sp>
+      </p:grpSp>
+      <p:cxnSp>
+        <p:nvCxnSpPr>
+          <p:cNvPr id="18" name="Connector: Elbow 17">
+            <a:extLst>
+              <a:ext uri="{FF2B5EF4-FFF2-40B4-BE49-F238E27FC236}">
+                <a16:creationId xmlns:a16="http://schemas.microsoft.com/office/drawing/2014/main" id="{9393D35B-5EA7-0F8D-3FFF-05DD3DA681E8}"/>
+              </a:ext>
+            </a:extLst>
+          </p:cNvPr>
+          <p:cNvCxnSpPr>
+            <a:stCxn id="8" idx="3"/>
+            <a:endCxn id="13" idx="1"/>
+          </p:cNvCxnSpPr>
+          <p:nvPr/>
+        </p:nvCxnSpPr>
         <p:spPr>
           <a:xfrm>
-            <a:off x="10439400" y="365125"/>
-            <a:ext cx="914400" cy="398649"/>
+            <a:off x="5189348" y="2638587"/>
+            <a:ext cx="650930" cy="1090046"/>
           </a:xfrm>
-          <a:prstGeom prst="ellipse">
+          <a:prstGeom prst="bentConnector3">
             <a:avLst/>
           </a:prstGeom>
+          <a:ln>
+            <a:tailEnd type="triangle"/>
+          </a:ln>
         </p:spPr>
         <p:style>
           <a:lnRef idx="2">
             <a:schemeClr val="dk1"/>
           </a:lnRef>
-          <a:fillRef idx="1">
-            <a:schemeClr val="lt1"/>
+          <a:fillRef idx="0">
+            <a:schemeClr val="dk1"/>
           </a:fillRef>
-          <a:effectRef idx="0">
+          <a:effectRef idx="1">
             <a:schemeClr val="dk1"/>
           </a:effectRef>
           <a:fontRef idx="minor">
-            <a:schemeClr val="dk1"/>
+            <a:schemeClr val="tx1"/>
           </a:fontRef>
         </p:style>
-        <p:txBody>
-          <a:bodyPr rtlCol="0" anchor="ctr"/>
-          <a:lstStyle/>
-          <a:p>
-            <a:pPr algn="ctr"/>
-            <a:r>
-              <a:rPr lang="en-US" dirty="0" err="1"/>
-              <a:t>StS</a:t>
-            </a:r>
-            <a:endParaRPr lang="en-US" dirty="0"/>
-          </a:p>
-        </p:txBody>
-      </p:sp>
+      </p:cxnSp>
+      <p:cxnSp>
+        <p:nvCxnSpPr>
+          <p:cNvPr id="19" name="Connector: Elbow 18">
+            <a:extLst>
+              <a:ext uri="{FF2B5EF4-FFF2-40B4-BE49-F238E27FC236}">
+                <a16:creationId xmlns:a16="http://schemas.microsoft.com/office/drawing/2014/main" id="{BBCADE60-6030-BBAA-F53D-808511906CB0}"/>
+              </a:ext>
+            </a:extLst>
+          </p:cNvPr>
+          <p:cNvCxnSpPr>
+            <a:cxnSpLocks/>
+            <a:stCxn id="11" idx="3"/>
+            <a:endCxn id="13" idx="1"/>
+          </p:cNvCxnSpPr>
+          <p:nvPr/>
+        </p:nvCxnSpPr>
+        <p:spPr>
+          <a:xfrm flipV="1">
+            <a:off x="5189348" y="3728633"/>
+            <a:ext cx="650930" cy="1090047"/>
+          </a:xfrm>
+          <a:prstGeom prst="bentConnector3">
+            <a:avLst>
+              <a:gd name="adj1" fmla="val 50000"/>
+            </a:avLst>
+          </a:prstGeom>
+          <a:ln>
+            <a:tailEnd type="triangle"/>
+          </a:ln>
+        </p:spPr>
+        <p:style>
+          <a:lnRef idx="2">
+            <a:schemeClr val="dk1"/>
+          </a:lnRef>
+          <a:fillRef idx="0">
+            <a:schemeClr val="dk1"/>
+          </a:fillRef>
+          <a:effectRef idx="1">
+            <a:schemeClr val="dk1"/>
+          </a:effectRef>
+          <a:fontRef idx="minor">
+            <a:schemeClr val="tx1"/>
+          </a:fontRef>
+        </p:style>
+      </p:cxnSp>
+      <p:cxnSp>
+        <p:nvCxnSpPr>
+          <p:cNvPr id="23" name="Straight Arrow Connector 22">
+            <a:extLst>
+              <a:ext uri="{FF2B5EF4-FFF2-40B4-BE49-F238E27FC236}">
+                <a16:creationId xmlns:a16="http://schemas.microsoft.com/office/drawing/2014/main" id="{FBEEB9C0-2902-AC44-F938-1DB250E0D623}"/>
+              </a:ext>
+            </a:extLst>
+          </p:cNvPr>
+          <p:cNvCxnSpPr>
+            <a:stCxn id="5" idx="3"/>
+            <a:endCxn id="8" idx="1"/>
+          </p:cNvCxnSpPr>
+          <p:nvPr/>
+        </p:nvCxnSpPr>
+        <p:spPr>
+          <a:xfrm>
+            <a:off x="3500033" y="2638587"/>
+            <a:ext cx="650929" cy="0"/>
+          </a:xfrm>
+          <a:prstGeom prst="straightConnector1">
+            <a:avLst/>
+          </a:prstGeom>
+          <a:ln>
+            <a:tailEnd type="triangle"/>
+          </a:ln>
+        </p:spPr>
+        <p:style>
+          <a:lnRef idx="2">
+            <a:schemeClr val="dk1"/>
+          </a:lnRef>
+          <a:fillRef idx="0">
+            <a:schemeClr val="dk1"/>
+          </a:fillRef>
+          <a:effectRef idx="1">
+            <a:schemeClr val="dk1"/>
+          </a:effectRef>
+          <a:fontRef idx="minor">
+            <a:schemeClr val="tx1"/>
+          </a:fontRef>
+        </p:style>
+      </p:cxnSp>
+      <p:cxnSp>
+        <p:nvCxnSpPr>
+          <p:cNvPr id="24" name="Straight Arrow Connector 23">
+            <a:extLst>
+              <a:ext uri="{FF2B5EF4-FFF2-40B4-BE49-F238E27FC236}">
+                <a16:creationId xmlns:a16="http://schemas.microsoft.com/office/drawing/2014/main" id="{75B159D1-857E-0A69-0F7E-54F01510DC84}"/>
+              </a:ext>
+            </a:extLst>
+          </p:cNvPr>
+          <p:cNvCxnSpPr>
+            <a:cxnSpLocks/>
+            <a:stCxn id="6" idx="3"/>
+            <a:endCxn id="10" idx="1"/>
+          </p:cNvCxnSpPr>
+          <p:nvPr/>
+        </p:nvCxnSpPr>
+        <p:spPr>
+          <a:xfrm flipV="1">
+            <a:off x="3500032" y="3728633"/>
+            <a:ext cx="650930" cy="1"/>
+          </a:xfrm>
+          <a:prstGeom prst="straightConnector1">
+            <a:avLst/>
+          </a:prstGeom>
+          <a:ln>
+            <a:tailEnd type="triangle"/>
+          </a:ln>
+        </p:spPr>
+        <p:style>
+          <a:lnRef idx="2">
+            <a:schemeClr val="dk1"/>
+          </a:lnRef>
+          <a:fillRef idx="0">
+            <a:schemeClr val="dk1"/>
+          </a:fillRef>
+          <a:effectRef idx="1">
+            <a:schemeClr val="dk1"/>
+          </a:effectRef>
+          <a:fontRef idx="minor">
+            <a:schemeClr val="tx1"/>
+          </a:fontRef>
+        </p:style>
+      </p:cxnSp>
+      <p:cxnSp>
+        <p:nvCxnSpPr>
+          <p:cNvPr id="27" name="Straight Arrow Connector 26">
+            <a:extLst>
+              <a:ext uri="{FF2B5EF4-FFF2-40B4-BE49-F238E27FC236}">
+                <a16:creationId xmlns:a16="http://schemas.microsoft.com/office/drawing/2014/main" id="{601B522E-FBDB-3C63-9CD6-413FD649120F}"/>
+              </a:ext>
+            </a:extLst>
+          </p:cNvPr>
+          <p:cNvCxnSpPr>
+            <a:cxnSpLocks/>
+            <a:stCxn id="7" idx="3"/>
+            <a:endCxn id="11" idx="1"/>
+          </p:cNvCxnSpPr>
+          <p:nvPr/>
+        </p:nvCxnSpPr>
+        <p:spPr>
+          <a:xfrm flipV="1">
+            <a:off x="3500032" y="4818680"/>
+            <a:ext cx="650930" cy="1"/>
+          </a:xfrm>
+          <a:prstGeom prst="straightConnector1">
+            <a:avLst/>
+          </a:prstGeom>
+          <a:ln>
+            <a:tailEnd type="triangle"/>
+          </a:ln>
+        </p:spPr>
+        <p:style>
+          <a:lnRef idx="2">
+            <a:schemeClr val="dk1"/>
+          </a:lnRef>
+          <a:fillRef idx="0">
+            <a:schemeClr val="dk1"/>
+          </a:fillRef>
+          <a:effectRef idx="1">
+            <a:schemeClr val="dk1"/>
+          </a:effectRef>
+          <a:fontRef idx="minor">
+            <a:schemeClr val="tx1"/>
+          </a:fontRef>
+        </p:style>
+      </p:cxnSp>
+      <p:cxnSp>
+        <p:nvCxnSpPr>
+          <p:cNvPr id="30" name="Straight Arrow Connector 29">
+            <a:extLst>
+              <a:ext uri="{FF2B5EF4-FFF2-40B4-BE49-F238E27FC236}">
+                <a16:creationId xmlns:a16="http://schemas.microsoft.com/office/drawing/2014/main" id="{EFC3C39E-946D-8591-5E5D-80EC2DF76139}"/>
+              </a:ext>
+            </a:extLst>
+          </p:cNvPr>
+          <p:cNvCxnSpPr>
+            <a:cxnSpLocks/>
+            <a:stCxn id="13" idx="3"/>
+            <a:endCxn id="14" idx="1"/>
+          </p:cNvCxnSpPr>
+          <p:nvPr/>
+        </p:nvCxnSpPr>
+        <p:spPr>
+          <a:xfrm flipV="1">
+            <a:off x="6878664" y="3728632"/>
+            <a:ext cx="650930" cy="1"/>
+          </a:xfrm>
+          <a:prstGeom prst="straightConnector1">
+            <a:avLst/>
+          </a:prstGeom>
+          <a:ln>
+            <a:tailEnd type="triangle"/>
+          </a:ln>
+        </p:spPr>
+        <p:style>
+          <a:lnRef idx="2">
+            <a:schemeClr val="dk1"/>
+          </a:lnRef>
+          <a:fillRef idx="0">
+            <a:schemeClr val="dk1"/>
+          </a:fillRef>
+          <a:effectRef idx="1">
+            <a:schemeClr val="dk1"/>
+          </a:effectRef>
+          <a:fontRef idx="minor">
+            <a:schemeClr val="tx1"/>
+          </a:fontRef>
+        </p:style>
+      </p:cxnSp>
+      <p:cxnSp>
+        <p:nvCxnSpPr>
+          <p:cNvPr id="33" name="Straight Arrow Connector 32">
+            <a:extLst>
+              <a:ext uri="{FF2B5EF4-FFF2-40B4-BE49-F238E27FC236}">
+                <a16:creationId xmlns:a16="http://schemas.microsoft.com/office/drawing/2014/main" id="{03FA358A-CC4F-4606-9343-949243BEB3F2}"/>
+              </a:ext>
+            </a:extLst>
+          </p:cNvPr>
+          <p:cNvCxnSpPr>
+            <a:cxnSpLocks/>
+            <a:stCxn id="14" idx="3"/>
+            <a:endCxn id="15" idx="1"/>
+          </p:cNvCxnSpPr>
+          <p:nvPr/>
+        </p:nvCxnSpPr>
+        <p:spPr>
+          <a:xfrm flipV="1">
+            <a:off x="8567980" y="3726046"/>
+            <a:ext cx="650930" cy="2586"/>
+          </a:xfrm>
+          <a:prstGeom prst="straightConnector1">
+            <a:avLst/>
+          </a:prstGeom>
+          <a:ln>
+            <a:tailEnd type="triangle"/>
+          </a:ln>
+        </p:spPr>
+        <p:style>
+          <a:lnRef idx="2">
+            <a:schemeClr val="dk1"/>
+          </a:lnRef>
+          <a:fillRef idx="0">
+            <a:schemeClr val="dk1"/>
+          </a:fillRef>
+          <a:effectRef idx="1">
+            <a:schemeClr val="dk1"/>
+          </a:effectRef>
+          <a:fontRef idx="minor">
+            <a:schemeClr val="tx1"/>
+          </a:fontRef>
+        </p:style>
+      </p:cxnSp>
     </p:spTree>
     <p:extLst>
       <p:ext uri="{BB962C8B-B14F-4D97-AF65-F5344CB8AC3E}">
-        <p14:creationId xmlns:p14="http://schemas.microsoft.com/office/powerpoint/2010/main" val="4014904213"/>
+        <p14:creationId xmlns:p14="http://schemas.microsoft.com/office/powerpoint/2010/main" val="614610062"/>
       </p:ext>
     </p:extLst>
   </p:cSld>
@@ -5248,54 +6133,175 @@
           <a:bodyPr/>
           <a:lstStyle/>
           <a:p>
-            <a:endParaRPr lang="en-US"/>
-          </a:p>
-        </p:txBody>
-      </p:sp>
-      <p:sp>
-        <p:nvSpPr>
-          <p:cNvPr id="4" name="Oval 3">
-            <a:extLst>
-              <a:ext uri="{FF2B5EF4-FFF2-40B4-BE49-F238E27FC236}">
-                <a16:creationId xmlns:a16="http://schemas.microsoft.com/office/drawing/2014/main" id="{138C0814-FDB5-BC5C-A332-BDC31B86FA3E}"/>
-              </a:ext>
-            </a:extLst>
-          </p:cNvPr>
-          <p:cNvSpPr/>
-          <p:nvPr/>
-        </p:nvSpPr>
-        <p:spPr>
-          <a:xfrm>
-            <a:off x="10439400" y="365125"/>
-            <a:ext cx="914400" cy="398649"/>
-          </a:xfrm>
-          <a:prstGeom prst="ellipse">
-            <a:avLst/>
-          </a:prstGeom>
-        </p:spPr>
-        <p:style>
-          <a:lnRef idx="2">
-            <a:schemeClr val="dk1"/>
-          </a:lnRef>
-          <a:fillRef idx="1">
-            <a:schemeClr val="lt1"/>
-          </a:fillRef>
-          <a:effectRef idx="0">
-            <a:schemeClr val="dk1"/>
-          </a:effectRef>
-          <a:fontRef idx="minor">
-            <a:schemeClr val="dk1"/>
-          </a:fontRef>
-        </p:style>
-        <p:txBody>
-          <a:bodyPr rtlCol="0" anchor="ctr"/>
-          <a:lstStyle/>
-          <a:p>
-            <a:pPr algn="ctr"/>
-            <a:r>
-              <a:rPr lang="en-US" dirty="0" err="1"/>
-              <a:t>StS</a:t>
-            </a:r>
+            <a:r>
+              <a:rPr lang="en-US" dirty="0"/>
+              <a:t>All data on 2km x 2km grid</a:t>
+            </a:r>
+          </a:p>
+          <a:p>
+            <a:r>
+              <a:rPr lang="en-US" dirty="0"/>
+              <a:t>Specific data types</a:t>
+            </a:r>
+          </a:p>
+          <a:p>
+            <a:pPr lvl="1"/>
+            <a:r>
+              <a:rPr lang="en-US" dirty="0"/>
+              <a:t>Wind speed data </a:t>
+            </a:r>
+            <a:r>
+              <a:rPr lang="en-US" sz="1800" dirty="0"/>
+              <a:t>→ Potential Wind Power Generation</a:t>
+            </a:r>
+          </a:p>
+          <a:p>
+            <a:pPr marL="685800" marR="0" lvl="1" indent="-228600" algn="l" defTabSz="914400" rtl="0" eaLnBrk="1" fontAlgn="auto" latinLnBrk="0" hangingPunct="1">
+              <a:lnSpc>
+                <a:spcPct val="90000"/>
+              </a:lnSpc>
+              <a:spcBef>
+                <a:spcPts val="500"/>
+              </a:spcBef>
+              <a:spcAft>
+                <a:spcPts val="0"/>
+              </a:spcAft>
+              <a:buClrTx/>
+              <a:buSzTx/>
+              <a:buFont typeface="Arial" panose="020B0604020202020204" pitchFamily="34" charset="0"/>
+              <a:buChar char="•"/>
+              <a:tabLst/>
+              <a:defRPr/>
+            </a:pPr>
+            <a:r>
+              <a:rPr kumimoji="0" lang="en-US" sz="2400" b="0" i="0" u="none" strike="noStrike" kern="1200" cap="none" spc="0" normalizeH="0" baseline="0" noProof="0" dirty="0">
+                <a:ln>
+                  <a:noFill/>
+                </a:ln>
+                <a:solidFill>
+                  <a:prstClr val="black"/>
+                </a:solidFill>
+                <a:effectLst/>
+                <a:uLnTx/>
+                <a:uFillTx/>
+                <a:latin typeface="Aptos" panose="02110004020202020204"/>
+                <a:ea typeface="+mn-ea"/>
+                <a:cs typeface="+mn-cs"/>
+              </a:rPr>
+              <a:t>Fisheries data </a:t>
+            </a:r>
+            <a:r>
+              <a:rPr kumimoji="0" lang="en-US" sz="1800" b="0" i="0" u="none" strike="noStrike" kern="1200" cap="none" spc="0" normalizeH="0" baseline="0" noProof="0" dirty="0">
+                <a:ln>
+                  <a:noFill/>
+                </a:ln>
+                <a:solidFill>
+                  <a:prstClr val="black"/>
+                </a:solidFill>
+                <a:effectLst/>
+                <a:uLnTx/>
+                <a:uFillTx/>
+                <a:latin typeface="Aptos" panose="02110004020202020204"/>
+                <a:ea typeface="+mn-ea"/>
+                <a:cs typeface="+mn-cs"/>
+              </a:rPr>
+              <a:t>→ $ value of fisheries, data on ship routes</a:t>
+            </a:r>
+          </a:p>
+          <a:p>
+            <a:pPr marL="685800" marR="0" lvl="1" indent="-228600" algn="l" defTabSz="914400" rtl="0" eaLnBrk="1" fontAlgn="auto" latinLnBrk="0" hangingPunct="1">
+              <a:lnSpc>
+                <a:spcPct val="90000"/>
+              </a:lnSpc>
+              <a:spcBef>
+                <a:spcPts val="500"/>
+              </a:spcBef>
+              <a:spcAft>
+                <a:spcPts val="0"/>
+              </a:spcAft>
+              <a:buClrTx/>
+              <a:buSzTx/>
+              <a:buFont typeface="Arial" panose="020B0604020202020204" pitchFamily="34" charset="0"/>
+              <a:buChar char="•"/>
+              <a:tabLst/>
+              <a:defRPr/>
+            </a:pPr>
+            <a:r>
+              <a:rPr kumimoji="0" lang="en-US" sz="2400" b="0" i="0" u="none" strike="noStrike" kern="1200" cap="none" spc="0" normalizeH="0" baseline="0" noProof="0" dirty="0">
+                <a:ln>
+                  <a:noFill/>
+                </a:ln>
+                <a:solidFill>
+                  <a:prstClr val="black"/>
+                </a:solidFill>
+                <a:effectLst/>
+                <a:uLnTx/>
+                <a:uFillTx/>
+                <a:latin typeface="Aptos" panose="02110004020202020204"/>
+                <a:ea typeface="+mn-ea"/>
+                <a:cs typeface="+mn-cs"/>
+              </a:rPr>
+              <a:t>Wildlife data </a:t>
+            </a:r>
+            <a:r>
+              <a:rPr kumimoji="0" lang="en-US" sz="1800" b="0" i="0" u="none" strike="noStrike" kern="1200" cap="none" spc="0" normalizeH="0" baseline="0" noProof="0" dirty="0">
+                <a:ln>
+                  <a:noFill/>
+                </a:ln>
+                <a:solidFill>
+                  <a:prstClr val="black"/>
+                </a:solidFill>
+                <a:effectLst/>
+                <a:uLnTx/>
+                <a:uFillTx/>
+                <a:latin typeface="Aptos" panose="02110004020202020204"/>
+                <a:ea typeface="+mn-ea"/>
+                <a:cs typeface="+mn-cs"/>
+              </a:rPr>
+              <a:t>→ Raw census data, assume constant % impact</a:t>
+            </a:r>
+          </a:p>
+          <a:p>
+            <a:pPr marL="685800" marR="0" lvl="1" indent="-228600" algn="l" defTabSz="914400" rtl="0" eaLnBrk="1" fontAlgn="auto" latinLnBrk="0" hangingPunct="1">
+              <a:lnSpc>
+                <a:spcPct val="90000"/>
+              </a:lnSpc>
+              <a:spcBef>
+                <a:spcPts val="500"/>
+              </a:spcBef>
+              <a:spcAft>
+                <a:spcPts val="0"/>
+              </a:spcAft>
+              <a:buClrTx/>
+              <a:buSzTx/>
+              <a:buFont typeface="Arial" panose="020B0604020202020204" pitchFamily="34" charset="0"/>
+              <a:buChar char="•"/>
+              <a:tabLst/>
+              <a:defRPr/>
+            </a:pPr>
+            <a:endParaRPr kumimoji="0" lang="en-US" sz="1800" b="0" i="0" u="none" strike="noStrike" kern="1200" cap="none" spc="0" normalizeH="0" baseline="0" noProof="0" dirty="0">
+              <a:ln>
+                <a:noFill/>
+              </a:ln>
+              <a:solidFill>
+                <a:prstClr val="black"/>
+              </a:solidFill>
+              <a:effectLst/>
+              <a:uLnTx/>
+              <a:uFillTx/>
+              <a:latin typeface="Aptos" panose="02110004020202020204"/>
+              <a:ea typeface="+mn-ea"/>
+              <a:cs typeface="+mn-cs"/>
+            </a:endParaRPr>
+          </a:p>
+          <a:p>
+            <a:pPr lvl="1"/>
+            <a:endParaRPr lang="en-US" sz="1800" dirty="0">
+              <a:latin typeface="MS Shell Dlg 2" panose="020B0604030504040204" pitchFamily="34" charset="0"/>
+            </a:endParaRPr>
+          </a:p>
+          <a:p>
+            <a:pPr lvl="1"/>
             <a:endParaRPr lang="en-US" dirty="0"/>
           </a:p>
         </p:txBody>
@@ -5303,7 +6309,7 @@
     </p:spTree>
     <p:extLst>
       <p:ext uri="{BB962C8B-B14F-4D97-AF65-F5344CB8AC3E}">
-        <p14:creationId xmlns:p14="http://schemas.microsoft.com/office/powerpoint/2010/main" val="3672255520"/>
+        <p14:creationId xmlns:p14="http://schemas.microsoft.com/office/powerpoint/2010/main" val="2392400975"/>
       </p:ext>
     </p:extLst>
   </p:cSld>
@@ -5335,7 +6341,7 @@
           <p:cNvPr id="2" name="Title 1">
             <a:extLst>
               <a:ext uri="{FF2B5EF4-FFF2-40B4-BE49-F238E27FC236}">
-                <a16:creationId xmlns:a16="http://schemas.microsoft.com/office/drawing/2014/main" id="{7B95B9F2-7F85-2BE4-0E69-750F311A523A}"/>
+                <a16:creationId xmlns:a16="http://schemas.microsoft.com/office/drawing/2014/main" id="{3910051B-9429-DE18-9B37-DEB315AEC556}"/>
               </a:ext>
             </a:extLst>
           </p:cNvPr>
@@ -5353,7 +6359,7 @@
           <a:p>
             <a:r>
               <a:rPr lang="en-US" dirty="0"/>
-              <a:t>Anticipated Results</a:t>
+              <a:t>Assessment</a:t>
             </a:r>
           </a:p>
         </p:txBody>
@@ -5363,7 +6369,7 @@
           <p:cNvPr id="3" name="Content Placeholder 2">
             <a:extLst>
               <a:ext uri="{FF2B5EF4-FFF2-40B4-BE49-F238E27FC236}">
-                <a16:creationId xmlns:a16="http://schemas.microsoft.com/office/drawing/2014/main" id="{B84BE2EE-1F0E-F0C4-C287-AB10DDB3BFAB}"/>
+                <a16:creationId xmlns:a16="http://schemas.microsoft.com/office/drawing/2014/main" id="{811AC9EC-CF25-5485-294C-CF0B390DC920}"/>
               </a:ext>
             </a:extLst>
           </p:cNvPr>
@@ -5379,53 +6385,47 @@
           <a:bodyPr/>
           <a:lstStyle/>
           <a:p>
-            <a:endParaRPr lang="en-US"/>
-          </a:p>
-        </p:txBody>
-      </p:sp>
-      <p:sp>
-        <p:nvSpPr>
-          <p:cNvPr id="4" name="Oval 3">
-            <a:extLst>
-              <a:ext uri="{FF2B5EF4-FFF2-40B4-BE49-F238E27FC236}">
-                <a16:creationId xmlns:a16="http://schemas.microsoft.com/office/drawing/2014/main" id="{86D7EAAB-E117-0E96-356C-E3C3424A5C17}"/>
-              </a:ext>
-            </a:extLst>
-          </p:cNvPr>
-          <p:cNvSpPr/>
-          <p:nvPr/>
-        </p:nvSpPr>
-        <p:spPr>
-          <a:xfrm>
-            <a:off x="10439400" y="365125"/>
-            <a:ext cx="914400" cy="398649"/>
-          </a:xfrm>
-          <a:prstGeom prst="ellipse">
-            <a:avLst/>
-          </a:prstGeom>
-        </p:spPr>
-        <p:style>
-          <a:lnRef idx="2">
-            <a:schemeClr val="dk1"/>
-          </a:lnRef>
-          <a:fillRef idx="1">
-            <a:schemeClr val="lt1"/>
-          </a:fillRef>
-          <a:effectRef idx="0">
-            <a:schemeClr val="dk1"/>
-          </a:effectRef>
-          <a:fontRef idx="minor">
-            <a:schemeClr val="dk1"/>
-          </a:fontRef>
-        </p:style>
-        <p:txBody>
-          <a:bodyPr rtlCol="0" anchor="ctr"/>
-          <a:lstStyle/>
-          <a:p>
-            <a:pPr algn="ctr"/>
+            <a:r>
+              <a:rPr lang="en-US" dirty="0"/>
+              <a:t>Simple choice model</a:t>
+            </a:r>
+          </a:p>
+          <a:p>
+            <a:pPr lvl="1"/>
+            <a:r>
+              <a:rPr lang="en-US" dirty="0"/>
+              <a:t>Will or will not Wind Power Generation happen at specific grid location?</a:t>
+            </a:r>
+          </a:p>
+          <a:p>
+            <a:r>
+              <a:rPr lang="en-US" dirty="0"/>
+              <a:t>Method</a:t>
+            </a:r>
+          </a:p>
+          <a:p>
+            <a:pPr lvl="1"/>
+            <a:r>
+              <a:rPr lang="en-US" dirty="0"/>
+              <a:t>Compare positive and negative impacts at each grid location</a:t>
+            </a:r>
+          </a:p>
+          <a:p>
+            <a:pPr lvl="1"/>
+            <a:r>
+              <a:rPr lang="en-US" dirty="0"/>
+              <a:t>Calculate a statistic comparing all impacts</a:t>
+            </a:r>
+          </a:p>
+          <a:p>
+            <a:pPr lvl="1"/>
+            <a:r>
+              <a:rPr lang="en-US" dirty="0"/>
+              <a:t>Summarize across area, by potential lease area, </a:t>
+            </a:r>
             <a:r>
               <a:rPr lang="en-US" dirty="0" err="1"/>
-              <a:t>StS</a:t>
+              <a:t>etc</a:t>
             </a:r>
             <a:endParaRPr lang="en-US" dirty="0"/>
           </a:p>
@@ -5434,7 +6434,7 @@
     </p:spTree>
     <p:extLst>
       <p:ext uri="{BB962C8B-B14F-4D97-AF65-F5344CB8AC3E}">
-        <p14:creationId xmlns:p14="http://schemas.microsoft.com/office/powerpoint/2010/main" val="367996804"/>
+        <p14:creationId xmlns:p14="http://schemas.microsoft.com/office/powerpoint/2010/main" val="3235861235"/>
       </p:ext>
     </p:extLst>
   </p:cSld>
@@ -5466,7 +6466,7 @@
           <p:cNvPr id="2" name="Title 1">
             <a:extLst>
               <a:ext uri="{FF2B5EF4-FFF2-40B4-BE49-F238E27FC236}">
-                <a16:creationId xmlns:a16="http://schemas.microsoft.com/office/drawing/2014/main" id="{CEAB25EE-6E11-B86E-B9EF-313E7FAB791D}"/>
+                <a16:creationId xmlns:a16="http://schemas.microsoft.com/office/drawing/2014/main" id="{7B95B9F2-7F85-2BE4-0E69-750F311A523A}"/>
               </a:ext>
             </a:extLst>
           </p:cNvPr>
@@ -5484,7 +6484,7 @@
           <a:p>
             <a:r>
               <a:rPr lang="en-US" dirty="0"/>
-              <a:t>Benefits</a:t>
+              <a:t>Anticipated Results</a:t>
             </a:r>
           </a:p>
         </p:txBody>
@@ -5494,7 +6494,7 @@
           <p:cNvPr id="3" name="Content Placeholder 2">
             <a:extLst>
               <a:ext uri="{FF2B5EF4-FFF2-40B4-BE49-F238E27FC236}">
-                <a16:creationId xmlns:a16="http://schemas.microsoft.com/office/drawing/2014/main" id="{35E608CF-F493-CC37-E424-9B2044833213}"/>
+                <a16:creationId xmlns:a16="http://schemas.microsoft.com/office/drawing/2014/main" id="{B84BE2EE-1F0E-F0C4-C287-AB10DDB3BFAB}"/>
               </a:ext>
             </a:extLst>
           </p:cNvPr>
@@ -5510,62 +6510,43 @@
           <a:bodyPr/>
           <a:lstStyle/>
           <a:p>
-            <a:endParaRPr lang="en-US"/>
-          </a:p>
-        </p:txBody>
-      </p:sp>
-      <p:sp>
-        <p:nvSpPr>
-          <p:cNvPr id="4" name="Oval 3">
-            <a:extLst>
-              <a:ext uri="{FF2B5EF4-FFF2-40B4-BE49-F238E27FC236}">
-                <a16:creationId xmlns:a16="http://schemas.microsoft.com/office/drawing/2014/main" id="{1F007838-B626-8770-3DF2-53E4D0DEFEEE}"/>
-              </a:ext>
-            </a:extLst>
-          </p:cNvPr>
-          <p:cNvSpPr/>
-          <p:nvPr/>
-        </p:nvSpPr>
-        <p:spPr>
-          <a:xfrm>
-            <a:off x="10439400" y="365125"/>
-            <a:ext cx="914400" cy="398649"/>
-          </a:xfrm>
-          <a:prstGeom prst="ellipse">
-            <a:avLst/>
-          </a:prstGeom>
-        </p:spPr>
-        <p:style>
-          <a:lnRef idx="2">
-            <a:schemeClr val="dk1"/>
-          </a:lnRef>
-          <a:fillRef idx="1">
-            <a:schemeClr val="lt1"/>
-          </a:fillRef>
-          <a:effectRef idx="0">
-            <a:schemeClr val="dk1"/>
-          </a:effectRef>
-          <a:fontRef idx="minor">
-            <a:schemeClr val="dk1"/>
-          </a:fontRef>
-        </p:style>
-        <p:txBody>
-          <a:bodyPr rtlCol="0" anchor="ctr"/>
-          <a:lstStyle/>
-          <a:p>
-            <a:pPr algn="ctr"/>
-            <a:r>
-              <a:rPr lang="en-US" dirty="0" err="1"/>
-              <a:t>StS</a:t>
-            </a:r>
-            <a:endParaRPr lang="en-US" dirty="0"/>
+            <a:r>
+              <a:rPr lang="en-US" dirty="0"/>
+              <a:t>Impact of power generation on fish will be variable across the survey area</a:t>
+            </a:r>
+          </a:p>
+          <a:p>
+            <a:pPr lvl="1"/>
+            <a:r>
+              <a:rPr lang="en-US" dirty="0"/>
+              <a:t>Some areas may see positive impacts on fisheries</a:t>
+            </a:r>
+          </a:p>
+          <a:p>
+            <a:pPr lvl="1"/>
+            <a:r>
+              <a:rPr lang="en-US" dirty="0"/>
+              <a:t>Hard to model reallocation of fishing boats to new locals</a:t>
+            </a:r>
+          </a:p>
+          <a:p>
+            <a:r>
+              <a:rPr lang="en-US" dirty="0"/>
+              <a:t>Impact of power generation on seabirds worse closer to shore</a:t>
+            </a:r>
+          </a:p>
+          <a:p>
+            <a:r>
+              <a:rPr lang="en-US" dirty="0"/>
+              <a:t>Impact of power generation on cetaceans depends on census</a:t>
+            </a:r>
           </a:p>
         </p:txBody>
       </p:sp>
     </p:spTree>
     <p:extLst>
       <p:ext uri="{BB962C8B-B14F-4D97-AF65-F5344CB8AC3E}">
-        <p14:creationId xmlns:p14="http://schemas.microsoft.com/office/powerpoint/2010/main" val="701201403"/>
+        <p14:creationId xmlns:p14="http://schemas.microsoft.com/office/powerpoint/2010/main" val="212396472"/>
       </p:ext>
     </p:extLst>
   </p:cSld>

</xml_diff>

<commit_message>
Formatting cleanup on presentation
</commit_message>
<xml_diff>
--- a/Documents/May Presentation.pptx
+++ b/Documents/May Presentation.pptx
@@ -9,9 +9,9 @@
   </p:notesMasterIdLst>
   <p:sldIdLst>
     <p:sldId id="259" r:id="rId2"/>
-    <p:sldId id="282" r:id="rId3"/>
-    <p:sldId id="279" r:id="rId4"/>
-    <p:sldId id="283" r:id="rId5"/>
+    <p:sldId id="285" r:id="rId3"/>
+    <p:sldId id="286" r:id="rId4"/>
+    <p:sldId id="287" r:id="rId5"/>
     <p:sldId id="281" r:id="rId6"/>
     <p:sldId id="270" r:id="rId7"/>
     <p:sldId id="271" r:id="rId8"/>
@@ -131,7 +131,6 @@
 <file path=ppt/revisionInfo.xml><?xml version="1.0" encoding="utf-8"?>
 <p1510:revInfo xmlns:a="http://schemas.openxmlformats.org/drawingml/2006/main" xmlns:r="http://schemas.openxmlformats.org/officeDocument/2006/relationships" xmlns:p1510="http://schemas.microsoft.com/office/powerpoint/2015/10/main">
   <p1510:revLst>
-    <p1510:client id="{08E1F6C1-C973-4F1F-92EE-AF2BB4FE6616}" v="21" dt="2025-04-30T00:47:23.125"/>
     <p1510:client id="{611A5EE7-913C-4136-9425-FBE7D3E93282}" v="1" dt="2025-04-30T20:50:53.072"/>
   </p1510:revLst>
 </p1510:revInfo>
@@ -140,423 +139,9 @@
 <file path=ppt/changesInfos/changesInfo1.xml><?xml version="1.0" encoding="utf-8"?>
 <pc:chgInfo xmlns:a="http://schemas.openxmlformats.org/drawingml/2006/main" xmlns:r="http://schemas.openxmlformats.org/officeDocument/2006/relationships" xmlns:ac="http://schemas.microsoft.com/office/drawing/2013/main/command" xmlns:pc="http://schemas.microsoft.com/office/powerpoint/2013/main/command">
   <pc:docChgLst>
-    <pc:chgData name="Steve Swartz" userId="fa5fbd6ce30e021b" providerId="LiveId" clId="{08E1F6C1-C973-4F1F-92EE-AF2BB4FE6616}"/>
-    <pc:docChg chg="undo custSel addSld delSld modSld">
-      <pc:chgData name="Steve Swartz" userId="fa5fbd6ce30e021b" providerId="LiveId" clId="{08E1F6C1-C973-4F1F-92EE-AF2BB4FE6616}" dt="2025-04-30T00:47:23.124" v="267"/>
-      <pc:docMkLst>
-        <pc:docMk/>
-      </pc:docMkLst>
-      <pc:sldChg chg="del">
-        <pc:chgData name="Steve Swartz" userId="fa5fbd6ce30e021b" providerId="LiveId" clId="{08E1F6C1-C973-4F1F-92EE-AF2BB4FE6616}" dt="2025-04-29T17:47:57.130" v="0" actId="47"/>
-        <pc:sldMkLst>
-          <pc:docMk/>
-          <pc:sldMk cId="2829747970" sldId="256"/>
-        </pc:sldMkLst>
-      </pc:sldChg>
-      <pc:sldChg chg="del">
-        <pc:chgData name="Steve Swartz" userId="fa5fbd6ce30e021b" providerId="LiveId" clId="{08E1F6C1-C973-4F1F-92EE-AF2BB4FE6616}" dt="2025-04-29T17:53:45.354" v="149" actId="2696"/>
-        <pc:sldMkLst>
-          <pc:docMk/>
-          <pc:sldMk cId="1442490525" sldId="257"/>
-        </pc:sldMkLst>
-      </pc:sldChg>
-      <pc:sldChg chg="add del mod modShow">
-        <pc:chgData name="Steve Swartz" userId="fa5fbd6ce30e021b" providerId="LiveId" clId="{08E1F6C1-C973-4F1F-92EE-AF2BB4FE6616}" dt="2025-04-29T17:58:13.049" v="249" actId="729"/>
-        <pc:sldMkLst>
-          <pc:docMk/>
-          <pc:sldMk cId="3682714053" sldId="257"/>
-        </pc:sldMkLst>
-      </pc:sldChg>
-      <pc:sldChg chg="del">
-        <pc:chgData name="Steve Swartz" userId="fa5fbd6ce30e021b" providerId="LiveId" clId="{08E1F6C1-C973-4F1F-92EE-AF2BB4FE6616}" dt="2025-04-29T17:53:45.354" v="149" actId="2696"/>
-        <pc:sldMkLst>
-          <pc:docMk/>
-          <pc:sldMk cId="1866325147" sldId="258"/>
-        </pc:sldMkLst>
-      </pc:sldChg>
-      <pc:sldChg chg="add mod modShow">
-        <pc:chgData name="Steve Swartz" userId="fa5fbd6ce30e021b" providerId="LiveId" clId="{08E1F6C1-C973-4F1F-92EE-AF2BB4FE6616}" dt="2025-04-29T17:58:13.049" v="249" actId="729"/>
-        <pc:sldMkLst>
-          <pc:docMk/>
-          <pc:sldMk cId="3931126852" sldId="258"/>
-        </pc:sldMkLst>
-      </pc:sldChg>
-      <pc:sldChg chg="addSp delSp modSp new mod setBg modClrScheme chgLayout">
-        <pc:chgData name="Steve Swartz" userId="fa5fbd6ce30e021b" providerId="LiveId" clId="{08E1F6C1-C973-4F1F-92EE-AF2BB4FE6616}" dt="2025-04-29T17:51:01.092" v="139" actId="20577"/>
-        <pc:sldMkLst>
-          <pc:docMk/>
-          <pc:sldMk cId="2114304695" sldId="259"/>
-        </pc:sldMkLst>
-        <pc:spChg chg="del mod ord">
-          <ac:chgData name="Steve Swartz" userId="fa5fbd6ce30e021b" providerId="LiveId" clId="{08E1F6C1-C973-4F1F-92EE-AF2BB4FE6616}" dt="2025-04-29T17:48:27.222" v="3" actId="700"/>
-          <ac:spMkLst>
-            <pc:docMk/>
-            <pc:sldMk cId="2114304695" sldId="259"/>
-            <ac:spMk id="2" creationId="{EBAC661C-FE12-12A3-CA0E-BE6108F1CA57}"/>
-          </ac:spMkLst>
-        </pc:spChg>
-        <pc:spChg chg="del mod ord">
-          <ac:chgData name="Steve Swartz" userId="fa5fbd6ce30e021b" providerId="LiveId" clId="{08E1F6C1-C973-4F1F-92EE-AF2BB4FE6616}" dt="2025-04-29T17:48:27.222" v="3" actId="700"/>
-          <ac:spMkLst>
-            <pc:docMk/>
-            <pc:sldMk cId="2114304695" sldId="259"/>
-            <ac:spMk id="3" creationId="{1882623E-6E07-6405-7AF5-FFC9F8F20067}"/>
-          </ac:spMkLst>
-        </pc:spChg>
-        <pc:spChg chg="del">
-          <ac:chgData name="Steve Swartz" userId="fa5fbd6ce30e021b" providerId="LiveId" clId="{08E1F6C1-C973-4F1F-92EE-AF2BB4FE6616}" dt="2025-04-29T17:48:27.222" v="3" actId="700"/>
-          <ac:spMkLst>
-            <pc:docMk/>
-            <pc:sldMk cId="2114304695" sldId="259"/>
-            <ac:spMk id="4" creationId="{6B52CDBB-A7E9-7E0F-BCF1-1E6371999E2D}"/>
-          </ac:spMkLst>
-        </pc:spChg>
-        <pc:spChg chg="add mod ord">
-          <ac:chgData name="Steve Swartz" userId="fa5fbd6ce30e021b" providerId="LiveId" clId="{08E1F6C1-C973-4F1F-92EE-AF2BB4FE6616}" dt="2025-04-29T17:50:51.735" v="138" actId="20577"/>
-          <ac:spMkLst>
-            <pc:docMk/>
-            <pc:sldMk cId="2114304695" sldId="259"/>
-            <ac:spMk id="5" creationId="{E08AAC93-E29F-B998-117C-855A0950F88F}"/>
-          </ac:spMkLst>
-        </pc:spChg>
-        <pc:spChg chg="add mod ord">
-          <ac:chgData name="Steve Swartz" userId="fa5fbd6ce30e021b" providerId="LiveId" clId="{08E1F6C1-C973-4F1F-92EE-AF2BB4FE6616}" dt="2025-04-29T17:51:01.092" v="139" actId="20577"/>
-          <ac:spMkLst>
-            <pc:docMk/>
-            <pc:sldMk cId="2114304695" sldId="259"/>
-            <ac:spMk id="6" creationId="{0B40E023-5541-8512-63C9-E888C2287847}"/>
-          </ac:spMkLst>
-        </pc:spChg>
-        <pc:spChg chg="add del">
-          <ac:chgData name="Steve Swartz" userId="fa5fbd6ce30e021b" providerId="LiveId" clId="{08E1F6C1-C973-4F1F-92EE-AF2BB4FE6616}" dt="2025-04-29T17:48:41.045" v="5" actId="26606"/>
-          <ac:spMkLst>
-            <pc:docMk/>
-            <pc:sldMk cId="2114304695" sldId="259"/>
-            <ac:spMk id="11" creationId="{3677BAFB-3BD3-41BB-9107-FAE224AE21C4}"/>
-          </ac:spMkLst>
-        </pc:spChg>
-        <pc:spChg chg="add del">
-          <ac:chgData name="Steve Swartz" userId="fa5fbd6ce30e021b" providerId="LiveId" clId="{08E1F6C1-C973-4F1F-92EE-AF2BB4FE6616}" dt="2025-04-29T17:48:41.045" v="5" actId="26606"/>
-          <ac:spMkLst>
-            <pc:docMk/>
-            <pc:sldMk cId="2114304695" sldId="259"/>
-            <ac:spMk id="13" creationId="{E6823A9B-C188-42D4-847C-3AD928DB145C}"/>
-          </ac:spMkLst>
-        </pc:spChg>
-        <pc:spChg chg="add del">
-          <ac:chgData name="Steve Swartz" userId="fa5fbd6ce30e021b" providerId="LiveId" clId="{08E1F6C1-C973-4F1F-92EE-AF2BB4FE6616}" dt="2025-04-29T17:48:41.045" v="5" actId="26606"/>
-          <ac:spMkLst>
-            <pc:docMk/>
-            <pc:sldMk cId="2114304695" sldId="259"/>
-            <ac:spMk id="15" creationId="{34B557F3-1A0C-4749-A6DB-EAC082DF390B}"/>
-          </ac:spMkLst>
-        </pc:spChg>
-        <pc:spChg chg="add del">
-          <ac:chgData name="Steve Swartz" userId="fa5fbd6ce30e021b" providerId="LiveId" clId="{08E1F6C1-C973-4F1F-92EE-AF2BB4FE6616}" dt="2025-04-29T17:48:41.045" v="5" actId="26606"/>
-          <ac:spMkLst>
-            <pc:docMk/>
-            <pc:sldMk cId="2114304695" sldId="259"/>
-            <ac:spMk id="17" creationId="{55D55AA6-3751-494F-868A-DCEDC5CE82BF}"/>
-          </ac:spMkLst>
-        </pc:spChg>
-        <pc:spChg chg="add del">
-          <ac:chgData name="Steve Swartz" userId="fa5fbd6ce30e021b" providerId="LiveId" clId="{08E1F6C1-C973-4F1F-92EE-AF2BB4FE6616}" dt="2025-04-29T17:48:41.045" v="5" actId="26606"/>
-          <ac:spMkLst>
-            <pc:docMk/>
-            <pc:sldMk cId="2114304695" sldId="259"/>
-            <ac:spMk id="19" creationId="{4D4C00DC-4DC6-4CD2-9E31-F17E6CEBC5A6}"/>
-          </ac:spMkLst>
-        </pc:spChg>
-        <pc:spChg chg="add del">
-          <ac:chgData name="Steve Swartz" userId="fa5fbd6ce30e021b" providerId="LiveId" clId="{08E1F6C1-C973-4F1F-92EE-AF2BB4FE6616}" dt="2025-04-29T17:48:41.045" v="5" actId="26606"/>
-          <ac:spMkLst>
-            <pc:docMk/>
-            <pc:sldMk cId="2114304695" sldId="259"/>
-            <ac:spMk id="21" creationId="{D82AB1B2-7970-42CF-8BF5-567C69E9FFFB}"/>
-          </ac:spMkLst>
-        </pc:spChg>
-        <pc:spChg chg="add del">
-          <ac:chgData name="Steve Swartz" userId="fa5fbd6ce30e021b" providerId="LiveId" clId="{08E1F6C1-C973-4F1F-92EE-AF2BB4FE6616}" dt="2025-04-29T17:48:41.045" v="5" actId="26606"/>
-          <ac:spMkLst>
-            <pc:docMk/>
-            <pc:sldMk cId="2114304695" sldId="259"/>
-            <ac:spMk id="27" creationId="{C10FB9CA-E7FA-462C-B537-F1224ED1ACF4}"/>
-          </ac:spMkLst>
-        </pc:spChg>
-        <pc:spChg chg="add del">
-          <ac:chgData name="Steve Swartz" userId="fa5fbd6ce30e021b" providerId="LiveId" clId="{08E1F6C1-C973-4F1F-92EE-AF2BB4FE6616}" dt="2025-04-29T17:48:41.045" v="5" actId="26606"/>
-          <ac:spMkLst>
-            <pc:docMk/>
-            <pc:sldMk cId="2114304695" sldId="259"/>
-            <ac:spMk id="29" creationId="{D8469AE7-A75B-4F37-850B-EF5974ABED2C}"/>
-          </ac:spMkLst>
-        </pc:spChg>
-      </pc:sldChg>
-      <pc:sldChg chg="del">
-        <pc:chgData name="Steve Swartz" userId="fa5fbd6ce30e021b" providerId="LiveId" clId="{08E1F6C1-C973-4F1F-92EE-AF2BB4FE6616}" dt="2025-04-29T17:47:58.392" v="1" actId="47"/>
-        <pc:sldMkLst>
-          <pc:docMk/>
-          <pc:sldMk cId="3792406271" sldId="259"/>
-        </pc:sldMkLst>
-      </pc:sldChg>
-      <pc:sldChg chg="addSp modSp add">
-        <pc:chgData name="Steve Swartz" userId="fa5fbd6ce30e021b" providerId="LiveId" clId="{08E1F6C1-C973-4F1F-92EE-AF2BB4FE6616}" dt="2025-04-29T17:53:30.592" v="148" actId="12788"/>
-        <pc:sldMkLst>
-          <pc:docMk/>
-          <pc:sldMk cId="2073332520" sldId="260"/>
-        </pc:sldMkLst>
-        <pc:spChg chg="mod">
-          <ac:chgData name="Steve Swartz" userId="fa5fbd6ce30e021b" providerId="LiveId" clId="{08E1F6C1-C973-4F1F-92EE-AF2BB4FE6616}" dt="2025-04-29T17:53:30.592" v="148" actId="12788"/>
-          <ac:spMkLst>
-            <pc:docMk/>
-            <pc:sldMk cId="2073332520" sldId="260"/>
-            <ac:spMk id="5" creationId="{CA931895-9D28-7A03-C328-13DF45BC241E}"/>
-          </ac:spMkLst>
-        </pc:spChg>
-        <pc:spChg chg="mod">
-          <ac:chgData name="Steve Swartz" userId="fa5fbd6ce30e021b" providerId="LiveId" clId="{08E1F6C1-C973-4F1F-92EE-AF2BB4FE6616}" dt="2025-04-29T17:53:30.592" v="148" actId="12788"/>
-          <ac:spMkLst>
-            <pc:docMk/>
-            <pc:sldMk cId="2073332520" sldId="260"/>
-            <ac:spMk id="6" creationId="{C1FCA5FD-646B-D8F5-BC66-2D572C6DD874}"/>
-          </ac:spMkLst>
-        </pc:spChg>
-        <pc:picChg chg="add mod">
-          <ac:chgData name="Steve Swartz" userId="fa5fbd6ce30e021b" providerId="LiveId" clId="{08E1F6C1-C973-4F1F-92EE-AF2BB4FE6616}" dt="2025-04-29T17:53:30.592" v="148" actId="12788"/>
-          <ac:picMkLst>
-            <pc:docMk/>
-            <pc:sldMk cId="2073332520" sldId="260"/>
-            <ac:picMk id="1026" creationId="{4FF44E88-63CC-E0E6-F2DB-E1E8A21A0D06}"/>
-          </ac:picMkLst>
-        </pc:picChg>
-      </pc:sldChg>
-      <pc:sldChg chg="addSp modSp new mod">
-        <pc:chgData name="Steve Swartz" userId="fa5fbd6ce30e021b" providerId="LiveId" clId="{08E1F6C1-C973-4F1F-92EE-AF2BB4FE6616}" dt="2025-04-30T00:46:44.060" v="256" actId="1076"/>
-        <pc:sldMkLst>
-          <pc:docMk/>
-          <pc:sldMk cId="3248046169" sldId="261"/>
-        </pc:sldMkLst>
-        <pc:spChg chg="mod">
-          <ac:chgData name="Steve Swartz" userId="fa5fbd6ce30e021b" providerId="LiveId" clId="{08E1F6C1-C973-4F1F-92EE-AF2BB4FE6616}" dt="2025-04-29T17:53:57.097" v="156" actId="20577"/>
-          <ac:spMkLst>
-            <pc:docMk/>
-            <pc:sldMk cId="3248046169" sldId="261"/>
-            <ac:spMk id="2" creationId="{E8035842-AC2E-692D-2CB0-5C524643964C}"/>
-          </ac:spMkLst>
-        </pc:spChg>
-        <pc:spChg chg="add mod">
-          <ac:chgData name="Steve Swartz" userId="fa5fbd6ce30e021b" providerId="LiveId" clId="{08E1F6C1-C973-4F1F-92EE-AF2BB4FE6616}" dt="2025-04-30T00:46:44.060" v="256" actId="1076"/>
-          <ac:spMkLst>
-            <pc:docMk/>
-            <pc:sldMk cId="3248046169" sldId="261"/>
-            <ac:spMk id="4" creationId="{9A78DF86-24C6-619B-451E-7BD2D5BAC47A}"/>
-          </ac:spMkLst>
-        </pc:spChg>
-      </pc:sldChg>
-      <pc:sldChg chg="addSp modSp new mod">
-        <pc:chgData name="Steve Swartz" userId="fa5fbd6ce30e021b" providerId="LiveId" clId="{08E1F6C1-C973-4F1F-92EE-AF2BB4FE6616}" dt="2025-04-30T00:46:53.233" v="257"/>
-        <pc:sldMkLst>
-          <pc:docMk/>
-          <pc:sldMk cId="3374893084" sldId="262"/>
-        </pc:sldMkLst>
-        <pc:spChg chg="mod">
-          <ac:chgData name="Steve Swartz" userId="fa5fbd6ce30e021b" providerId="LiveId" clId="{08E1F6C1-C973-4F1F-92EE-AF2BB4FE6616}" dt="2025-04-29T17:54:14.192" v="166" actId="20577"/>
-          <ac:spMkLst>
-            <pc:docMk/>
-            <pc:sldMk cId="3374893084" sldId="262"/>
-            <ac:spMk id="2" creationId="{A6314836-6CCB-0800-87F2-F2FB62A2F5DD}"/>
-          </ac:spMkLst>
-        </pc:spChg>
-        <pc:spChg chg="add mod">
-          <ac:chgData name="Steve Swartz" userId="fa5fbd6ce30e021b" providerId="LiveId" clId="{08E1F6C1-C973-4F1F-92EE-AF2BB4FE6616}" dt="2025-04-30T00:46:53.233" v="257"/>
-          <ac:spMkLst>
-            <pc:docMk/>
-            <pc:sldMk cId="3374893084" sldId="262"/>
-            <ac:spMk id="4" creationId="{F6D81339-640B-2120-501D-186170A1D569}"/>
-          </ac:spMkLst>
-        </pc:spChg>
-      </pc:sldChg>
-      <pc:sldChg chg="addSp modSp new mod">
-        <pc:chgData name="Steve Swartz" userId="fa5fbd6ce30e021b" providerId="LiveId" clId="{08E1F6C1-C973-4F1F-92EE-AF2BB4FE6616}" dt="2025-04-30T00:46:54.680" v="258"/>
-        <pc:sldMkLst>
-          <pc:docMk/>
-          <pc:sldMk cId="3467556616" sldId="263"/>
-        </pc:sldMkLst>
-        <pc:spChg chg="mod">
-          <ac:chgData name="Steve Swartz" userId="fa5fbd6ce30e021b" providerId="LiveId" clId="{08E1F6C1-C973-4F1F-92EE-AF2BB4FE6616}" dt="2025-04-29T17:54:59.193" v="177" actId="20577"/>
-          <ac:spMkLst>
-            <pc:docMk/>
-            <pc:sldMk cId="3467556616" sldId="263"/>
-            <ac:spMk id="2" creationId="{99BFB23F-D52A-C467-FE4E-6B1D91CAF88F}"/>
-          </ac:spMkLst>
-        </pc:spChg>
-        <pc:spChg chg="add mod">
-          <ac:chgData name="Steve Swartz" userId="fa5fbd6ce30e021b" providerId="LiveId" clId="{08E1F6C1-C973-4F1F-92EE-AF2BB4FE6616}" dt="2025-04-30T00:46:54.680" v="258"/>
-          <ac:spMkLst>
-            <pc:docMk/>
-            <pc:sldMk cId="3467556616" sldId="263"/>
-            <ac:spMk id="4" creationId="{9FD3C948-D4CD-8899-5F6F-639D757D95DC}"/>
-          </ac:spMkLst>
-        </pc:spChg>
-      </pc:sldChg>
-      <pc:sldChg chg="addSp modSp new mod">
-        <pc:chgData name="Steve Swartz" userId="fa5fbd6ce30e021b" providerId="LiveId" clId="{08E1F6C1-C973-4F1F-92EE-AF2BB4FE6616}" dt="2025-04-30T00:46:56.797" v="259"/>
-        <pc:sldMkLst>
-          <pc:docMk/>
-          <pc:sldMk cId="293938748" sldId="264"/>
-        </pc:sldMkLst>
-        <pc:spChg chg="mod">
-          <ac:chgData name="Steve Swartz" userId="fa5fbd6ce30e021b" providerId="LiveId" clId="{08E1F6C1-C973-4F1F-92EE-AF2BB4FE6616}" dt="2025-04-29T17:55:54.401" v="190" actId="20577"/>
-          <ac:spMkLst>
-            <pc:docMk/>
-            <pc:sldMk cId="293938748" sldId="264"/>
-            <ac:spMk id="2" creationId="{E5A5D905-17A3-E78D-3E8D-F67EFA424FE9}"/>
-          </ac:spMkLst>
-        </pc:spChg>
-        <pc:spChg chg="add mod">
-          <ac:chgData name="Steve Swartz" userId="fa5fbd6ce30e021b" providerId="LiveId" clId="{08E1F6C1-C973-4F1F-92EE-AF2BB4FE6616}" dt="2025-04-30T00:46:56.797" v="259"/>
-          <ac:spMkLst>
-            <pc:docMk/>
-            <pc:sldMk cId="293938748" sldId="264"/>
-            <ac:spMk id="4" creationId="{590D0D0C-C94B-7DA1-7885-5C46E546D7AC}"/>
-          </ac:spMkLst>
-        </pc:spChg>
-      </pc:sldChg>
-      <pc:sldChg chg="add del">
-        <pc:chgData name="Steve Swartz" userId="fa5fbd6ce30e021b" providerId="LiveId" clId="{08E1F6C1-C973-4F1F-92EE-AF2BB4FE6616}" dt="2025-04-29T17:54:45.162" v="168" actId="47"/>
-        <pc:sldMkLst>
-          <pc:docMk/>
-          <pc:sldMk cId="3071704235" sldId="265"/>
-        </pc:sldMkLst>
-      </pc:sldChg>
-      <pc:sldChg chg="addSp modSp new mod">
-        <pc:chgData name="Steve Swartz" userId="fa5fbd6ce30e021b" providerId="LiveId" clId="{08E1F6C1-C973-4F1F-92EE-AF2BB4FE6616}" dt="2025-04-30T00:47:04.604" v="263" actId="20577"/>
-        <pc:sldMkLst>
-          <pc:docMk/>
-          <pc:sldMk cId="4014904213" sldId="265"/>
-        </pc:sldMkLst>
-        <pc:spChg chg="mod">
-          <ac:chgData name="Steve Swartz" userId="fa5fbd6ce30e021b" providerId="LiveId" clId="{08E1F6C1-C973-4F1F-92EE-AF2BB4FE6616}" dt="2025-04-29T17:56:19.431" v="198" actId="20577"/>
-          <ac:spMkLst>
-            <pc:docMk/>
-            <pc:sldMk cId="4014904213" sldId="265"/>
-            <ac:spMk id="2" creationId="{76BD9005-92E2-C396-F066-E905FCB00724}"/>
-          </ac:spMkLst>
-        </pc:spChg>
-        <pc:spChg chg="add mod">
-          <ac:chgData name="Steve Swartz" userId="fa5fbd6ce30e021b" providerId="LiveId" clId="{08E1F6C1-C973-4F1F-92EE-AF2BB4FE6616}" dt="2025-04-30T00:47:04.604" v="263" actId="20577"/>
-          <ac:spMkLst>
-            <pc:docMk/>
-            <pc:sldMk cId="4014904213" sldId="265"/>
-            <ac:spMk id="4" creationId="{A910FAF8-BE86-090B-145E-977C585E43B9}"/>
-          </ac:spMkLst>
-        </pc:spChg>
-      </pc:sldChg>
-      <pc:sldChg chg="addSp modSp new mod">
-        <pc:chgData name="Steve Swartz" userId="fa5fbd6ce30e021b" providerId="LiveId" clId="{08E1F6C1-C973-4F1F-92EE-AF2BB4FE6616}" dt="2025-04-30T00:47:13.181" v="264"/>
-        <pc:sldMkLst>
-          <pc:docMk/>
-          <pc:sldMk cId="3672255520" sldId="266"/>
-        </pc:sldMkLst>
-        <pc:spChg chg="mod">
-          <ac:chgData name="Steve Swartz" userId="fa5fbd6ce30e021b" providerId="LiveId" clId="{08E1F6C1-C973-4F1F-92EE-AF2BB4FE6616}" dt="2025-04-29T17:56:25.367" v="202" actId="20577"/>
-          <ac:spMkLst>
-            <pc:docMk/>
-            <pc:sldMk cId="3672255520" sldId="266"/>
-            <ac:spMk id="2" creationId="{4C5F64E5-7B05-06C5-2BAD-15906F71492C}"/>
-          </ac:spMkLst>
-        </pc:spChg>
-        <pc:spChg chg="add mod">
-          <ac:chgData name="Steve Swartz" userId="fa5fbd6ce30e021b" providerId="LiveId" clId="{08E1F6C1-C973-4F1F-92EE-AF2BB4FE6616}" dt="2025-04-30T00:47:13.181" v="264"/>
-          <ac:spMkLst>
-            <pc:docMk/>
-            <pc:sldMk cId="3672255520" sldId="266"/>
-            <ac:spMk id="4" creationId="{138C0814-FDB5-BC5C-A332-BDC31B86FA3E}"/>
-          </ac:spMkLst>
-        </pc:spChg>
-      </pc:sldChg>
-      <pc:sldChg chg="addSp modSp new mod">
-        <pc:chgData name="Steve Swartz" userId="fa5fbd6ce30e021b" providerId="LiveId" clId="{08E1F6C1-C973-4F1F-92EE-AF2BB4FE6616}" dt="2025-04-30T00:47:15.957" v="265"/>
-        <pc:sldMkLst>
-          <pc:docMk/>
-          <pc:sldMk cId="367996804" sldId="267"/>
-        </pc:sldMkLst>
-        <pc:spChg chg="mod">
-          <ac:chgData name="Steve Swartz" userId="fa5fbd6ce30e021b" providerId="LiveId" clId="{08E1F6C1-C973-4F1F-92EE-AF2BB4FE6616}" dt="2025-04-29T17:57:20.092" v="232" actId="20577"/>
-          <ac:spMkLst>
-            <pc:docMk/>
-            <pc:sldMk cId="367996804" sldId="267"/>
-            <ac:spMk id="2" creationId="{7B95B9F2-7F85-2BE4-0E69-750F311A523A}"/>
-          </ac:spMkLst>
-        </pc:spChg>
-        <pc:spChg chg="add mod">
-          <ac:chgData name="Steve Swartz" userId="fa5fbd6ce30e021b" providerId="LiveId" clId="{08E1F6C1-C973-4F1F-92EE-AF2BB4FE6616}" dt="2025-04-30T00:47:15.957" v="265"/>
-          <ac:spMkLst>
-            <pc:docMk/>
-            <pc:sldMk cId="367996804" sldId="267"/>
-            <ac:spMk id="4" creationId="{86D7EAAB-E117-0E96-356C-E3C3424A5C17}"/>
-          </ac:spMkLst>
-        </pc:spChg>
-      </pc:sldChg>
-      <pc:sldChg chg="addSp modSp new mod">
-        <pc:chgData name="Steve Swartz" userId="fa5fbd6ce30e021b" providerId="LiveId" clId="{08E1F6C1-C973-4F1F-92EE-AF2BB4FE6616}" dt="2025-04-30T00:47:17.805" v="266"/>
-        <pc:sldMkLst>
-          <pc:docMk/>
-          <pc:sldMk cId="701201403" sldId="268"/>
-        </pc:sldMkLst>
-        <pc:spChg chg="mod">
-          <ac:chgData name="Steve Swartz" userId="fa5fbd6ce30e021b" providerId="LiveId" clId="{08E1F6C1-C973-4F1F-92EE-AF2BB4FE6616}" dt="2025-04-29T17:57:34.025" v="240" actId="20577"/>
-          <ac:spMkLst>
-            <pc:docMk/>
-            <pc:sldMk cId="701201403" sldId="268"/>
-            <ac:spMk id="2" creationId="{CEAB25EE-6E11-B86E-B9EF-313E7FAB791D}"/>
-          </ac:spMkLst>
-        </pc:spChg>
-        <pc:spChg chg="add mod">
-          <ac:chgData name="Steve Swartz" userId="fa5fbd6ce30e021b" providerId="LiveId" clId="{08E1F6C1-C973-4F1F-92EE-AF2BB4FE6616}" dt="2025-04-30T00:47:17.805" v="266"/>
-          <ac:spMkLst>
-            <pc:docMk/>
-            <pc:sldMk cId="701201403" sldId="268"/>
-            <ac:spMk id="4" creationId="{1F007838-B626-8770-3DF2-53E4D0DEFEEE}"/>
-          </ac:spMkLst>
-        </pc:spChg>
-      </pc:sldChg>
-      <pc:sldChg chg="addSp modSp new mod">
-        <pc:chgData name="Steve Swartz" userId="fa5fbd6ce30e021b" providerId="LiveId" clId="{08E1F6C1-C973-4F1F-92EE-AF2BB4FE6616}" dt="2025-04-30T00:47:23.124" v="267"/>
-        <pc:sldMkLst>
-          <pc:docMk/>
-          <pc:sldMk cId="4265348810" sldId="269"/>
-        </pc:sldMkLst>
-        <pc:spChg chg="mod">
-          <ac:chgData name="Steve Swartz" userId="fa5fbd6ce30e021b" providerId="LiveId" clId="{08E1F6C1-C973-4F1F-92EE-AF2BB4FE6616}" dt="2025-04-29T17:57:45.199" v="245" actId="20577"/>
-          <ac:spMkLst>
-            <pc:docMk/>
-            <pc:sldMk cId="4265348810" sldId="269"/>
-            <ac:spMk id="2" creationId="{9E6B45E6-120E-2C4D-861A-96D44A89CBC7}"/>
-          </ac:spMkLst>
-        </pc:spChg>
-        <pc:spChg chg="add mod">
-          <ac:chgData name="Steve Swartz" userId="fa5fbd6ce30e021b" providerId="LiveId" clId="{08E1F6C1-C973-4F1F-92EE-AF2BB4FE6616}" dt="2025-04-30T00:47:23.124" v="267"/>
-          <ac:spMkLst>
-            <pc:docMk/>
-            <pc:sldMk cId="4265348810" sldId="269"/>
-            <ac:spMk id="4" creationId="{93D7153A-DCC9-EBB7-366F-7A626241F935}"/>
-          </ac:spMkLst>
-        </pc:spChg>
-      </pc:sldChg>
-      <pc:sldChg chg="new del">
-        <pc:chgData name="Steve Swartz" userId="fa5fbd6ce30e021b" providerId="LiveId" clId="{08E1F6C1-C973-4F1F-92EE-AF2BB4FE6616}" dt="2025-04-29T17:57:47.500" v="246" actId="47"/>
-        <pc:sldMkLst>
-          <pc:docMk/>
-          <pc:sldMk cId="141497239" sldId="270"/>
-        </pc:sldMkLst>
-      </pc:sldChg>
-    </pc:docChg>
-  </pc:docChgLst>
-  <pc:docChgLst>
     <pc:chgData name="Steve Swartz" userId="fa5fbd6ce30e021b" providerId="LiveId" clId="{611A5EE7-913C-4136-9425-FBE7D3E93282}"/>
-    <pc:docChg chg="addSld delSld modSld">
-      <pc:chgData name="Steve Swartz" userId="fa5fbd6ce30e021b" providerId="LiveId" clId="{611A5EE7-913C-4136-9425-FBE7D3E93282}" dt="2025-04-30T20:51:02.615" v="1" actId="47"/>
+    <pc:docChg chg="addSld delSld modSld sldOrd">
+      <pc:chgData name="Steve Swartz" userId="fa5fbd6ce30e021b" providerId="LiveId" clId="{611A5EE7-913C-4136-9425-FBE7D3E93282}" dt="2025-05-01T16:48:12.926" v="51" actId="47"/>
       <pc:docMkLst>
         <pc:docMk/>
       </pc:docMkLst>
@@ -637,6 +222,373 @@
           <pc:sldMk cId="930106469" sldId="275"/>
         </pc:sldMkLst>
       </pc:sldChg>
+      <pc:sldChg chg="del">
+        <pc:chgData name="Steve Swartz" userId="fa5fbd6ce30e021b" providerId="LiveId" clId="{611A5EE7-913C-4136-9425-FBE7D3E93282}" dt="2025-05-01T16:47:36.426" v="40" actId="47"/>
+        <pc:sldMkLst>
+          <pc:docMk/>
+          <pc:sldMk cId="1844913287" sldId="279"/>
+        </pc:sldMkLst>
+      </pc:sldChg>
+      <pc:sldChg chg="del">
+        <pc:chgData name="Steve Swartz" userId="fa5fbd6ce30e021b" providerId="LiveId" clId="{611A5EE7-913C-4136-9425-FBE7D3E93282}" dt="2025-05-01T16:46:46.995" v="28" actId="47"/>
+        <pc:sldMkLst>
+          <pc:docMk/>
+          <pc:sldMk cId="814336363" sldId="282"/>
+        </pc:sldMkLst>
+      </pc:sldChg>
+      <pc:sldChg chg="del">
+        <pc:chgData name="Steve Swartz" userId="fa5fbd6ce30e021b" providerId="LiveId" clId="{611A5EE7-913C-4136-9425-FBE7D3E93282}" dt="2025-05-01T16:48:12.926" v="51" actId="47"/>
+        <pc:sldMkLst>
+          <pc:docMk/>
+          <pc:sldMk cId="613123339" sldId="283"/>
+        </pc:sldMkLst>
+      </pc:sldChg>
+      <pc:sldChg chg="modSp new del mod">
+        <pc:chgData name="Steve Swartz" userId="fa5fbd6ce30e021b" providerId="LiveId" clId="{611A5EE7-913C-4136-9425-FBE7D3E93282}" dt="2025-05-01T16:46:48.245" v="29" actId="47"/>
+        <pc:sldMkLst>
+          <pc:docMk/>
+          <pc:sldMk cId="2987664898" sldId="284"/>
+        </pc:sldMkLst>
+        <pc:spChg chg="mod">
+          <ac:chgData name="Steve Swartz" userId="fa5fbd6ce30e021b" providerId="LiveId" clId="{611A5EE7-913C-4136-9425-FBE7D3E93282}" dt="2025-05-01T16:45:51.936" v="17" actId="20577"/>
+          <ac:spMkLst>
+            <pc:docMk/>
+            <pc:sldMk cId="2987664898" sldId="284"/>
+            <ac:spMk id="2" creationId="{D67DBB42-F172-4A11-41A0-42E1A263B9B9}"/>
+          </ac:spMkLst>
+        </pc:spChg>
+        <pc:spChg chg="mod">
+          <ac:chgData name="Steve Swartz" userId="fa5fbd6ce30e021b" providerId="LiveId" clId="{611A5EE7-913C-4136-9425-FBE7D3E93282}" dt="2025-05-01T16:46:15.497" v="18"/>
+          <ac:spMkLst>
+            <pc:docMk/>
+            <pc:sldMk cId="2987664898" sldId="284"/>
+            <ac:spMk id="3" creationId="{52DFD888-173C-B613-393E-9E9D5ECC81A4}"/>
+          </ac:spMkLst>
+        </pc:spChg>
+      </pc:sldChg>
+      <pc:sldChg chg="modSp new mod ord">
+        <pc:chgData name="Steve Swartz" userId="fa5fbd6ce30e021b" providerId="LiveId" clId="{611A5EE7-913C-4136-9425-FBE7D3E93282}" dt="2025-05-01T16:46:44.387" v="27"/>
+        <pc:sldMkLst>
+          <pc:docMk/>
+          <pc:sldMk cId="247782850" sldId="285"/>
+        </pc:sldMkLst>
+        <pc:spChg chg="mod">
+          <ac:chgData name="Steve Swartz" userId="fa5fbd6ce30e021b" providerId="LiveId" clId="{611A5EE7-913C-4136-9425-FBE7D3E93282}" dt="2025-05-01T16:46:34.759" v="25" actId="20577"/>
+          <ac:spMkLst>
+            <pc:docMk/>
+            <pc:sldMk cId="247782850" sldId="285"/>
+            <ac:spMk id="2" creationId="{54B9A629-09EE-E5F2-5AF3-0E95DF199142}"/>
+          </ac:spMkLst>
+        </pc:spChg>
+        <pc:spChg chg="mod">
+          <ac:chgData name="Steve Swartz" userId="fa5fbd6ce30e021b" providerId="LiveId" clId="{611A5EE7-913C-4136-9425-FBE7D3E93282}" dt="2025-05-01T16:46:31.306" v="20"/>
+          <ac:spMkLst>
+            <pc:docMk/>
+            <pc:sldMk cId="247782850" sldId="285"/>
+            <ac:spMk id="3" creationId="{AA8D903A-6587-41B1-8190-CCEF94A9DE4F}"/>
+          </ac:spMkLst>
+        </pc:spChg>
+      </pc:sldChg>
+      <pc:sldChg chg="modSp new mod">
+        <pc:chgData name="Steve Swartz" userId="fa5fbd6ce30e021b" providerId="LiveId" clId="{611A5EE7-913C-4136-9425-FBE7D3E93282}" dt="2025-05-01T16:47:31.440" v="39" actId="20577"/>
+        <pc:sldMkLst>
+          <pc:docMk/>
+          <pc:sldMk cId="1620963936" sldId="286"/>
+        </pc:sldMkLst>
+        <pc:spChg chg="mod">
+          <ac:chgData name="Steve Swartz" userId="fa5fbd6ce30e021b" providerId="LiveId" clId="{611A5EE7-913C-4136-9425-FBE7D3E93282}" dt="2025-05-01T16:47:31.440" v="39" actId="20577"/>
+          <ac:spMkLst>
+            <pc:docMk/>
+            <pc:sldMk cId="1620963936" sldId="286"/>
+            <ac:spMk id="2" creationId="{58667884-9B08-75DE-8F55-D64B64876C95}"/>
+          </ac:spMkLst>
+        </pc:spChg>
+        <pc:spChg chg="mod">
+          <ac:chgData name="Steve Swartz" userId="fa5fbd6ce30e021b" providerId="LiveId" clId="{611A5EE7-913C-4136-9425-FBE7D3E93282}" dt="2025-05-01T16:47:25.458" v="32" actId="15"/>
+          <ac:spMkLst>
+            <pc:docMk/>
+            <pc:sldMk cId="1620963936" sldId="286"/>
+            <ac:spMk id="3" creationId="{6346B087-E1B9-C745-1D56-2D085C145DCD}"/>
+          </ac:spMkLst>
+        </pc:spChg>
+      </pc:sldChg>
+      <pc:sldChg chg="modSp new mod">
+        <pc:chgData name="Steve Swartz" userId="fa5fbd6ce30e021b" providerId="LiveId" clId="{611A5EE7-913C-4136-9425-FBE7D3E93282}" dt="2025-05-01T16:48:06.444" v="50"/>
+        <pc:sldMkLst>
+          <pc:docMk/>
+          <pc:sldMk cId="102353672" sldId="287"/>
+        </pc:sldMkLst>
+        <pc:spChg chg="mod">
+          <ac:chgData name="Steve Swartz" userId="fa5fbd6ce30e021b" providerId="LiveId" clId="{611A5EE7-913C-4136-9425-FBE7D3E93282}" dt="2025-05-01T16:48:01.966" v="49" actId="20577"/>
+          <ac:spMkLst>
+            <pc:docMk/>
+            <pc:sldMk cId="102353672" sldId="287"/>
+            <ac:spMk id="2" creationId="{352D85BC-1B0C-C6F9-A844-1864D3076E14}"/>
+          </ac:spMkLst>
+        </pc:spChg>
+        <pc:spChg chg="mod">
+          <ac:chgData name="Steve Swartz" userId="fa5fbd6ce30e021b" providerId="LiveId" clId="{611A5EE7-913C-4136-9425-FBE7D3E93282}" dt="2025-05-01T16:48:06.444" v="50"/>
+          <ac:spMkLst>
+            <pc:docMk/>
+            <pc:sldMk cId="102353672" sldId="287"/>
+            <ac:spMk id="3" creationId="{59D450C2-C65D-7975-AC61-26F47F92D0B1}"/>
+          </ac:spMkLst>
+        </pc:spChg>
+      </pc:sldChg>
+    </pc:docChg>
+  </pc:docChgLst>
+  <pc:docChgLst>
+    <pc:chgData name="Steve Swartz" userId="fa5fbd6ce30e021b" providerId="LiveId" clId="{08E1F6C1-C973-4F1F-92EE-AF2BB4FE6616}"/>
+    <pc:docChg chg="undo custSel addSld delSld modSld">
+      <pc:chgData name="Steve Swartz" userId="fa5fbd6ce30e021b" providerId="LiveId" clId="{08E1F6C1-C973-4F1F-92EE-AF2BB4FE6616}" dt="2025-04-30T00:47:23.124" v="267"/>
+      <pc:docMkLst>
+        <pc:docMk/>
+      </pc:docMkLst>
+      <pc:sldChg chg="del">
+        <pc:chgData name="Steve Swartz" userId="fa5fbd6ce30e021b" providerId="LiveId" clId="{08E1F6C1-C973-4F1F-92EE-AF2BB4FE6616}" dt="2025-04-29T17:47:57.130" v="0" actId="47"/>
+        <pc:sldMkLst>
+          <pc:docMk/>
+          <pc:sldMk cId="2829747970" sldId="256"/>
+        </pc:sldMkLst>
+      </pc:sldChg>
+      <pc:sldChg chg="del">
+        <pc:chgData name="Steve Swartz" userId="fa5fbd6ce30e021b" providerId="LiveId" clId="{08E1F6C1-C973-4F1F-92EE-AF2BB4FE6616}" dt="2025-04-29T17:53:45.354" v="149" actId="2696"/>
+        <pc:sldMkLst>
+          <pc:docMk/>
+          <pc:sldMk cId="1442490525" sldId="257"/>
+        </pc:sldMkLst>
+      </pc:sldChg>
+      <pc:sldChg chg="add del mod modShow">
+        <pc:chgData name="Steve Swartz" userId="fa5fbd6ce30e021b" providerId="LiveId" clId="{08E1F6C1-C973-4F1F-92EE-AF2BB4FE6616}" dt="2025-04-29T17:58:13.049" v="249" actId="729"/>
+        <pc:sldMkLst>
+          <pc:docMk/>
+          <pc:sldMk cId="3682714053" sldId="257"/>
+        </pc:sldMkLst>
+      </pc:sldChg>
+      <pc:sldChg chg="del">
+        <pc:chgData name="Steve Swartz" userId="fa5fbd6ce30e021b" providerId="LiveId" clId="{08E1F6C1-C973-4F1F-92EE-AF2BB4FE6616}" dt="2025-04-29T17:53:45.354" v="149" actId="2696"/>
+        <pc:sldMkLst>
+          <pc:docMk/>
+          <pc:sldMk cId="1866325147" sldId="258"/>
+        </pc:sldMkLst>
+      </pc:sldChg>
+      <pc:sldChg chg="add mod modShow">
+        <pc:chgData name="Steve Swartz" userId="fa5fbd6ce30e021b" providerId="LiveId" clId="{08E1F6C1-C973-4F1F-92EE-AF2BB4FE6616}" dt="2025-04-29T17:58:13.049" v="249" actId="729"/>
+        <pc:sldMkLst>
+          <pc:docMk/>
+          <pc:sldMk cId="3931126852" sldId="258"/>
+        </pc:sldMkLst>
+      </pc:sldChg>
+      <pc:sldChg chg="addSp delSp modSp new mod setBg modClrScheme chgLayout">
+        <pc:chgData name="Steve Swartz" userId="fa5fbd6ce30e021b" providerId="LiveId" clId="{08E1F6C1-C973-4F1F-92EE-AF2BB4FE6616}" dt="2025-04-29T17:51:01.092" v="139" actId="20577"/>
+        <pc:sldMkLst>
+          <pc:docMk/>
+          <pc:sldMk cId="2114304695" sldId="259"/>
+        </pc:sldMkLst>
+        <pc:spChg chg="add mod ord">
+          <ac:chgData name="Steve Swartz" userId="fa5fbd6ce30e021b" providerId="LiveId" clId="{08E1F6C1-C973-4F1F-92EE-AF2BB4FE6616}" dt="2025-04-29T17:50:51.735" v="138" actId="20577"/>
+          <ac:spMkLst>
+            <pc:docMk/>
+            <pc:sldMk cId="2114304695" sldId="259"/>
+            <ac:spMk id="5" creationId="{E08AAC93-E29F-B998-117C-855A0950F88F}"/>
+          </ac:spMkLst>
+        </pc:spChg>
+        <pc:spChg chg="add mod ord">
+          <ac:chgData name="Steve Swartz" userId="fa5fbd6ce30e021b" providerId="LiveId" clId="{08E1F6C1-C973-4F1F-92EE-AF2BB4FE6616}" dt="2025-04-29T17:51:01.092" v="139" actId="20577"/>
+          <ac:spMkLst>
+            <pc:docMk/>
+            <pc:sldMk cId="2114304695" sldId="259"/>
+            <ac:spMk id="6" creationId="{0B40E023-5541-8512-63C9-E888C2287847}"/>
+          </ac:spMkLst>
+        </pc:spChg>
+      </pc:sldChg>
+      <pc:sldChg chg="del">
+        <pc:chgData name="Steve Swartz" userId="fa5fbd6ce30e021b" providerId="LiveId" clId="{08E1F6C1-C973-4F1F-92EE-AF2BB4FE6616}" dt="2025-04-29T17:47:58.392" v="1" actId="47"/>
+        <pc:sldMkLst>
+          <pc:docMk/>
+          <pc:sldMk cId="3792406271" sldId="259"/>
+        </pc:sldMkLst>
+      </pc:sldChg>
+      <pc:sldChg chg="addSp modSp add">
+        <pc:chgData name="Steve Swartz" userId="fa5fbd6ce30e021b" providerId="LiveId" clId="{08E1F6C1-C973-4F1F-92EE-AF2BB4FE6616}" dt="2025-04-29T17:53:30.592" v="148" actId="12788"/>
+        <pc:sldMkLst>
+          <pc:docMk/>
+          <pc:sldMk cId="2073332520" sldId="260"/>
+        </pc:sldMkLst>
+        <pc:spChg chg="mod">
+          <ac:chgData name="Steve Swartz" userId="fa5fbd6ce30e021b" providerId="LiveId" clId="{08E1F6C1-C973-4F1F-92EE-AF2BB4FE6616}" dt="2025-04-29T17:53:30.592" v="148" actId="12788"/>
+          <ac:spMkLst>
+            <pc:docMk/>
+            <pc:sldMk cId="2073332520" sldId="260"/>
+            <ac:spMk id="5" creationId="{CA931895-9D28-7A03-C328-13DF45BC241E}"/>
+          </ac:spMkLst>
+        </pc:spChg>
+        <pc:spChg chg="mod">
+          <ac:chgData name="Steve Swartz" userId="fa5fbd6ce30e021b" providerId="LiveId" clId="{08E1F6C1-C973-4F1F-92EE-AF2BB4FE6616}" dt="2025-04-29T17:53:30.592" v="148" actId="12788"/>
+          <ac:spMkLst>
+            <pc:docMk/>
+            <pc:sldMk cId="2073332520" sldId="260"/>
+            <ac:spMk id="6" creationId="{C1FCA5FD-646B-D8F5-BC66-2D572C6DD874}"/>
+          </ac:spMkLst>
+        </pc:spChg>
+        <pc:picChg chg="add mod">
+          <ac:chgData name="Steve Swartz" userId="fa5fbd6ce30e021b" providerId="LiveId" clId="{08E1F6C1-C973-4F1F-92EE-AF2BB4FE6616}" dt="2025-04-29T17:53:30.592" v="148" actId="12788"/>
+          <ac:picMkLst>
+            <pc:docMk/>
+            <pc:sldMk cId="2073332520" sldId="260"/>
+            <ac:picMk id="1026" creationId="{4FF44E88-63CC-E0E6-F2DB-E1E8A21A0D06}"/>
+          </ac:picMkLst>
+        </pc:picChg>
+      </pc:sldChg>
+      <pc:sldChg chg="addSp modSp new mod">
+        <pc:chgData name="Steve Swartz" userId="fa5fbd6ce30e021b" providerId="LiveId" clId="{08E1F6C1-C973-4F1F-92EE-AF2BB4FE6616}" dt="2025-04-30T00:46:44.060" v="256" actId="1076"/>
+        <pc:sldMkLst>
+          <pc:docMk/>
+          <pc:sldMk cId="3248046169" sldId="261"/>
+        </pc:sldMkLst>
+        <pc:spChg chg="add mod">
+          <ac:chgData name="Steve Swartz" userId="fa5fbd6ce30e021b" providerId="LiveId" clId="{08E1F6C1-C973-4F1F-92EE-AF2BB4FE6616}" dt="2025-04-30T00:46:44.060" v="256" actId="1076"/>
+          <ac:spMkLst>
+            <pc:docMk/>
+            <pc:sldMk cId="3248046169" sldId="261"/>
+            <ac:spMk id="4" creationId="{9A78DF86-24C6-619B-451E-7BD2D5BAC47A}"/>
+          </ac:spMkLst>
+        </pc:spChg>
+      </pc:sldChg>
+      <pc:sldChg chg="addSp modSp new mod">
+        <pc:chgData name="Steve Swartz" userId="fa5fbd6ce30e021b" providerId="LiveId" clId="{08E1F6C1-C973-4F1F-92EE-AF2BB4FE6616}" dt="2025-04-30T00:46:53.233" v="257"/>
+        <pc:sldMkLst>
+          <pc:docMk/>
+          <pc:sldMk cId="3374893084" sldId="262"/>
+        </pc:sldMkLst>
+        <pc:spChg chg="add mod">
+          <ac:chgData name="Steve Swartz" userId="fa5fbd6ce30e021b" providerId="LiveId" clId="{08E1F6C1-C973-4F1F-92EE-AF2BB4FE6616}" dt="2025-04-30T00:46:53.233" v="257"/>
+          <ac:spMkLst>
+            <pc:docMk/>
+            <pc:sldMk cId="3374893084" sldId="262"/>
+            <ac:spMk id="4" creationId="{F6D81339-640B-2120-501D-186170A1D569}"/>
+          </ac:spMkLst>
+        </pc:spChg>
+      </pc:sldChg>
+      <pc:sldChg chg="addSp modSp new mod">
+        <pc:chgData name="Steve Swartz" userId="fa5fbd6ce30e021b" providerId="LiveId" clId="{08E1F6C1-C973-4F1F-92EE-AF2BB4FE6616}" dt="2025-04-30T00:46:54.680" v="258"/>
+        <pc:sldMkLst>
+          <pc:docMk/>
+          <pc:sldMk cId="3467556616" sldId="263"/>
+        </pc:sldMkLst>
+        <pc:spChg chg="add mod">
+          <ac:chgData name="Steve Swartz" userId="fa5fbd6ce30e021b" providerId="LiveId" clId="{08E1F6C1-C973-4F1F-92EE-AF2BB4FE6616}" dt="2025-04-30T00:46:54.680" v="258"/>
+          <ac:spMkLst>
+            <pc:docMk/>
+            <pc:sldMk cId="3467556616" sldId="263"/>
+            <ac:spMk id="4" creationId="{9FD3C948-D4CD-8899-5F6F-639D757D95DC}"/>
+          </ac:spMkLst>
+        </pc:spChg>
+      </pc:sldChg>
+      <pc:sldChg chg="addSp modSp new mod">
+        <pc:chgData name="Steve Swartz" userId="fa5fbd6ce30e021b" providerId="LiveId" clId="{08E1F6C1-C973-4F1F-92EE-AF2BB4FE6616}" dt="2025-04-30T00:46:56.797" v="259"/>
+        <pc:sldMkLst>
+          <pc:docMk/>
+          <pc:sldMk cId="293938748" sldId="264"/>
+        </pc:sldMkLst>
+        <pc:spChg chg="add mod">
+          <ac:chgData name="Steve Swartz" userId="fa5fbd6ce30e021b" providerId="LiveId" clId="{08E1F6C1-C973-4F1F-92EE-AF2BB4FE6616}" dt="2025-04-30T00:46:56.797" v="259"/>
+          <ac:spMkLst>
+            <pc:docMk/>
+            <pc:sldMk cId="293938748" sldId="264"/>
+            <ac:spMk id="4" creationId="{590D0D0C-C94B-7DA1-7885-5C46E546D7AC}"/>
+          </ac:spMkLst>
+        </pc:spChg>
+      </pc:sldChg>
+      <pc:sldChg chg="add del">
+        <pc:chgData name="Steve Swartz" userId="fa5fbd6ce30e021b" providerId="LiveId" clId="{08E1F6C1-C973-4F1F-92EE-AF2BB4FE6616}" dt="2025-04-29T17:54:45.162" v="168" actId="47"/>
+        <pc:sldMkLst>
+          <pc:docMk/>
+          <pc:sldMk cId="3071704235" sldId="265"/>
+        </pc:sldMkLst>
+      </pc:sldChg>
+      <pc:sldChg chg="addSp modSp new mod">
+        <pc:chgData name="Steve Swartz" userId="fa5fbd6ce30e021b" providerId="LiveId" clId="{08E1F6C1-C973-4F1F-92EE-AF2BB4FE6616}" dt="2025-04-30T00:47:04.604" v="263" actId="20577"/>
+        <pc:sldMkLst>
+          <pc:docMk/>
+          <pc:sldMk cId="4014904213" sldId="265"/>
+        </pc:sldMkLst>
+        <pc:spChg chg="add mod">
+          <ac:chgData name="Steve Swartz" userId="fa5fbd6ce30e021b" providerId="LiveId" clId="{08E1F6C1-C973-4F1F-92EE-AF2BB4FE6616}" dt="2025-04-30T00:47:04.604" v="263" actId="20577"/>
+          <ac:spMkLst>
+            <pc:docMk/>
+            <pc:sldMk cId="4014904213" sldId="265"/>
+            <ac:spMk id="4" creationId="{A910FAF8-BE86-090B-145E-977C585E43B9}"/>
+          </ac:spMkLst>
+        </pc:spChg>
+      </pc:sldChg>
+      <pc:sldChg chg="addSp modSp new mod">
+        <pc:chgData name="Steve Swartz" userId="fa5fbd6ce30e021b" providerId="LiveId" clId="{08E1F6C1-C973-4F1F-92EE-AF2BB4FE6616}" dt="2025-04-30T00:47:13.181" v="264"/>
+        <pc:sldMkLst>
+          <pc:docMk/>
+          <pc:sldMk cId="3672255520" sldId="266"/>
+        </pc:sldMkLst>
+        <pc:spChg chg="add mod">
+          <ac:chgData name="Steve Swartz" userId="fa5fbd6ce30e021b" providerId="LiveId" clId="{08E1F6C1-C973-4F1F-92EE-AF2BB4FE6616}" dt="2025-04-30T00:47:13.181" v="264"/>
+          <ac:spMkLst>
+            <pc:docMk/>
+            <pc:sldMk cId="3672255520" sldId="266"/>
+            <ac:spMk id="4" creationId="{138C0814-FDB5-BC5C-A332-BDC31B86FA3E}"/>
+          </ac:spMkLst>
+        </pc:spChg>
+      </pc:sldChg>
+      <pc:sldChg chg="addSp modSp new mod">
+        <pc:chgData name="Steve Swartz" userId="fa5fbd6ce30e021b" providerId="LiveId" clId="{08E1F6C1-C973-4F1F-92EE-AF2BB4FE6616}" dt="2025-04-30T00:47:15.957" v="265"/>
+        <pc:sldMkLst>
+          <pc:docMk/>
+          <pc:sldMk cId="367996804" sldId="267"/>
+        </pc:sldMkLst>
+        <pc:spChg chg="add mod">
+          <ac:chgData name="Steve Swartz" userId="fa5fbd6ce30e021b" providerId="LiveId" clId="{08E1F6C1-C973-4F1F-92EE-AF2BB4FE6616}" dt="2025-04-30T00:47:15.957" v="265"/>
+          <ac:spMkLst>
+            <pc:docMk/>
+            <pc:sldMk cId="367996804" sldId="267"/>
+            <ac:spMk id="4" creationId="{86D7EAAB-E117-0E96-356C-E3C3424A5C17}"/>
+          </ac:spMkLst>
+        </pc:spChg>
+      </pc:sldChg>
+      <pc:sldChg chg="addSp modSp new mod">
+        <pc:chgData name="Steve Swartz" userId="fa5fbd6ce30e021b" providerId="LiveId" clId="{08E1F6C1-C973-4F1F-92EE-AF2BB4FE6616}" dt="2025-04-30T00:47:17.805" v="266"/>
+        <pc:sldMkLst>
+          <pc:docMk/>
+          <pc:sldMk cId="701201403" sldId="268"/>
+        </pc:sldMkLst>
+        <pc:spChg chg="add mod">
+          <ac:chgData name="Steve Swartz" userId="fa5fbd6ce30e021b" providerId="LiveId" clId="{08E1F6C1-C973-4F1F-92EE-AF2BB4FE6616}" dt="2025-04-30T00:47:17.805" v="266"/>
+          <ac:spMkLst>
+            <pc:docMk/>
+            <pc:sldMk cId="701201403" sldId="268"/>
+            <ac:spMk id="4" creationId="{1F007838-B626-8770-3DF2-53E4D0DEFEEE}"/>
+          </ac:spMkLst>
+        </pc:spChg>
+      </pc:sldChg>
+      <pc:sldChg chg="addSp modSp new mod">
+        <pc:chgData name="Steve Swartz" userId="fa5fbd6ce30e021b" providerId="LiveId" clId="{08E1F6C1-C973-4F1F-92EE-AF2BB4FE6616}" dt="2025-04-30T00:47:23.124" v="267"/>
+        <pc:sldMkLst>
+          <pc:docMk/>
+          <pc:sldMk cId="4265348810" sldId="269"/>
+        </pc:sldMkLst>
+        <pc:spChg chg="add mod">
+          <ac:chgData name="Steve Swartz" userId="fa5fbd6ce30e021b" providerId="LiveId" clId="{08E1F6C1-C973-4F1F-92EE-AF2BB4FE6616}" dt="2025-04-30T00:47:23.124" v="267"/>
+          <ac:spMkLst>
+            <pc:docMk/>
+            <pc:sldMk cId="4265348810" sldId="269"/>
+            <ac:spMk id="4" creationId="{93D7153A-DCC9-EBB7-366F-7A626241F935}"/>
+          </ac:spMkLst>
+        </pc:spChg>
+      </pc:sldChg>
+      <pc:sldChg chg="new del">
+        <pc:chgData name="Steve Swartz" userId="fa5fbd6ce30e021b" providerId="LiveId" clId="{08E1F6C1-C973-4F1F-92EE-AF2BB4FE6616}" dt="2025-04-29T17:57:47.500" v="246" actId="47"/>
+        <pc:sldMkLst>
+          <pc:docMk/>
+          <pc:sldMk cId="141497239" sldId="270"/>
+        </pc:sldMkLst>
+      </pc:sldChg>
     </pc:docChg>
   </pc:docChgLst>
 </pc:chgInfo>
@@ -724,7 +676,7 @@
           <a:p>
             <a:fld id="{DEF17133-554E-4767-B7F1-983C9D24CB7E}" type="datetimeFigureOut">
               <a:rPr lang="en-US" smtClean="0"/>
-              <a:t>01-May-25</a:t>
+              <a:t>5/1/2025</a:t>
             </a:fld>
             <a:endParaRPr lang="en-US"/>
           </a:p>
@@ -996,342 +948,6 @@
   <p:cSld>
     <p:spTree>
       <p:nvGrpSpPr>
-        <p:cNvPr id="1" name=""/>
-        <p:cNvGrpSpPr/>
-        <p:nvPr/>
-      </p:nvGrpSpPr>
-      <p:grpSpPr>
-        <a:xfrm>
-          <a:off x="0" y="0"/>
-          <a:ext cx="0" cy="0"/>
-          <a:chOff x="0" y="0"/>
-          <a:chExt cx="0" cy="0"/>
-        </a:xfrm>
-      </p:grpSpPr>
-      <p:sp>
-        <p:nvSpPr>
-          <p:cNvPr id="2" name="Slide Image Placeholder 1"/>
-          <p:cNvSpPr>
-            <a:spLocks noGrp="1" noRot="1" noChangeAspect="1"/>
-          </p:cNvSpPr>
-          <p:nvPr>
-            <p:ph type="sldImg"/>
-          </p:nvPr>
-        </p:nvSpPr>
-        <p:spPr/>
-      </p:sp>
-      <p:sp>
-        <p:nvSpPr>
-          <p:cNvPr id="3" name="Notes Placeholder 2"/>
-          <p:cNvSpPr>
-            <a:spLocks noGrp="1"/>
-          </p:cNvSpPr>
-          <p:nvPr>
-            <p:ph type="body" idx="1"/>
-          </p:nvPr>
-        </p:nvSpPr>
-        <p:spPr/>
-        <p:txBody>
-          <a:bodyPr/>
-          <a:lstStyle/>
-          <a:p>
-            <a:endParaRPr lang="en-US" dirty="0"/>
-          </a:p>
-        </p:txBody>
-      </p:sp>
-      <p:sp>
-        <p:nvSpPr>
-          <p:cNvPr id="4" name="Slide Number Placeholder 3"/>
-          <p:cNvSpPr>
-            <a:spLocks noGrp="1"/>
-          </p:cNvSpPr>
-          <p:nvPr>
-            <p:ph type="sldNum" sz="quarter" idx="5"/>
-          </p:nvPr>
-        </p:nvSpPr>
-        <p:spPr/>
-        <p:txBody>
-          <a:bodyPr/>
-          <a:lstStyle/>
-          <a:p>
-            <a:fld id="{71C0E5CD-2A3C-4784-9C53-84840DFC1E9E}" type="slidenum">
-              <a:rPr lang="en-US" smtClean="0"/>
-              <a:t>2</a:t>
-            </a:fld>
-            <a:endParaRPr lang="en-US"/>
-          </a:p>
-        </p:txBody>
-      </p:sp>
-    </p:spTree>
-    <p:extLst>
-      <p:ext uri="{BB962C8B-B14F-4D97-AF65-F5344CB8AC3E}">
-        <p14:creationId xmlns:p14="http://schemas.microsoft.com/office/powerpoint/2010/main" val="1388735227"/>
-      </p:ext>
-    </p:extLst>
-  </p:cSld>
-  <p:clrMapOvr>
-    <a:masterClrMapping/>
-  </p:clrMapOvr>
-</p:notes>
-</file>
-
-<file path=ppt/notesSlides/notesSlide2.xml><?xml version="1.0" encoding="utf-8"?>
-<p:notes xmlns:a="http://schemas.openxmlformats.org/drawingml/2006/main" xmlns:r="http://schemas.openxmlformats.org/officeDocument/2006/relationships" xmlns:p="http://schemas.openxmlformats.org/presentationml/2006/main">
-  <p:cSld>
-    <p:spTree>
-      <p:nvGrpSpPr>
-        <p:cNvPr id="1" name="">
-          <a:extLst>
-            <a:ext uri="{FF2B5EF4-FFF2-40B4-BE49-F238E27FC236}">
-              <a16:creationId xmlns:a16="http://schemas.microsoft.com/office/drawing/2014/main" id="{0C1EAD06-9138-C2B8-D252-779D6F0EE135}"/>
-            </a:ext>
-          </a:extLst>
-        </p:cNvPr>
-        <p:cNvGrpSpPr/>
-        <p:nvPr/>
-      </p:nvGrpSpPr>
-      <p:grpSpPr>
-        <a:xfrm>
-          <a:off x="0" y="0"/>
-          <a:ext cx="0" cy="0"/>
-          <a:chOff x="0" y="0"/>
-          <a:chExt cx="0" cy="0"/>
-        </a:xfrm>
-      </p:grpSpPr>
-      <p:sp>
-        <p:nvSpPr>
-          <p:cNvPr id="2" name="Slide Image Placeholder 1">
-            <a:extLst>
-              <a:ext uri="{FF2B5EF4-FFF2-40B4-BE49-F238E27FC236}">
-                <a16:creationId xmlns:a16="http://schemas.microsoft.com/office/drawing/2014/main" id="{BBCF0FDC-05E2-34C7-6B8A-2288937878E6}"/>
-              </a:ext>
-            </a:extLst>
-          </p:cNvPr>
-          <p:cNvSpPr>
-            <a:spLocks noGrp="1" noRot="1" noChangeAspect="1"/>
-          </p:cNvSpPr>
-          <p:nvPr>
-            <p:ph type="sldImg"/>
-          </p:nvPr>
-        </p:nvSpPr>
-        <p:spPr/>
-      </p:sp>
-      <p:sp>
-        <p:nvSpPr>
-          <p:cNvPr id="3" name="Notes Placeholder 2">
-            <a:extLst>
-              <a:ext uri="{FF2B5EF4-FFF2-40B4-BE49-F238E27FC236}">
-                <a16:creationId xmlns:a16="http://schemas.microsoft.com/office/drawing/2014/main" id="{BAFF476A-ED85-5B26-2ED4-3DC5580E882C}"/>
-              </a:ext>
-            </a:extLst>
-          </p:cNvPr>
-          <p:cNvSpPr>
-            <a:spLocks noGrp="1"/>
-          </p:cNvSpPr>
-          <p:nvPr>
-            <p:ph type="body" idx="1"/>
-          </p:nvPr>
-        </p:nvSpPr>
-        <p:spPr/>
-        <p:txBody>
-          <a:bodyPr/>
-          <a:lstStyle/>
-          <a:p>
-            <a:pPr marL="0" marR="0" lvl="0" indent="0" algn="l" defTabSz="914400" rtl="0" eaLnBrk="1" fontAlgn="auto" latinLnBrk="0" hangingPunct="1">
-              <a:lnSpc>
-                <a:spcPct val="100000"/>
-              </a:lnSpc>
-              <a:spcBef>
-                <a:spcPts val="0"/>
-              </a:spcBef>
-              <a:spcAft>
-                <a:spcPts val="0"/>
-              </a:spcAft>
-              <a:buClrTx/>
-              <a:buSzTx/>
-              <a:buFontTx/>
-              <a:buNone/>
-              <a:tabLst/>
-              <a:defRPr/>
-            </a:pPr>
-            <a:r>
-              <a:rPr lang="en-US" dirty="0"/>
-              <a:t>OWFs provide essential “blue electricity”, but their siting and development can impact fisheries, wildlife, views, tourism, and other coastal resources.</a:t>
-            </a:r>
-          </a:p>
-          <a:p>
-            <a:pPr>
-              <a:buNone/>
-            </a:pPr>
-            <a:endParaRPr lang="en-US" b="0" dirty="0"/>
-          </a:p>
-          <a:p>
-            <a:pPr>
-              <a:buNone/>
-            </a:pPr>
-            <a:r>
-              <a:rPr lang="en-US" b="0" dirty="0"/>
-              <a:t>We need ‘blue electricity’ for climate stability and energy security, but deploying OWFs brings significant trade-offs. For example:</a:t>
-            </a:r>
-          </a:p>
-          <a:p>
-            <a:pPr>
-              <a:buFont typeface="Arial" panose="020B0604020202020204" pitchFamily="34" charset="0"/>
-              <a:buChar char="•"/>
-            </a:pPr>
-            <a:r>
-              <a:rPr lang="en-US" b="0" dirty="0"/>
-              <a:t>Fisheries may lose income as key fishing grounds overlap with wind farm areas.</a:t>
-            </a:r>
-          </a:p>
-          <a:p>
-            <a:pPr>
-              <a:buFont typeface="Arial" panose="020B0604020202020204" pitchFamily="34" charset="0"/>
-              <a:buChar char="•"/>
-            </a:pPr>
-            <a:r>
-              <a:rPr lang="en-US" b="0" dirty="0"/>
-              <a:t>Wildlife may be at risk due to turbine placement disrupting migration routes or habitats.</a:t>
-            </a:r>
-          </a:p>
-          <a:p>
-            <a:pPr>
-              <a:buFont typeface="Arial" panose="020B0604020202020204" pitchFamily="34" charset="0"/>
-              <a:buChar char="•"/>
-            </a:pPr>
-            <a:r>
-              <a:rPr lang="en-US" b="0" dirty="0"/>
-              <a:t>Tourism could be impacted by visual changes to the coast.</a:t>
-            </a:r>
-          </a:p>
-          <a:p>
-            <a:r>
-              <a:rPr lang="en-US" b="0" dirty="0"/>
-              <a:t>The question here is: How can we organize and structure the data on these impacts so that policy makers can clearly understand the trade-offs and make informed decisions about where to deploy these farms?</a:t>
-            </a:r>
-            <a:br>
-              <a:rPr lang="en-US" b="0" dirty="0"/>
-            </a:br>
-            <a:endParaRPr lang="en-US" b="0" dirty="0"/>
-          </a:p>
-          <a:p>
-            <a:pPr>
-              <a:buNone/>
-            </a:pPr>
-            <a:r>
-              <a:rPr lang="en-US" b="0" dirty="0"/>
-              <a:t>GRAPHS: trade-offs between energy generation (in megawatts, MW) and fisheries value and wildlife vulnerability (seabirds and cetaceans).</a:t>
-            </a:r>
-          </a:p>
-          <a:p>
-            <a:pPr>
-              <a:buFont typeface="Arial" panose="020B0604020202020204" pitchFamily="34" charset="0"/>
-              <a:buChar char="•"/>
-            </a:pPr>
-            <a:r>
-              <a:rPr lang="en-US" b="0" dirty="0"/>
-              <a:t>Graph a (Fisheries Value vs. Energy Value):</a:t>
-            </a:r>
-            <a:br>
-              <a:rPr lang="en-US" b="0" dirty="0"/>
-            </a:br>
-            <a:r>
-              <a:rPr lang="en-US" b="0" dirty="0"/>
-              <a:t>This graph shows that as we increase energy production (MW), the fisheries value significantly decreases. The data suggests a non-linear relationship where higher energy outputs (towards 1500 MW) result in much lower fisheries values. We can see that the fisheries value plummets as the energy output increases, especially after a certain threshold. This is an important tradeoff — more turbines may generate more electricity, but they also lead to larger economic losses for fisheries.</a:t>
-            </a:r>
-          </a:p>
-          <a:p>
-            <a:pPr>
-              <a:buFont typeface="Arial" panose="020B0604020202020204" pitchFamily="34" charset="0"/>
-              <a:buChar char="•"/>
-            </a:pPr>
-            <a:r>
-              <a:rPr lang="en-US" b="0" dirty="0"/>
-              <a:t>Graph b (Seabird Vulnerability vs. Energy Value):</a:t>
-            </a:r>
-            <a:br>
-              <a:rPr lang="en-US" b="0" dirty="0"/>
-            </a:br>
-            <a:r>
-              <a:rPr lang="en-US" b="0" dirty="0"/>
-              <a:t>This graph indicates the vulnerability of seabirds as the energy production increases. As we increase wind farm energy capacity (MW), seabird vulnerability also increases. This suggests that the placement of wind farms impacts seabird populations, with a significant increase in vulnerability as the size of the wind farms grows. The inset shows a more detailed view for energy outputs around 500 MW, revealing how these vulnerabilities are exacerbated by larger projects.</a:t>
-            </a:r>
-          </a:p>
-          <a:p>
-            <a:pPr>
-              <a:buFont typeface="Arial" panose="020B0604020202020204" pitchFamily="34" charset="0"/>
-              <a:buChar char="•"/>
-            </a:pPr>
-            <a:r>
-              <a:rPr lang="en-US" b="0" dirty="0"/>
-              <a:t>Graph c (Cetacean Vulnerability vs. Energy Value):</a:t>
-            </a:r>
-            <a:br>
-              <a:rPr lang="en-US" b="0" dirty="0"/>
-            </a:br>
-            <a:r>
-              <a:rPr lang="en-US" b="0" dirty="0"/>
-              <a:t>Similar to seabirds, the vulnerability of cetaceans (whales, dolphins) increases as we move toward higher energy production. Cetaceans show a steeper vulnerability curve, where their risk increases rapidly with energy production. This highlights that larger wind farms could disrupt marine life, particularly whales and dolphins.</a:t>
-            </a:r>
-          </a:p>
-          <a:p>
-            <a:r>
-              <a:rPr lang="en-US" b="0" dirty="0"/>
-              <a:t>Together, these graphs emphasize the complex tradeoffs we must consider when siting wind farms. More energy output means more economic benefits, but it also leads to significant impacts on fisheries and marine wildlife. Our challenge is finding a way to balance these factors and minimize negative consequences while still achieving high energy production</a:t>
-            </a:r>
-          </a:p>
-          <a:p>
-            <a:endParaRPr lang="en-US" b="0" dirty="0"/>
-          </a:p>
-        </p:txBody>
-      </p:sp>
-      <p:sp>
-        <p:nvSpPr>
-          <p:cNvPr id="4" name="Slide Number Placeholder 3">
-            <a:extLst>
-              <a:ext uri="{FF2B5EF4-FFF2-40B4-BE49-F238E27FC236}">
-                <a16:creationId xmlns:a16="http://schemas.microsoft.com/office/drawing/2014/main" id="{0FC0B734-98DF-0182-9009-71F3C8A7736C}"/>
-              </a:ext>
-            </a:extLst>
-          </p:cNvPr>
-          <p:cNvSpPr>
-            <a:spLocks noGrp="1"/>
-          </p:cNvSpPr>
-          <p:nvPr>
-            <p:ph type="sldNum" sz="quarter" idx="5"/>
-          </p:nvPr>
-        </p:nvSpPr>
-        <p:spPr/>
-        <p:txBody>
-          <a:bodyPr/>
-          <a:lstStyle/>
-          <a:p>
-            <a:fld id="{684CEEFA-1CB2-4617-A8B8-BC080926CCB5}" type="slidenum">
-              <a:rPr lang="en-US" smtClean="0"/>
-              <a:t>3</a:t>
-            </a:fld>
-            <a:endParaRPr lang="en-US"/>
-          </a:p>
-        </p:txBody>
-      </p:sp>
-    </p:spTree>
-    <p:extLst>
-      <p:ext uri="{BB962C8B-B14F-4D97-AF65-F5344CB8AC3E}">
-        <p14:creationId xmlns:p14="http://schemas.microsoft.com/office/powerpoint/2010/main" val="487890470"/>
-      </p:ext>
-    </p:extLst>
-  </p:cSld>
-  <p:clrMapOvr>
-    <a:masterClrMapping/>
-  </p:clrMapOvr>
-</p:notes>
-</file>
-
-<file path=ppt/notesSlides/notesSlide3.xml><?xml version="1.0" encoding="utf-8"?>
-<p:notes xmlns:a="http://schemas.openxmlformats.org/drawingml/2006/main" xmlns:r="http://schemas.openxmlformats.org/officeDocument/2006/relationships" xmlns:p="http://schemas.openxmlformats.org/presentationml/2006/main">
-  <p:cSld>
-    <p:spTree>
-      <p:nvGrpSpPr>
         <p:cNvPr id="1" name="">
           <a:extLst>
             <a:ext uri="{FF2B5EF4-FFF2-40B4-BE49-F238E27FC236}">
@@ -1749,7 +1365,7 @@
           <a:p>
             <a:fld id="{F36F61C0-5178-44D8-8269-00E6008AF246}" type="datetimeFigureOut">
               <a:rPr lang="en-US" smtClean="0"/>
-              <a:t>01-May-25</a:t>
+              <a:t>5/1/2025</a:t>
             </a:fld>
             <a:endParaRPr lang="en-US"/>
           </a:p>
@@ -1947,7 +1563,7 @@
           <a:p>
             <a:fld id="{F36F61C0-5178-44D8-8269-00E6008AF246}" type="datetimeFigureOut">
               <a:rPr lang="en-US" smtClean="0"/>
-              <a:t>01-May-25</a:t>
+              <a:t>5/1/2025</a:t>
             </a:fld>
             <a:endParaRPr lang="en-US"/>
           </a:p>
@@ -2155,7 +1771,7 @@
           <a:p>
             <a:fld id="{F36F61C0-5178-44D8-8269-00E6008AF246}" type="datetimeFigureOut">
               <a:rPr lang="en-US" smtClean="0"/>
-              <a:t>01-May-25</a:t>
+              <a:t>5/1/2025</a:t>
             </a:fld>
             <a:endParaRPr lang="en-US"/>
           </a:p>
@@ -2353,7 +1969,7 @@
           <a:p>
             <a:fld id="{F36F61C0-5178-44D8-8269-00E6008AF246}" type="datetimeFigureOut">
               <a:rPr lang="en-US" smtClean="0"/>
-              <a:t>01-May-25</a:t>
+              <a:t>5/1/2025</a:t>
             </a:fld>
             <a:endParaRPr lang="en-US"/>
           </a:p>
@@ -2628,7 +2244,7 @@
           <a:p>
             <a:fld id="{F36F61C0-5178-44D8-8269-00E6008AF246}" type="datetimeFigureOut">
               <a:rPr lang="en-US" smtClean="0"/>
-              <a:t>01-May-25</a:t>
+              <a:t>5/1/2025</a:t>
             </a:fld>
             <a:endParaRPr lang="en-US"/>
           </a:p>
@@ -2893,7 +2509,7 @@
           <a:p>
             <a:fld id="{F36F61C0-5178-44D8-8269-00E6008AF246}" type="datetimeFigureOut">
               <a:rPr lang="en-US" smtClean="0"/>
-              <a:t>01-May-25</a:t>
+              <a:t>5/1/2025</a:t>
             </a:fld>
             <a:endParaRPr lang="en-US"/>
           </a:p>
@@ -3305,7 +2921,7 @@
           <a:p>
             <a:fld id="{F36F61C0-5178-44D8-8269-00E6008AF246}" type="datetimeFigureOut">
               <a:rPr lang="en-US" smtClean="0"/>
-              <a:t>01-May-25</a:t>
+              <a:t>5/1/2025</a:t>
             </a:fld>
             <a:endParaRPr lang="en-US"/>
           </a:p>
@@ -3446,7 +3062,7 @@
           <a:p>
             <a:fld id="{F36F61C0-5178-44D8-8269-00E6008AF246}" type="datetimeFigureOut">
               <a:rPr lang="en-US" smtClean="0"/>
-              <a:t>01-May-25</a:t>
+              <a:t>5/1/2025</a:t>
             </a:fld>
             <a:endParaRPr lang="en-US"/>
           </a:p>
@@ -3559,7 +3175,7 @@
           <a:p>
             <a:fld id="{F36F61C0-5178-44D8-8269-00E6008AF246}" type="datetimeFigureOut">
               <a:rPr lang="en-US" smtClean="0"/>
-              <a:t>01-May-25</a:t>
+              <a:t>5/1/2025</a:t>
             </a:fld>
             <a:endParaRPr lang="en-US"/>
           </a:p>
@@ -3870,7 +3486,7 @@
           <a:p>
             <a:fld id="{F36F61C0-5178-44D8-8269-00E6008AF246}" type="datetimeFigureOut">
               <a:rPr lang="en-US" smtClean="0"/>
-              <a:t>01-May-25</a:t>
+              <a:t>5/1/2025</a:t>
             </a:fld>
             <a:endParaRPr lang="en-US"/>
           </a:p>
@@ -4158,7 +3774,7 @@
           <a:p>
             <a:fld id="{F36F61C0-5178-44D8-8269-00E6008AF246}" type="datetimeFigureOut">
               <a:rPr lang="en-US" smtClean="0"/>
-              <a:t>01-May-25</a:t>
+              <a:t>5/1/2025</a:t>
             </a:fld>
             <a:endParaRPr lang="en-US"/>
           </a:p>
@@ -4399,7 +4015,7 @@
           <a:p>
             <a:fld id="{F36F61C0-5178-44D8-8269-00E6008AF246}" type="datetimeFigureOut">
               <a:rPr lang="en-US" smtClean="0"/>
-              <a:t>01-May-25</a:t>
+              <a:t>5/1/2025</a:t>
             </a:fld>
             <a:endParaRPr lang="en-US"/>
           </a:p>
@@ -5677,7 +5293,7 @@
           <p:cNvPr id="2" name="Title 1">
             <a:extLst>
               <a:ext uri="{FF2B5EF4-FFF2-40B4-BE49-F238E27FC236}">
-                <a16:creationId xmlns:a16="http://schemas.microsoft.com/office/drawing/2014/main" id="{DF4CCF77-3136-0642-671A-3D34D339CB52}"/>
+                <a16:creationId xmlns:a16="http://schemas.microsoft.com/office/drawing/2014/main" id="{54B9A629-09EE-E5F2-5AF3-0E95DF199142}"/>
               </a:ext>
             </a:extLst>
           </p:cNvPr>
@@ -5705,7 +5321,7 @@
           <p:cNvPr id="3" name="Content Placeholder 2">
             <a:extLst>
               <a:ext uri="{FF2B5EF4-FFF2-40B4-BE49-F238E27FC236}">
-                <a16:creationId xmlns:a16="http://schemas.microsoft.com/office/drawing/2014/main" id="{0C3F4A03-3D15-B781-BA3B-939E62667835}"/>
+                <a16:creationId xmlns:a16="http://schemas.microsoft.com/office/drawing/2014/main" id="{AA8D903A-6587-41B1-8190-CCEF94A9DE4F}"/>
               </a:ext>
             </a:extLst>
           </p:cNvPr>
@@ -5716,45 +5332,31 @@
             <p:ph idx="1"/>
           </p:nvPr>
         </p:nvSpPr>
-        <p:spPr>
-          <a:xfrm>
-            <a:off x="838200" y="1825625"/>
-            <a:ext cx="10515600" cy="4351338"/>
-          </a:xfrm>
-        </p:spPr>
-        <p:txBody>
-          <a:bodyPr>
-            <a:normAutofit/>
-          </a:bodyPr>
-          <a:lstStyle/>
-          <a:p>
-            <a:pPr algn="just">
-              <a:lnSpc>
-                <a:spcPct val="150000"/>
-              </a:lnSpc>
-            </a:pPr>
+        <p:spPr/>
+        <p:txBody>
+          <a:bodyPr/>
+          <a:lstStyle/>
+          <a:p>
             <a:r>
               <a:rPr lang="en-US" dirty="0"/>
               <a:t>Most existing models focus mainly on energy generation (power output). We need a holistic approach that accounts for social, economic, and environmental factors.</a:t>
             </a:r>
           </a:p>
           <a:p>
-            <a:pPr algn="just">
-              <a:lnSpc>
-                <a:spcPct val="150000"/>
-              </a:lnSpc>
-            </a:pPr>
             <a:r>
               <a:rPr lang="en-US" dirty="0"/>
               <a:t>How can we support the consideration of issues other than power generation during offshore wind farm (OWF) lease allocation?</a:t>
             </a:r>
+          </a:p>
+          <a:p>
+            <a:endParaRPr lang="en-US" dirty="0"/>
           </a:p>
         </p:txBody>
       </p:sp>
     </p:spTree>
     <p:extLst>
       <p:ext uri="{BB962C8B-B14F-4D97-AF65-F5344CB8AC3E}">
-        <p14:creationId xmlns:p14="http://schemas.microsoft.com/office/powerpoint/2010/main" val="814336363"/>
+        <p14:creationId xmlns:p14="http://schemas.microsoft.com/office/powerpoint/2010/main" val="247782850"/>
       </p:ext>
     </p:extLst>
   </p:cSld>
@@ -5769,13 +5371,7 @@
   <p:cSld>
     <p:spTree>
       <p:nvGrpSpPr>
-        <p:cNvPr id="1" name="">
-          <a:extLst>
-            <a:ext uri="{FF2B5EF4-FFF2-40B4-BE49-F238E27FC236}">
-              <a16:creationId xmlns:a16="http://schemas.microsoft.com/office/drawing/2014/main" id="{74B62C02-81E5-1062-A4F1-D923C3658D6C}"/>
-            </a:ext>
-          </a:extLst>
-        </p:cNvPr>
+        <p:cNvPr id="1" name=""/>
         <p:cNvGrpSpPr/>
         <p:nvPr/>
       </p:nvGrpSpPr>
@@ -5792,7 +5388,7 @@
           <p:cNvPr id="2" name="Title 1">
             <a:extLst>
               <a:ext uri="{FF2B5EF4-FFF2-40B4-BE49-F238E27FC236}">
-                <a16:creationId xmlns:a16="http://schemas.microsoft.com/office/drawing/2014/main" id="{42271DAF-D4A2-6F4D-C7D9-700334F5A6D0}"/>
+                <a16:creationId xmlns:a16="http://schemas.microsoft.com/office/drawing/2014/main" id="{58667884-9B08-75DE-8F55-D64B64876C95}"/>
               </a:ext>
             </a:extLst>
           </p:cNvPr>
@@ -5803,16 +5399,9 @@
             <p:ph type="title"/>
           </p:nvPr>
         </p:nvSpPr>
-        <p:spPr>
-          <a:xfrm>
-            <a:off x="1137034" y="609597"/>
-            <a:ext cx="9392421" cy="1330841"/>
-          </a:xfrm>
-        </p:spPr>
-        <p:txBody>
-          <a:bodyPr>
-            <a:normAutofit/>
-          </a:bodyPr>
+        <p:spPr/>
+        <p:txBody>
+          <a:bodyPr/>
           <a:lstStyle/>
           <a:p>
             <a:r>
@@ -5827,7 +5416,7 @@
           <p:cNvPr id="3" name="Content Placeholder 2">
             <a:extLst>
               <a:ext uri="{FF2B5EF4-FFF2-40B4-BE49-F238E27FC236}">
-                <a16:creationId xmlns:a16="http://schemas.microsoft.com/office/drawing/2014/main" id="{4D878C69-5722-4D28-9399-AC9BD7BC633F}"/>
+                <a16:creationId xmlns:a16="http://schemas.microsoft.com/office/drawing/2014/main" id="{6346B087-E1B9-C745-1D56-2D085C145DCD}"/>
               </a:ext>
             </a:extLst>
           </p:cNvPr>
@@ -5838,81 +5427,38 @@
             <p:ph idx="1"/>
           </p:nvPr>
         </p:nvSpPr>
-        <p:spPr>
-          <a:xfrm>
-            <a:off x="977336" y="1470113"/>
-            <a:ext cx="11636636" cy="3917773"/>
-          </a:xfrm>
-        </p:spPr>
-        <p:txBody>
-          <a:bodyPr>
-            <a:normAutofit/>
-          </a:bodyPr>
-          <a:lstStyle/>
-          <a:p>
-            <a:pPr algn="just">
-              <a:lnSpc>
-                <a:spcPct val="120000"/>
-              </a:lnSpc>
-            </a:pPr>
-            <a:endParaRPr lang="en-US" dirty="0"/>
-          </a:p>
-          <a:p>
-            <a:pPr algn="just">
-              <a:lnSpc>
-                <a:spcPct val="120000"/>
-              </a:lnSpc>
-            </a:pPr>
+        <p:spPr/>
+        <p:txBody>
+          <a:bodyPr/>
+          <a:lstStyle/>
+          <a:p>
             <a:r>
               <a:rPr lang="en-US" dirty="0"/>
               <a:t>OWFs have significant tradeoffs with other vital coastal resources:</a:t>
             </a:r>
           </a:p>
           <a:p>
-            <a:pPr algn="just">
-              <a:lnSpc>
-                <a:spcPct val="120000"/>
-              </a:lnSpc>
-              <a:buFontTx/>
-              <a:buChar char="-"/>
-            </a:pPr>
+            <a:pPr lvl="1"/>
             <a:r>
               <a:rPr lang="en-US" dirty="0"/>
               <a:t>Fisheries </a:t>
             </a:r>
           </a:p>
           <a:p>
-            <a:pPr algn="just">
-              <a:lnSpc>
-                <a:spcPct val="120000"/>
-              </a:lnSpc>
-              <a:buFontTx/>
-              <a:buChar char="-"/>
-            </a:pPr>
+            <a:pPr lvl="1"/>
             <a:r>
               <a:rPr lang="en-US" dirty="0"/>
               <a:t>Wildlife</a:t>
             </a:r>
           </a:p>
           <a:p>
-            <a:pPr algn="just">
-              <a:lnSpc>
-                <a:spcPct val="120000"/>
-              </a:lnSpc>
-              <a:buFontTx/>
-              <a:buChar char="-"/>
-            </a:pPr>
+            <a:pPr lvl="1"/>
             <a:r>
               <a:rPr lang="en-US" dirty="0"/>
               <a:t>Tourism and Views</a:t>
             </a:r>
           </a:p>
           <a:p>
-            <a:pPr algn="just">
-              <a:lnSpc>
-                <a:spcPct val="120000"/>
-              </a:lnSpc>
-            </a:pPr>
             <a:endParaRPr lang="en-US" dirty="0"/>
           </a:p>
         </p:txBody>
@@ -5920,7 +5466,7 @@
     </p:spTree>
     <p:extLst>
       <p:ext uri="{BB962C8B-B14F-4D97-AF65-F5344CB8AC3E}">
-        <p14:creationId xmlns:p14="http://schemas.microsoft.com/office/powerpoint/2010/main" val="1844913287"/>
+        <p14:creationId xmlns:p14="http://schemas.microsoft.com/office/powerpoint/2010/main" val="1620963936"/>
       </p:ext>
     </p:extLst>
   </p:cSld>
@@ -5952,7 +5498,7 @@
           <p:cNvPr id="2" name="Title 1">
             <a:extLst>
               <a:ext uri="{FF2B5EF4-FFF2-40B4-BE49-F238E27FC236}">
-                <a16:creationId xmlns:a16="http://schemas.microsoft.com/office/drawing/2014/main" id="{58AC96F5-77F9-5AD9-0D15-E45A0C7D9BCF}"/>
+                <a16:creationId xmlns:a16="http://schemas.microsoft.com/office/drawing/2014/main" id="{352D85BC-1B0C-C6F9-A844-1864D3076E14}"/>
               </a:ext>
             </a:extLst>
           </p:cNvPr>
@@ -5970,7 +5516,7 @@
           <a:p>
             <a:r>
               <a:rPr lang="en-US" dirty="0"/>
-              <a:t>So what?</a:t>
+              <a:t>So What?</a:t>
             </a:r>
           </a:p>
         </p:txBody>
@@ -5980,7 +5526,7 @@
           <p:cNvPr id="3" name="Content Placeholder 2">
             <a:extLst>
               <a:ext uri="{FF2B5EF4-FFF2-40B4-BE49-F238E27FC236}">
-                <a16:creationId xmlns:a16="http://schemas.microsoft.com/office/drawing/2014/main" id="{2A43C502-F0B6-D328-4C47-152D8315E294}"/>
+                <a16:creationId xmlns:a16="http://schemas.microsoft.com/office/drawing/2014/main" id="{59D450C2-C65D-7975-AC61-26F47F92D0B1}"/>
               </a:ext>
             </a:extLst>
           </p:cNvPr>
@@ -5991,67 +5537,43 @@
             <p:ph idx="1"/>
           </p:nvPr>
         </p:nvSpPr>
-        <p:spPr>
-          <a:xfrm>
-            <a:off x="838199" y="1825625"/>
-            <a:ext cx="10787743" cy="4351338"/>
-          </a:xfrm>
-        </p:spPr>
-        <p:txBody>
-          <a:bodyPr>
-            <a:normAutofit fontScale="92500"/>
-          </a:bodyPr>
-          <a:lstStyle/>
-          <a:p>
-            <a:pPr algn="just">
-              <a:lnSpc>
-                <a:spcPct val="200000"/>
-              </a:lnSpc>
-            </a:pPr>
+        <p:spPr/>
+        <p:txBody>
+          <a:bodyPr/>
+          <a:lstStyle/>
+          <a:p>
             <a:r>
               <a:rPr lang="en-US" dirty="0"/>
               <a:t>Electricity: renewable energy is critical .</a:t>
             </a:r>
           </a:p>
           <a:p>
-            <a:pPr algn="just">
-              <a:lnSpc>
-                <a:spcPct val="200000"/>
-              </a:lnSpc>
-            </a:pPr>
             <a:r>
               <a:rPr lang="en-US" dirty="0"/>
               <a:t>Fish: vital for coastal communities.</a:t>
             </a:r>
           </a:p>
           <a:p>
-            <a:pPr algn="just">
-              <a:lnSpc>
-                <a:spcPct val="200000"/>
-              </a:lnSpc>
-            </a:pPr>
             <a:r>
               <a:rPr lang="en-US" dirty="0"/>
               <a:t>Tourism: coastal communities depend on tourism.</a:t>
             </a:r>
           </a:p>
           <a:p>
-            <a:pPr algn="just">
-              <a:lnSpc>
-                <a:spcPct val="200000"/>
-              </a:lnSpc>
-            </a:pPr>
             <a:r>
               <a:rPr lang="en-US" dirty="0"/>
               <a:t>Biodiversity: essential for biodiversity and long-term ecosystem services.</a:t>
             </a:r>
+          </a:p>
+          <a:p>
+            <a:endParaRPr lang="en-US" dirty="0"/>
           </a:p>
         </p:txBody>
       </p:sp>
     </p:spTree>
     <p:extLst>
       <p:ext uri="{BB962C8B-B14F-4D97-AF65-F5344CB8AC3E}">
-        <p14:creationId xmlns:p14="http://schemas.microsoft.com/office/powerpoint/2010/main" val="613123339"/>
+        <p14:creationId xmlns:p14="http://schemas.microsoft.com/office/powerpoint/2010/main" val="102353672"/>
       </p:ext>
     </p:extLst>
   </p:cSld>

</xml_diff>